<commit_message>
made plans for my wild implementation of a compiler for the self created language EPL
</commit_message>
<xml_diff>
--- a/Compilers.pptx
+++ b/Compilers.pptx
@@ -5,7 +5,7 @@
     <p:sldMasterId id="2147483648" r:id="rId1"/>
   </p:sldMasterIdLst>
   <p:notesMasterIdLst>
-    <p:notesMasterId r:id="rId27"/>
+    <p:notesMasterId r:id="rId26"/>
   </p:notesMasterIdLst>
   <p:sldIdLst>
     <p:sldId id="256" r:id="rId2"/>
@@ -16,23 +16,22 @@
     <p:sldId id="258" r:id="rId7"/>
     <p:sldId id="259" r:id="rId8"/>
     <p:sldId id="262" r:id="rId9"/>
-    <p:sldId id="263" r:id="rId10"/>
-    <p:sldId id="264" r:id="rId11"/>
-    <p:sldId id="265" r:id="rId12"/>
-    <p:sldId id="266" r:id="rId13"/>
-    <p:sldId id="267" r:id="rId14"/>
-    <p:sldId id="268" r:id="rId15"/>
-    <p:sldId id="269" r:id="rId16"/>
-    <p:sldId id="270" r:id="rId17"/>
-    <p:sldId id="271" r:id="rId18"/>
-    <p:sldId id="272" r:id="rId19"/>
-    <p:sldId id="273" r:id="rId20"/>
-    <p:sldId id="274" r:id="rId21"/>
-    <p:sldId id="275" r:id="rId22"/>
-    <p:sldId id="276" r:id="rId23"/>
-    <p:sldId id="277" r:id="rId24"/>
-    <p:sldId id="278" r:id="rId25"/>
-    <p:sldId id="260" r:id="rId26"/>
+    <p:sldId id="264" r:id="rId10"/>
+    <p:sldId id="283" r:id="rId11"/>
+    <p:sldId id="266" r:id="rId12"/>
+    <p:sldId id="267" r:id="rId13"/>
+    <p:sldId id="284" r:id="rId14"/>
+    <p:sldId id="285" r:id="rId15"/>
+    <p:sldId id="286" r:id="rId16"/>
+    <p:sldId id="287" r:id="rId17"/>
+    <p:sldId id="272" r:id="rId18"/>
+    <p:sldId id="288" r:id="rId19"/>
+    <p:sldId id="289" r:id="rId20"/>
+    <p:sldId id="290" r:id="rId21"/>
+    <p:sldId id="291" r:id="rId22"/>
+    <p:sldId id="277" r:id="rId23"/>
+    <p:sldId id="292" r:id="rId24"/>
+    <p:sldId id="293" r:id="rId25"/>
   </p:sldIdLst>
   <p:sldSz cx="12192000" cy="6858000"/>
   <p:notesSz cx="6858000" cy="9144000"/>
@@ -3993,7 +3992,7 @@
         <p:cNvPr id="1" name="">
           <a:extLst>
             <a:ext uri="{FF2B5EF4-FFF2-40B4-BE49-F238E27FC236}">
-              <a16:creationId xmlns:a16="http://schemas.microsoft.com/office/drawing/2014/main" id="{9C18E758-ED1E-A5DA-D6EF-E9DF5C699923}"/>
+              <a16:creationId xmlns:a16="http://schemas.microsoft.com/office/drawing/2014/main" id="{BE705356-F522-421E-B70C-296C57450B8C}"/>
             </a:ext>
           </a:extLst>
         </p:cNvPr>
@@ -4010,43 +4009,10 @@
       </p:grpSpPr>
       <p:sp>
         <p:nvSpPr>
-          <p:cNvPr id="6" name="Title 5">
-            <a:extLst>
-              <a:ext uri="{FF2B5EF4-FFF2-40B4-BE49-F238E27FC236}">
-                <a16:creationId xmlns:a16="http://schemas.microsoft.com/office/drawing/2014/main" id="{FA4C2B05-E648-9FA4-DCD7-B1EDB9F3BECF}"/>
-              </a:ext>
-            </a:extLst>
-          </p:cNvPr>
-          <p:cNvSpPr>
-            <a:spLocks noGrp="1"/>
-          </p:cNvSpPr>
-          <p:nvPr>
-            <p:ph type="title"/>
-          </p:nvPr>
-        </p:nvSpPr>
-        <p:spPr>
-          <a:xfrm>
-            <a:off x="838200" y="694547"/>
-            <a:ext cx="10515600" cy="1325563"/>
-          </a:xfrm>
-        </p:spPr>
-        <p:txBody>
-          <a:bodyPr/>
-          <a:lstStyle/>
-          <a:p>
-            <a:r>
-              <a:rPr lang="en-US" dirty="0"/>
-              <a:t>Compilers vs Interpreters</a:t>
-            </a:r>
-          </a:p>
-        </p:txBody>
-      </p:sp>
-      <p:sp>
-        <p:nvSpPr>
           <p:cNvPr id="7" name="Content Placeholder 6">
             <a:extLst>
               <a:ext uri="{FF2B5EF4-FFF2-40B4-BE49-F238E27FC236}">
-                <a16:creationId xmlns:a16="http://schemas.microsoft.com/office/drawing/2014/main" id="{D368607E-2AAD-DBDE-9480-8D578F7AC080}"/>
+                <a16:creationId xmlns:a16="http://schemas.microsoft.com/office/drawing/2014/main" id="{942CFDBF-5840-DFFD-CDE5-6E5F20A83302}"/>
               </a:ext>
             </a:extLst>
           </p:cNvPr>
@@ -4059,44 +4025,14 @@
         </p:nvSpPr>
         <p:spPr>
           <a:xfrm>
-            <a:off x="838200" y="2254763"/>
-            <a:ext cx="10515600" cy="3922201"/>
+            <a:off x="838200" y="988399"/>
+            <a:ext cx="10515600" cy="5188566"/>
           </a:xfrm>
         </p:spPr>
         <p:txBody>
           <a:bodyPr/>
           <a:lstStyle/>
           <a:p>
-            <a:r>
-              <a:rPr lang="en-US" dirty="0"/>
-              <a:t>U can write an </a:t>
-            </a:r>
-            <a:r>
-              <a:rPr lang="en-US" dirty="0">
-                <a:solidFill>
-                  <a:schemeClr val="accent2"/>
-                </a:solidFill>
-              </a:rPr>
-              <a:t>interpreter for C </a:t>
-            </a:r>
-            <a:r>
-              <a:rPr lang="en-US" dirty="0"/>
-              <a:t>and a </a:t>
-            </a:r>
-            <a:r>
-              <a:rPr lang="en-US" dirty="0">
-                <a:solidFill>
-                  <a:schemeClr val="accent1"/>
-                </a:solidFill>
-              </a:rPr>
-              <a:t>compiler for JavaScript</a:t>
-            </a:r>
-            <a:r>
-              <a:rPr lang="en-US" dirty="0"/>
-              <a:t>.</a:t>
-            </a:r>
-          </a:p>
-          <a:p>
             <a:endParaRPr lang="en-US" dirty="0"/>
           </a:p>
         </p:txBody>
@@ -4106,7 +4042,7 @@
           <p:cNvPr id="4" name="Rectangle 3">
             <a:extLst>
               <a:ext uri="{FF2B5EF4-FFF2-40B4-BE49-F238E27FC236}">
-                <a16:creationId xmlns:a16="http://schemas.microsoft.com/office/drawing/2014/main" id="{F233A266-49F8-6F15-9B2E-4BDFA08D628A}"/>
+                <a16:creationId xmlns:a16="http://schemas.microsoft.com/office/drawing/2014/main" id="{211F523A-1E6C-5400-3D9C-C84E5AABE493}"/>
               </a:ext>
             </a:extLst>
           </p:cNvPr>
@@ -4158,7 +4094,7 @@
           <p:cNvPr id="5" name="Oval 4">
             <a:extLst>
               <a:ext uri="{FF2B5EF4-FFF2-40B4-BE49-F238E27FC236}">
-                <a16:creationId xmlns:a16="http://schemas.microsoft.com/office/drawing/2014/main" id="{6C2DB65A-3098-E41E-5444-5D4FDADFAAB2}"/>
+                <a16:creationId xmlns:a16="http://schemas.microsoft.com/office/drawing/2014/main" id="{0F57A81C-64D0-7310-AB5F-3C8AEA5C6048}"/>
               </a:ext>
             </a:extLst>
           </p:cNvPr>
@@ -4210,7 +4146,7 @@
           <p:cNvPr id="8" name="Oval 7">
             <a:extLst>
               <a:ext uri="{FF2B5EF4-FFF2-40B4-BE49-F238E27FC236}">
-                <a16:creationId xmlns:a16="http://schemas.microsoft.com/office/drawing/2014/main" id="{E833ED17-7925-7B42-2DA8-68FFB1A203C0}"/>
+                <a16:creationId xmlns:a16="http://schemas.microsoft.com/office/drawing/2014/main" id="{97558254-F01B-09B7-F7AA-E9D05D91E17C}"/>
               </a:ext>
             </a:extLst>
           </p:cNvPr>
@@ -4262,7 +4198,7 @@
           <p:cNvPr id="9" name="Oval 8">
             <a:extLst>
               <a:ext uri="{FF2B5EF4-FFF2-40B4-BE49-F238E27FC236}">
-                <a16:creationId xmlns:a16="http://schemas.microsoft.com/office/drawing/2014/main" id="{649FFE16-93D7-CFAB-2B7F-C225D824A923}"/>
+                <a16:creationId xmlns:a16="http://schemas.microsoft.com/office/drawing/2014/main" id="{8E92F570-D1A3-5BCB-15C8-8A24A9F2D77A}"/>
               </a:ext>
             </a:extLst>
           </p:cNvPr>
@@ -4312,7 +4248,7 @@
     </p:spTree>
     <p:extLst>
       <p:ext uri="{BB962C8B-B14F-4D97-AF65-F5344CB8AC3E}">
-        <p14:creationId xmlns:p14="http://schemas.microsoft.com/office/powerpoint/2010/main" val="3444062210"/>
+        <p14:creationId xmlns:p14="http://schemas.microsoft.com/office/powerpoint/2010/main" val="3695012322"/>
       </p:ext>
     </p:extLst>
   </p:cSld>
@@ -4323,310 +4259,6 @@
 </file>
 
 <file path=ppt/slides/slide11.xml><?xml version="1.0" encoding="utf-8"?>
-<p:sld xmlns:a="http://schemas.openxmlformats.org/drawingml/2006/main" xmlns:r="http://schemas.openxmlformats.org/officeDocument/2006/relationships" xmlns:p="http://schemas.openxmlformats.org/presentationml/2006/main">
-  <p:cSld>
-    <p:spTree>
-      <p:nvGrpSpPr>
-        <p:cNvPr id="1" name="">
-          <a:extLst>
-            <a:ext uri="{FF2B5EF4-FFF2-40B4-BE49-F238E27FC236}">
-              <a16:creationId xmlns:a16="http://schemas.microsoft.com/office/drawing/2014/main" id="{70A4F220-17DE-BFD1-4E2A-E2C805F5751E}"/>
-            </a:ext>
-          </a:extLst>
-        </p:cNvPr>
-        <p:cNvGrpSpPr/>
-        <p:nvPr/>
-      </p:nvGrpSpPr>
-      <p:grpSpPr>
-        <a:xfrm>
-          <a:off x="0" y="0"/>
-          <a:ext cx="0" cy="0"/>
-          <a:chOff x="0" y="0"/>
-          <a:chExt cx="0" cy="0"/>
-        </a:xfrm>
-      </p:grpSpPr>
-      <p:sp>
-        <p:nvSpPr>
-          <p:cNvPr id="6" name="Title 5">
-            <a:extLst>
-              <a:ext uri="{FF2B5EF4-FFF2-40B4-BE49-F238E27FC236}">
-                <a16:creationId xmlns:a16="http://schemas.microsoft.com/office/drawing/2014/main" id="{5FD2C2E1-629C-2EFC-7526-E34BD33C1D86}"/>
-              </a:ext>
-            </a:extLst>
-          </p:cNvPr>
-          <p:cNvSpPr>
-            <a:spLocks noGrp="1"/>
-          </p:cNvSpPr>
-          <p:nvPr>
-            <p:ph type="title"/>
-          </p:nvPr>
-        </p:nvSpPr>
-        <p:spPr>
-          <a:xfrm>
-            <a:off x="838200" y="694547"/>
-            <a:ext cx="10515600" cy="1325563"/>
-          </a:xfrm>
-        </p:spPr>
-        <p:txBody>
-          <a:bodyPr/>
-          <a:lstStyle/>
-          <a:p>
-            <a:endParaRPr lang="en-US" dirty="0"/>
-          </a:p>
-        </p:txBody>
-      </p:sp>
-      <p:sp>
-        <p:nvSpPr>
-          <p:cNvPr id="7" name="Content Placeholder 6">
-            <a:extLst>
-              <a:ext uri="{FF2B5EF4-FFF2-40B4-BE49-F238E27FC236}">
-                <a16:creationId xmlns:a16="http://schemas.microsoft.com/office/drawing/2014/main" id="{BA86D30A-6E0F-9FB8-81FD-C98C27A34953}"/>
-              </a:ext>
-            </a:extLst>
-          </p:cNvPr>
-          <p:cNvSpPr>
-            <a:spLocks noGrp="1"/>
-          </p:cNvSpPr>
-          <p:nvPr>
-            <p:ph idx="1"/>
-          </p:nvPr>
-        </p:nvSpPr>
-        <p:spPr>
-          <a:xfrm>
-            <a:off x="838200" y="2254763"/>
-            <a:ext cx="10515600" cy="3922201"/>
-          </a:xfrm>
-        </p:spPr>
-        <p:txBody>
-          <a:bodyPr/>
-          <a:lstStyle/>
-          <a:p>
-            <a:endParaRPr lang="en-US" dirty="0"/>
-          </a:p>
-        </p:txBody>
-      </p:sp>
-      <p:sp>
-        <p:nvSpPr>
-          <p:cNvPr id="4" name="Rectangle 3">
-            <a:extLst>
-              <a:ext uri="{FF2B5EF4-FFF2-40B4-BE49-F238E27FC236}">
-                <a16:creationId xmlns:a16="http://schemas.microsoft.com/office/drawing/2014/main" id="{E0EF9C6A-3957-454C-23B7-0CE40D98EFA6}"/>
-              </a:ext>
-            </a:extLst>
-          </p:cNvPr>
-          <p:cNvSpPr/>
-          <p:nvPr/>
-        </p:nvSpPr>
-        <p:spPr>
-          <a:xfrm>
-            <a:off x="0" y="0"/>
-            <a:ext cx="12192000" cy="468086"/>
-          </a:xfrm>
-          <a:prstGeom prst="rect">
-            <a:avLst/>
-          </a:prstGeom>
-          <a:solidFill>
-            <a:schemeClr val="bg2"/>
-          </a:solidFill>
-          <a:ln>
-            <a:noFill/>
-          </a:ln>
-        </p:spPr>
-        <p:style>
-          <a:lnRef idx="2">
-            <a:schemeClr val="accent1">
-              <a:shade val="15000"/>
-            </a:schemeClr>
-          </a:lnRef>
-          <a:fillRef idx="1">
-            <a:schemeClr val="accent1"/>
-          </a:fillRef>
-          <a:effectRef idx="0">
-            <a:schemeClr val="accent1"/>
-          </a:effectRef>
-          <a:fontRef idx="minor">
-            <a:schemeClr val="lt1"/>
-          </a:fontRef>
-        </p:style>
-        <p:txBody>
-          <a:bodyPr rtlCol="0" anchor="ctr"/>
-          <a:lstStyle/>
-          <a:p>
-            <a:pPr algn="ctr"/>
-            <a:endParaRPr lang="en-US" sz="1351"/>
-          </a:p>
-        </p:txBody>
-      </p:sp>
-      <p:sp>
-        <p:nvSpPr>
-          <p:cNvPr id="5" name="Oval 4">
-            <a:extLst>
-              <a:ext uri="{FF2B5EF4-FFF2-40B4-BE49-F238E27FC236}">
-                <a16:creationId xmlns:a16="http://schemas.microsoft.com/office/drawing/2014/main" id="{26F85CDD-6BF6-A203-C6A8-27CB68893FE8}"/>
-              </a:ext>
-            </a:extLst>
-          </p:cNvPr>
-          <p:cNvSpPr/>
-          <p:nvPr/>
-        </p:nvSpPr>
-        <p:spPr>
-          <a:xfrm>
-            <a:off x="129189" y="108651"/>
-            <a:ext cx="246109" cy="250784"/>
-          </a:xfrm>
-          <a:prstGeom prst="ellipse">
-            <a:avLst/>
-          </a:prstGeom>
-          <a:solidFill>
-            <a:schemeClr val="accent1"/>
-          </a:solidFill>
-          <a:ln>
-            <a:noFill/>
-          </a:ln>
-        </p:spPr>
-        <p:style>
-          <a:lnRef idx="2">
-            <a:schemeClr val="accent1">
-              <a:shade val="15000"/>
-            </a:schemeClr>
-          </a:lnRef>
-          <a:fillRef idx="1">
-            <a:schemeClr val="accent1"/>
-          </a:fillRef>
-          <a:effectRef idx="0">
-            <a:schemeClr val="accent1"/>
-          </a:effectRef>
-          <a:fontRef idx="minor">
-            <a:schemeClr val="lt1"/>
-          </a:fontRef>
-        </p:style>
-        <p:txBody>
-          <a:bodyPr rtlCol="0" anchor="ctr"/>
-          <a:lstStyle/>
-          <a:p>
-            <a:pPr algn="ctr"/>
-            <a:endParaRPr lang="en-US"/>
-          </a:p>
-        </p:txBody>
-      </p:sp>
-      <p:sp>
-        <p:nvSpPr>
-          <p:cNvPr id="8" name="Oval 7">
-            <a:extLst>
-              <a:ext uri="{FF2B5EF4-FFF2-40B4-BE49-F238E27FC236}">
-                <a16:creationId xmlns:a16="http://schemas.microsoft.com/office/drawing/2014/main" id="{4CC06E3F-3519-7120-AACE-852B894664D6}"/>
-              </a:ext>
-            </a:extLst>
-          </p:cNvPr>
-          <p:cNvSpPr/>
-          <p:nvPr/>
-        </p:nvSpPr>
-        <p:spPr>
-          <a:xfrm>
-            <a:off x="504487" y="113785"/>
-            <a:ext cx="246109" cy="250784"/>
-          </a:xfrm>
-          <a:prstGeom prst="ellipse">
-            <a:avLst/>
-          </a:prstGeom>
-          <a:solidFill>
-            <a:schemeClr val="accent3"/>
-          </a:solidFill>
-          <a:ln>
-            <a:noFill/>
-          </a:ln>
-        </p:spPr>
-        <p:style>
-          <a:lnRef idx="2">
-            <a:schemeClr val="accent1">
-              <a:shade val="15000"/>
-            </a:schemeClr>
-          </a:lnRef>
-          <a:fillRef idx="1">
-            <a:schemeClr val="accent1"/>
-          </a:fillRef>
-          <a:effectRef idx="0">
-            <a:schemeClr val="accent1"/>
-          </a:effectRef>
-          <a:fontRef idx="minor">
-            <a:schemeClr val="lt1"/>
-          </a:fontRef>
-        </p:style>
-        <p:txBody>
-          <a:bodyPr rtlCol="0" anchor="ctr"/>
-          <a:lstStyle/>
-          <a:p>
-            <a:pPr algn="ctr"/>
-            <a:endParaRPr lang="en-US"/>
-          </a:p>
-        </p:txBody>
-      </p:sp>
-      <p:sp>
-        <p:nvSpPr>
-          <p:cNvPr id="9" name="Oval 8">
-            <a:extLst>
-              <a:ext uri="{FF2B5EF4-FFF2-40B4-BE49-F238E27FC236}">
-                <a16:creationId xmlns:a16="http://schemas.microsoft.com/office/drawing/2014/main" id="{9655CCD7-DB86-D1B0-89C3-AC93B1DA49B4}"/>
-              </a:ext>
-            </a:extLst>
-          </p:cNvPr>
-          <p:cNvSpPr/>
-          <p:nvPr/>
-        </p:nvSpPr>
-        <p:spPr>
-          <a:xfrm>
-            <a:off x="879785" y="108651"/>
-            <a:ext cx="246109" cy="250784"/>
-          </a:xfrm>
-          <a:prstGeom prst="ellipse">
-            <a:avLst/>
-          </a:prstGeom>
-          <a:solidFill>
-            <a:schemeClr val="accent2"/>
-          </a:solidFill>
-          <a:ln>
-            <a:noFill/>
-          </a:ln>
-        </p:spPr>
-        <p:style>
-          <a:lnRef idx="2">
-            <a:schemeClr val="accent1">
-              <a:shade val="15000"/>
-            </a:schemeClr>
-          </a:lnRef>
-          <a:fillRef idx="1">
-            <a:schemeClr val="accent1"/>
-          </a:fillRef>
-          <a:effectRef idx="0">
-            <a:schemeClr val="accent1"/>
-          </a:effectRef>
-          <a:fontRef idx="minor">
-            <a:schemeClr val="lt1"/>
-          </a:fontRef>
-        </p:style>
-        <p:txBody>
-          <a:bodyPr rtlCol="0" anchor="ctr"/>
-          <a:lstStyle/>
-          <a:p>
-            <a:pPr algn="ctr"/>
-            <a:endParaRPr lang="en-US"/>
-          </a:p>
-        </p:txBody>
-      </p:sp>
-    </p:spTree>
-    <p:extLst>
-      <p:ext uri="{BB962C8B-B14F-4D97-AF65-F5344CB8AC3E}">
-        <p14:creationId xmlns:p14="http://schemas.microsoft.com/office/powerpoint/2010/main" val="1522722365"/>
-      </p:ext>
-    </p:extLst>
-  </p:cSld>
-  <p:clrMapOvr>
-    <a:masterClrMapping/>
-  </p:clrMapOvr>
-</p:sld>
-</file>
-
-<file path=ppt/slides/slide12.xml><?xml version="1.0" encoding="utf-8"?>
 <p:sld xmlns:a="http://schemas.openxmlformats.org/drawingml/2006/main" xmlns:r="http://schemas.openxmlformats.org/officeDocument/2006/relationships" xmlns:p="http://schemas.openxmlformats.org/presentationml/2006/main">
   <p:cSld>
     <p:spTree>
@@ -4933,7 +4565,7 @@
 </p:sld>
 </file>
 
-<file path=ppt/slides/slide13.xml><?xml version="1.0" encoding="utf-8"?>
+<file path=ppt/slides/slide12.xml><?xml version="1.0" encoding="utf-8"?>
 <p:sld xmlns:a="http://schemas.openxmlformats.org/drawingml/2006/main" xmlns:r="http://schemas.openxmlformats.org/officeDocument/2006/relationships" xmlns:p="http://schemas.openxmlformats.org/presentationml/2006/main">
   <p:cSld>
     <p:spTree>
@@ -5240,7 +4872,7 @@
 </p:sld>
 </file>
 
-<file path=ppt/slides/slide14.xml><?xml version="1.0" encoding="utf-8"?>
+<file path=ppt/slides/slide13.xml><?xml version="1.0" encoding="utf-8"?>
 <p:sld xmlns:a="http://schemas.openxmlformats.org/drawingml/2006/main" xmlns:r="http://schemas.openxmlformats.org/officeDocument/2006/relationships" xmlns:p="http://schemas.openxmlformats.org/presentationml/2006/main">
   <p:cSld>
     <p:spTree>
@@ -5248,7 +4880,7 @@
         <p:cNvPr id="1" name="">
           <a:extLst>
             <a:ext uri="{FF2B5EF4-FFF2-40B4-BE49-F238E27FC236}">
-              <a16:creationId xmlns:a16="http://schemas.microsoft.com/office/drawing/2014/main" id="{3EDC162E-AF98-0947-61F6-65F23962FE70}"/>
+              <a16:creationId xmlns:a16="http://schemas.microsoft.com/office/drawing/2014/main" id="{715EAF80-B67F-ED18-A5CE-F0702210F67F}"/>
             </a:ext>
           </a:extLst>
         </p:cNvPr>
@@ -5265,40 +4897,10 @@
       </p:grpSpPr>
       <p:sp>
         <p:nvSpPr>
-          <p:cNvPr id="6" name="Title 5">
-            <a:extLst>
-              <a:ext uri="{FF2B5EF4-FFF2-40B4-BE49-F238E27FC236}">
-                <a16:creationId xmlns:a16="http://schemas.microsoft.com/office/drawing/2014/main" id="{55100DC3-B6EF-C9D5-BE2B-A4B0A3D195E4}"/>
-              </a:ext>
-            </a:extLst>
-          </p:cNvPr>
-          <p:cNvSpPr>
-            <a:spLocks noGrp="1"/>
-          </p:cNvSpPr>
-          <p:nvPr>
-            <p:ph type="title"/>
-          </p:nvPr>
-        </p:nvSpPr>
-        <p:spPr>
-          <a:xfrm>
-            <a:off x="838200" y="694547"/>
-            <a:ext cx="10515600" cy="1325563"/>
-          </a:xfrm>
-        </p:spPr>
-        <p:txBody>
-          <a:bodyPr/>
-          <a:lstStyle/>
-          <a:p>
-            <a:endParaRPr lang="en-US" dirty="0"/>
-          </a:p>
-        </p:txBody>
-      </p:sp>
-      <p:sp>
-        <p:nvSpPr>
           <p:cNvPr id="7" name="Content Placeholder 6">
             <a:extLst>
               <a:ext uri="{FF2B5EF4-FFF2-40B4-BE49-F238E27FC236}">
-                <a16:creationId xmlns:a16="http://schemas.microsoft.com/office/drawing/2014/main" id="{33AF322A-6853-2571-913C-46DAB63D8B71}"/>
+                <a16:creationId xmlns:a16="http://schemas.microsoft.com/office/drawing/2014/main" id="{A00C6BC0-B6E4-9EC4-54E4-8A588AABBFE1}"/>
               </a:ext>
             </a:extLst>
           </p:cNvPr>
@@ -5311,8 +4913,8 @@
         </p:nvSpPr>
         <p:spPr>
           <a:xfrm>
-            <a:off x="838200" y="2254763"/>
-            <a:ext cx="10515600" cy="3922201"/>
+            <a:off x="838200" y="988399"/>
+            <a:ext cx="10515600" cy="5188566"/>
           </a:xfrm>
         </p:spPr>
         <p:txBody>
@@ -5328,7 +4930,7 @@
           <p:cNvPr id="4" name="Rectangle 3">
             <a:extLst>
               <a:ext uri="{FF2B5EF4-FFF2-40B4-BE49-F238E27FC236}">
-                <a16:creationId xmlns:a16="http://schemas.microsoft.com/office/drawing/2014/main" id="{0DE8DA06-2109-66EC-0ACF-5D6A1531FD6D}"/>
+                <a16:creationId xmlns:a16="http://schemas.microsoft.com/office/drawing/2014/main" id="{0F3F4EF6-5F98-55DE-5AEC-C51CDBFD5DD7}"/>
               </a:ext>
             </a:extLst>
           </p:cNvPr>
@@ -5380,7 +4982,7 @@
           <p:cNvPr id="5" name="Oval 4">
             <a:extLst>
               <a:ext uri="{FF2B5EF4-FFF2-40B4-BE49-F238E27FC236}">
-                <a16:creationId xmlns:a16="http://schemas.microsoft.com/office/drawing/2014/main" id="{414BD676-6226-C3A7-5139-46428DA25949}"/>
+                <a16:creationId xmlns:a16="http://schemas.microsoft.com/office/drawing/2014/main" id="{847AD322-5550-375B-CF4D-DD936501487C}"/>
               </a:ext>
             </a:extLst>
           </p:cNvPr>
@@ -5432,7 +5034,7 @@
           <p:cNvPr id="8" name="Oval 7">
             <a:extLst>
               <a:ext uri="{FF2B5EF4-FFF2-40B4-BE49-F238E27FC236}">
-                <a16:creationId xmlns:a16="http://schemas.microsoft.com/office/drawing/2014/main" id="{39F55C9E-DD7F-6FDB-5E95-C36B8563C4FA}"/>
+                <a16:creationId xmlns:a16="http://schemas.microsoft.com/office/drawing/2014/main" id="{4B065C95-A04B-0C6A-2F23-D6965CC6517B}"/>
               </a:ext>
             </a:extLst>
           </p:cNvPr>
@@ -5484,7 +5086,7 @@
           <p:cNvPr id="9" name="Oval 8">
             <a:extLst>
               <a:ext uri="{FF2B5EF4-FFF2-40B4-BE49-F238E27FC236}">
-                <a16:creationId xmlns:a16="http://schemas.microsoft.com/office/drawing/2014/main" id="{5CF7482E-78A1-9138-DF24-412E0399FE10}"/>
+                <a16:creationId xmlns:a16="http://schemas.microsoft.com/office/drawing/2014/main" id="{B7D64E3C-8A72-A20E-D294-C5A028D9F799}"/>
               </a:ext>
             </a:extLst>
           </p:cNvPr>
@@ -5534,7 +5136,281 @@
     </p:spTree>
     <p:extLst>
       <p:ext uri="{BB962C8B-B14F-4D97-AF65-F5344CB8AC3E}">
-        <p14:creationId xmlns:p14="http://schemas.microsoft.com/office/powerpoint/2010/main" val="3257752176"/>
+        <p14:creationId xmlns:p14="http://schemas.microsoft.com/office/powerpoint/2010/main" val="2431755871"/>
+      </p:ext>
+    </p:extLst>
+  </p:cSld>
+  <p:clrMapOvr>
+    <a:masterClrMapping/>
+  </p:clrMapOvr>
+</p:sld>
+</file>
+
+<file path=ppt/slides/slide14.xml><?xml version="1.0" encoding="utf-8"?>
+<p:sld xmlns:a="http://schemas.openxmlformats.org/drawingml/2006/main" xmlns:r="http://schemas.openxmlformats.org/officeDocument/2006/relationships" xmlns:p="http://schemas.openxmlformats.org/presentationml/2006/main">
+  <p:cSld>
+    <p:spTree>
+      <p:nvGrpSpPr>
+        <p:cNvPr id="1" name="">
+          <a:extLst>
+            <a:ext uri="{FF2B5EF4-FFF2-40B4-BE49-F238E27FC236}">
+              <a16:creationId xmlns:a16="http://schemas.microsoft.com/office/drawing/2014/main" id="{37F1FA02-40CA-84F0-7963-7834A12B3581}"/>
+            </a:ext>
+          </a:extLst>
+        </p:cNvPr>
+        <p:cNvGrpSpPr/>
+        <p:nvPr/>
+      </p:nvGrpSpPr>
+      <p:grpSpPr>
+        <a:xfrm>
+          <a:off x="0" y="0"/>
+          <a:ext cx="0" cy="0"/>
+          <a:chOff x="0" y="0"/>
+          <a:chExt cx="0" cy="0"/>
+        </a:xfrm>
+      </p:grpSpPr>
+      <p:sp>
+        <p:nvSpPr>
+          <p:cNvPr id="7" name="Content Placeholder 6">
+            <a:extLst>
+              <a:ext uri="{FF2B5EF4-FFF2-40B4-BE49-F238E27FC236}">
+                <a16:creationId xmlns:a16="http://schemas.microsoft.com/office/drawing/2014/main" id="{E7104316-A825-F46A-A748-08E63FE64609}"/>
+              </a:ext>
+            </a:extLst>
+          </p:cNvPr>
+          <p:cNvSpPr>
+            <a:spLocks noGrp="1"/>
+          </p:cNvSpPr>
+          <p:nvPr>
+            <p:ph idx="1"/>
+          </p:nvPr>
+        </p:nvSpPr>
+        <p:spPr>
+          <a:xfrm>
+            <a:off x="838200" y="988399"/>
+            <a:ext cx="10515600" cy="5188566"/>
+          </a:xfrm>
+        </p:spPr>
+        <p:txBody>
+          <a:bodyPr/>
+          <a:lstStyle/>
+          <a:p>
+            <a:endParaRPr lang="en-US" dirty="0"/>
+          </a:p>
+        </p:txBody>
+      </p:sp>
+      <p:sp>
+        <p:nvSpPr>
+          <p:cNvPr id="4" name="Rectangle 3">
+            <a:extLst>
+              <a:ext uri="{FF2B5EF4-FFF2-40B4-BE49-F238E27FC236}">
+                <a16:creationId xmlns:a16="http://schemas.microsoft.com/office/drawing/2014/main" id="{51756967-1BF0-B4DB-5533-A42B579C50EB}"/>
+              </a:ext>
+            </a:extLst>
+          </p:cNvPr>
+          <p:cNvSpPr/>
+          <p:nvPr/>
+        </p:nvSpPr>
+        <p:spPr>
+          <a:xfrm>
+            <a:off x="0" y="0"/>
+            <a:ext cx="12192000" cy="468086"/>
+          </a:xfrm>
+          <a:prstGeom prst="rect">
+            <a:avLst/>
+          </a:prstGeom>
+          <a:solidFill>
+            <a:schemeClr val="bg2"/>
+          </a:solidFill>
+          <a:ln>
+            <a:noFill/>
+          </a:ln>
+        </p:spPr>
+        <p:style>
+          <a:lnRef idx="2">
+            <a:schemeClr val="accent1">
+              <a:shade val="15000"/>
+            </a:schemeClr>
+          </a:lnRef>
+          <a:fillRef idx="1">
+            <a:schemeClr val="accent1"/>
+          </a:fillRef>
+          <a:effectRef idx="0">
+            <a:schemeClr val="accent1"/>
+          </a:effectRef>
+          <a:fontRef idx="minor">
+            <a:schemeClr val="lt1"/>
+          </a:fontRef>
+        </p:style>
+        <p:txBody>
+          <a:bodyPr rtlCol="0" anchor="ctr"/>
+          <a:lstStyle/>
+          <a:p>
+            <a:pPr algn="ctr"/>
+            <a:endParaRPr lang="en-US" sz="1351"/>
+          </a:p>
+        </p:txBody>
+      </p:sp>
+      <p:sp>
+        <p:nvSpPr>
+          <p:cNvPr id="5" name="Oval 4">
+            <a:extLst>
+              <a:ext uri="{FF2B5EF4-FFF2-40B4-BE49-F238E27FC236}">
+                <a16:creationId xmlns:a16="http://schemas.microsoft.com/office/drawing/2014/main" id="{4ED86FEF-9C86-E5B5-E3E6-0072D34D5FC1}"/>
+              </a:ext>
+            </a:extLst>
+          </p:cNvPr>
+          <p:cNvSpPr/>
+          <p:nvPr/>
+        </p:nvSpPr>
+        <p:spPr>
+          <a:xfrm>
+            <a:off x="129189" y="108651"/>
+            <a:ext cx="246109" cy="250784"/>
+          </a:xfrm>
+          <a:prstGeom prst="ellipse">
+            <a:avLst/>
+          </a:prstGeom>
+          <a:solidFill>
+            <a:schemeClr val="accent1"/>
+          </a:solidFill>
+          <a:ln>
+            <a:noFill/>
+          </a:ln>
+        </p:spPr>
+        <p:style>
+          <a:lnRef idx="2">
+            <a:schemeClr val="accent1">
+              <a:shade val="15000"/>
+            </a:schemeClr>
+          </a:lnRef>
+          <a:fillRef idx="1">
+            <a:schemeClr val="accent1"/>
+          </a:fillRef>
+          <a:effectRef idx="0">
+            <a:schemeClr val="accent1"/>
+          </a:effectRef>
+          <a:fontRef idx="minor">
+            <a:schemeClr val="lt1"/>
+          </a:fontRef>
+        </p:style>
+        <p:txBody>
+          <a:bodyPr rtlCol="0" anchor="ctr"/>
+          <a:lstStyle/>
+          <a:p>
+            <a:pPr algn="ctr"/>
+            <a:endParaRPr lang="en-US"/>
+          </a:p>
+        </p:txBody>
+      </p:sp>
+      <p:sp>
+        <p:nvSpPr>
+          <p:cNvPr id="8" name="Oval 7">
+            <a:extLst>
+              <a:ext uri="{FF2B5EF4-FFF2-40B4-BE49-F238E27FC236}">
+                <a16:creationId xmlns:a16="http://schemas.microsoft.com/office/drawing/2014/main" id="{3C54FB61-6EAB-6449-C18B-F1AF4A480E1A}"/>
+              </a:ext>
+            </a:extLst>
+          </p:cNvPr>
+          <p:cNvSpPr/>
+          <p:nvPr/>
+        </p:nvSpPr>
+        <p:spPr>
+          <a:xfrm>
+            <a:off x="504487" y="113785"/>
+            <a:ext cx="246109" cy="250784"/>
+          </a:xfrm>
+          <a:prstGeom prst="ellipse">
+            <a:avLst/>
+          </a:prstGeom>
+          <a:solidFill>
+            <a:schemeClr val="accent3"/>
+          </a:solidFill>
+          <a:ln>
+            <a:noFill/>
+          </a:ln>
+        </p:spPr>
+        <p:style>
+          <a:lnRef idx="2">
+            <a:schemeClr val="accent1">
+              <a:shade val="15000"/>
+            </a:schemeClr>
+          </a:lnRef>
+          <a:fillRef idx="1">
+            <a:schemeClr val="accent1"/>
+          </a:fillRef>
+          <a:effectRef idx="0">
+            <a:schemeClr val="accent1"/>
+          </a:effectRef>
+          <a:fontRef idx="minor">
+            <a:schemeClr val="lt1"/>
+          </a:fontRef>
+        </p:style>
+        <p:txBody>
+          <a:bodyPr rtlCol="0" anchor="ctr"/>
+          <a:lstStyle/>
+          <a:p>
+            <a:pPr algn="ctr"/>
+            <a:endParaRPr lang="en-US"/>
+          </a:p>
+        </p:txBody>
+      </p:sp>
+      <p:sp>
+        <p:nvSpPr>
+          <p:cNvPr id="9" name="Oval 8">
+            <a:extLst>
+              <a:ext uri="{FF2B5EF4-FFF2-40B4-BE49-F238E27FC236}">
+                <a16:creationId xmlns:a16="http://schemas.microsoft.com/office/drawing/2014/main" id="{5B5F4E08-F4EA-6EBD-5D27-50482205E87D}"/>
+              </a:ext>
+            </a:extLst>
+          </p:cNvPr>
+          <p:cNvSpPr/>
+          <p:nvPr/>
+        </p:nvSpPr>
+        <p:spPr>
+          <a:xfrm>
+            <a:off x="879785" y="108651"/>
+            <a:ext cx="246109" cy="250784"/>
+          </a:xfrm>
+          <a:prstGeom prst="ellipse">
+            <a:avLst/>
+          </a:prstGeom>
+          <a:solidFill>
+            <a:schemeClr val="accent2"/>
+          </a:solidFill>
+          <a:ln>
+            <a:noFill/>
+          </a:ln>
+        </p:spPr>
+        <p:style>
+          <a:lnRef idx="2">
+            <a:schemeClr val="accent1">
+              <a:shade val="15000"/>
+            </a:schemeClr>
+          </a:lnRef>
+          <a:fillRef idx="1">
+            <a:schemeClr val="accent1"/>
+          </a:fillRef>
+          <a:effectRef idx="0">
+            <a:schemeClr val="accent1"/>
+          </a:effectRef>
+          <a:fontRef idx="minor">
+            <a:schemeClr val="lt1"/>
+          </a:fontRef>
+        </p:style>
+        <p:txBody>
+          <a:bodyPr rtlCol="0" anchor="ctr"/>
+          <a:lstStyle/>
+          <a:p>
+            <a:pPr algn="ctr"/>
+            <a:endParaRPr lang="en-US"/>
+          </a:p>
+        </p:txBody>
+      </p:sp>
+    </p:spTree>
+    <p:extLst>
+      <p:ext uri="{BB962C8B-B14F-4D97-AF65-F5344CB8AC3E}">
+        <p14:creationId xmlns:p14="http://schemas.microsoft.com/office/powerpoint/2010/main" val="2370209695"/>
       </p:ext>
     </p:extLst>
   </p:cSld>
@@ -5552,7 +5428,7 @@
         <p:cNvPr id="1" name="">
           <a:extLst>
             <a:ext uri="{FF2B5EF4-FFF2-40B4-BE49-F238E27FC236}">
-              <a16:creationId xmlns:a16="http://schemas.microsoft.com/office/drawing/2014/main" id="{2238E190-33AE-EAF9-276C-748F8CEEF4D7}"/>
+              <a16:creationId xmlns:a16="http://schemas.microsoft.com/office/drawing/2014/main" id="{853B9750-ACB3-B516-462A-A1F5F0134A8E}"/>
             </a:ext>
           </a:extLst>
         </p:cNvPr>
@@ -5569,40 +5445,10 @@
       </p:grpSpPr>
       <p:sp>
         <p:nvSpPr>
-          <p:cNvPr id="6" name="Title 5">
-            <a:extLst>
-              <a:ext uri="{FF2B5EF4-FFF2-40B4-BE49-F238E27FC236}">
-                <a16:creationId xmlns:a16="http://schemas.microsoft.com/office/drawing/2014/main" id="{05E79A87-F06E-D1CB-5FF4-0C6D025E679C}"/>
-              </a:ext>
-            </a:extLst>
-          </p:cNvPr>
-          <p:cNvSpPr>
-            <a:spLocks noGrp="1"/>
-          </p:cNvSpPr>
-          <p:nvPr>
-            <p:ph type="title"/>
-          </p:nvPr>
-        </p:nvSpPr>
-        <p:spPr>
-          <a:xfrm>
-            <a:off x="838200" y="694547"/>
-            <a:ext cx="10515600" cy="1325563"/>
-          </a:xfrm>
-        </p:spPr>
-        <p:txBody>
-          <a:bodyPr/>
-          <a:lstStyle/>
-          <a:p>
-            <a:endParaRPr lang="en-US" dirty="0"/>
-          </a:p>
-        </p:txBody>
-      </p:sp>
-      <p:sp>
-        <p:nvSpPr>
           <p:cNvPr id="7" name="Content Placeholder 6">
             <a:extLst>
               <a:ext uri="{FF2B5EF4-FFF2-40B4-BE49-F238E27FC236}">
-                <a16:creationId xmlns:a16="http://schemas.microsoft.com/office/drawing/2014/main" id="{BF027BA5-484C-1184-9346-C77D5309ABAC}"/>
+                <a16:creationId xmlns:a16="http://schemas.microsoft.com/office/drawing/2014/main" id="{DCA8F52A-CD28-6FC0-58E9-3EB4A8B76A54}"/>
               </a:ext>
             </a:extLst>
           </p:cNvPr>
@@ -5615,8 +5461,8 @@
         </p:nvSpPr>
         <p:spPr>
           <a:xfrm>
-            <a:off x="838200" y="2254763"/>
-            <a:ext cx="10515600" cy="3922201"/>
+            <a:off x="838200" y="988399"/>
+            <a:ext cx="10515600" cy="5188566"/>
           </a:xfrm>
         </p:spPr>
         <p:txBody>
@@ -5632,7 +5478,7 @@
           <p:cNvPr id="4" name="Rectangle 3">
             <a:extLst>
               <a:ext uri="{FF2B5EF4-FFF2-40B4-BE49-F238E27FC236}">
-                <a16:creationId xmlns:a16="http://schemas.microsoft.com/office/drawing/2014/main" id="{51112834-DA3D-2885-22A7-CDDE56035300}"/>
+                <a16:creationId xmlns:a16="http://schemas.microsoft.com/office/drawing/2014/main" id="{C65502F2-D6B2-27F5-E55D-3720A11DEB5F}"/>
               </a:ext>
             </a:extLst>
           </p:cNvPr>
@@ -5684,7 +5530,7 @@
           <p:cNvPr id="5" name="Oval 4">
             <a:extLst>
               <a:ext uri="{FF2B5EF4-FFF2-40B4-BE49-F238E27FC236}">
-                <a16:creationId xmlns:a16="http://schemas.microsoft.com/office/drawing/2014/main" id="{880C5A98-65A9-4FC5-5323-3CD059229320}"/>
+                <a16:creationId xmlns:a16="http://schemas.microsoft.com/office/drawing/2014/main" id="{B91518D8-1F06-18BE-078D-018F0CD37258}"/>
               </a:ext>
             </a:extLst>
           </p:cNvPr>
@@ -5736,7 +5582,7 @@
           <p:cNvPr id="8" name="Oval 7">
             <a:extLst>
               <a:ext uri="{FF2B5EF4-FFF2-40B4-BE49-F238E27FC236}">
-                <a16:creationId xmlns:a16="http://schemas.microsoft.com/office/drawing/2014/main" id="{398968AF-A338-118D-36C7-53B385697FA2}"/>
+                <a16:creationId xmlns:a16="http://schemas.microsoft.com/office/drawing/2014/main" id="{774C9233-7474-C360-CFB2-8A06325A63BA}"/>
               </a:ext>
             </a:extLst>
           </p:cNvPr>
@@ -5788,7 +5634,7 @@
           <p:cNvPr id="9" name="Oval 8">
             <a:extLst>
               <a:ext uri="{FF2B5EF4-FFF2-40B4-BE49-F238E27FC236}">
-                <a16:creationId xmlns:a16="http://schemas.microsoft.com/office/drawing/2014/main" id="{1D916510-32F1-4E8E-4F12-820F2AEF7650}"/>
+                <a16:creationId xmlns:a16="http://schemas.microsoft.com/office/drawing/2014/main" id="{140DEC8A-EA63-18EC-1364-619FF770896B}"/>
               </a:ext>
             </a:extLst>
           </p:cNvPr>
@@ -5838,7 +5684,7 @@
     </p:spTree>
     <p:extLst>
       <p:ext uri="{BB962C8B-B14F-4D97-AF65-F5344CB8AC3E}">
-        <p14:creationId xmlns:p14="http://schemas.microsoft.com/office/powerpoint/2010/main" val="2889300233"/>
+        <p14:creationId xmlns:p14="http://schemas.microsoft.com/office/powerpoint/2010/main" val="1851556603"/>
       </p:ext>
     </p:extLst>
   </p:cSld>
@@ -5856,7 +5702,7 @@
         <p:cNvPr id="1" name="">
           <a:extLst>
             <a:ext uri="{FF2B5EF4-FFF2-40B4-BE49-F238E27FC236}">
-              <a16:creationId xmlns:a16="http://schemas.microsoft.com/office/drawing/2014/main" id="{1F46B1DE-DA8D-A70C-3854-7E0EA9117CBB}"/>
+              <a16:creationId xmlns:a16="http://schemas.microsoft.com/office/drawing/2014/main" id="{324F28D5-F54B-7146-993B-353967B8F63E}"/>
             </a:ext>
           </a:extLst>
         </p:cNvPr>
@@ -5873,40 +5719,10 @@
       </p:grpSpPr>
       <p:sp>
         <p:nvSpPr>
-          <p:cNvPr id="6" name="Title 5">
-            <a:extLst>
-              <a:ext uri="{FF2B5EF4-FFF2-40B4-BE49-F238E27FC236}">
-                <a16:creationId xmlns:a16="http://schemas.microsoft.com/office/drawing/2014/main" id="{5CB7CA6D-7248-3798-F1E2-CF41C2BCA811}"/>
-              </a:ext>
-            </a:extLst>
-          </p:cNvPr>
-          <p:cNvSpPr>
-            <a:spLocks noGrp="1"/>
-          </p:cNvSpPr>
-          <p:nvPr>
-            <p:ph type="title"/>
-          </p:nvPr>
-        </p:nvSpPr>
-        <p:spPr>
-          <a:xfrm>
-            <a:off x="838200" y="694547"/>
-            <a:ext cx="10515600" cy="1325563"/>
-          </a:xfrm>
-        </p:spPr>
-        <p:txBody>
-          <a:bodyPr/>
-          <a:lstStyle/>
-          <a:p>
-            <a:endParaRPr lang="en-US" dirty="0"/>
-          </a:p>
-        </p:txBody>
-      </p:sp>
-      <p:sp>
-        <p:nvSpPr>
           <p:cNvPr id="7" name="Content Placeholder 6">
             <a:extLst>
               <a:ext uri="{FF2B5EF4-FFF2-40B4-BE49-F238E27FC236}">
-                <a16:creationId xmlns:a16="http://schemas.microsoft.com/office/drawing/2014/main" id="{E71EF87C-F57B-A995-7CE6-7EEE60E8EE73}"/>
+                <a16:creationId xmlns:a16="http://schemas.microsoft.com/office/drawing/2014/main" id="{8AB08AB2-6307-1892-6A64-17DF995EA0C2}"/>
               </a:ext>
             </a:extLst>
           </p:cNvPr>
@@ -5919,8 +5735,8 @@
         </p:nvSpPr>
         <p:spPr>
           <a:xfrm>
-            <a:off x="838200" y="2254763"/>
-            <a:ext cx="10515600" cy="3922201"/>
+            <a:off x="838200" y="988399"/>
+            <a:ext cx="10515600" cy="5188566"/>
           </a:xfrm>
         </p:spPr>
         <p:txBody>
@@ -5936,7 +5752,7 @@
           <p:cNvPr id="4" name="Rectangle 3">
             <a:extLst>
               <a:ext uri="{FF2B5EF4-FFF2-40B4-BE49-F238E27FC236}">
-                <a16:creationId xmlns:a16="http://schemas.microsoft.com/office/drawing/2014/main" id="{58874EAA-8B72-10AB-63E6-3BF3E92C5B70}"/>
+                <a16:creationId xmlns:a16="http://schemas.microsoft.com/office/drawing/2014/main" id="{A8B3D747-5CA6-E8D8-180C-B0C117649C60}"/>
               </a:ext>
             </a:extLst>
           </p:cNvPr>
@@ -5988,7 +5804,7 @@
           <p:cNvPr id="5" name="Oval 4">
             <a:extLst>
               <a:ext uri="{FF2B5EF4-FFF2-40B4-BE49-F238E27FC236}">
-                <a16:creationId xmlns:a16="http://schemas.microsoft.com/office/drawing/2014/main" id="{1F62E79E-8E82-E28E-F0FF-8B6E4949DEE1}"/>
+                <a16:creationId xmlns:a16="http://schemas.microsoft.com/office/drawing/2014/main" id="{C3A52EBC-5DF7-03D3-C162-8895631C0873}"/>
               </a:ext>
             </a:extLst>
           </p:cNvPr>
@@ -6040,7 +5856,7 @@
           <p:cNvPr id="8" name="Oval 7">
             <a:extLst>
               <a:ext uri="{FF2B5EF4-FFF2-40B4-BE49-F238E27FC236}">
-                <a16:creationId xmlns:a16="http://schemas.microsoft.com/office/drawing/2014/main" id="{9099EB03-B38B-7A90-808E-3E4CA157976F}"/>
+                <a16:creationId xmlns:a16="http://schemas.microsoft.com/office/drawing/2014/main" id="{982A4732-96A0-589C-1E30-58ED9FABA5B9}"/>
               </a:ext>
             </a:extLst>
           </p:cNvPr>
@@ -6092,7 +5908,7 @@
           <p:cNvPr id="9" name="Oval 8">
             <a:extLst>
               <a:ext uri="{FF2B5EF4-FFF2-40B4-BE49-F238E27FC236}">
-                <a16:creationId xmlns:a16="http://schemas.microsoft.com/office/drawing/2014/main" id="{EA2592AF-6B90-A617-3176-01CF97057A8A}"/>
+                <a16:creationId xmlns:a16="http://schemas.microsoft.com/office/drawing/2014/main" id="{0B876252-CD70-298F-76E2-3F076A3C6C6D}"/>
               </a:ext>
             </a:extLst>
           </p:cNvPr>
@@ -6142,7 +5958,7 @@
     </p:spTree>
     <p:extLst>
       <p:ext uri="{BB962C8B-B14F-4D97-AF65-F5344CB8AC3E}">
-        <p14:creationId xmlns:p14="http://schemas.microsoft.com/office/powerpoint/2010/main" val="3243838564"/>
+        <p14:creationId xmlns:p14="http://schemas.microsoft.com/office/powerpoint/2010/main" val="2944349700"/>
       </p:ext>
     </p:extLst>
   </p:cSld>
@@ -6153,310 +5969,6 @@
 </file>
 
 <file path=ppt/slides/slide17.xml><?xml version="1.0" encoding="utf-8"?>
-<p:sld xmlns:a="http://schemas.openxmlformats.org/drawingml/2006/main" xmlns:r="http://schemas.openxmlformats.org/officeDocument/2006/relationships" xmlns:p="http://schemas.openxmlformats.org/presentationml/2006/main">
-  <p:cSld>
-    <p:spTree>
-      <p:nvGrpSpPr>
-        <p:cNvPr id="1" name="">
-          <a:extLst>
-            <a:ext uri="{FF2B5EF4-FFF2-40B4-BE49-F238E27FC236}">
-              <a16:creationId xmlns:a16="http://schemas.microsoft.com/office/drawing/2014/main" id="{E2E1F03E-540A-DC78-2038-EBA785F840F8}"/>
-            </a:ext>
-          </a:extLst>
-        </p:cNvPr>
-        <p:cNvGrpSpPr/>
-        <p:nvPr/>
-      </p:nvGrpSpPr>
-      <p:grpSpPr>
-        <a:xfrm>
-          <a:off x="0" y="0"/>
-          <a:ext cx="0" cy="0"/>
-          <a:chOff x="0" y="0"/>
-          <a:chExt cx="0" cy="0"/>
-        </a:xfrm>
-      </p:grpSpPr>
-      <p:sp>
-        <p:nvSpPr>
-          <p:cNvPr id="6" name="Title 5">
-            <a:extLst>
-              <a:ext uri="{FF2B5EF4-FFF2-40B4-BE49-F238E27FC236}">
-                <a16:creationId xmlns:a16="http://schemas.microsoft.com/office/drawing/2014/main" id="{F0FAF421-1FA7-07B4-2D06-13982308E0C6}"/>
-              </a:ext>
-            </a:extLst>
-          </p:cNvPr>
-          <p:cNvSpPr>
-            <a:spLocks noGrp="1"/>
-          </p:cNvSpPr>
-          <p:nvPr>
-            <p:ph type="title"/>
-          </p:nvPr>
-        </p:nvSpPr>
-        <p:spPr>
-          <a:xfrm>
-            <a:off x="838200" y="694547"/>
-            <a:ext cx="10515600" cy="1325563"/>
-          </a:xfrm>
-        </p:spPr>
-        <p:txBody>
-          <a:bodyPr/>
-          <a:lstStyle/>
-          <a:p>
-            <a:endParaRPr lang="en-US" dirty="0"/>
-          </a:p>
-        </p:txBody>
-      </p:sp>
-      <p:sp>
-        <p:nvSpPr>
-          <p:cNvPr id="7" name="Content Placeholder 6">
-            <a:extLst>
-              <a:ext uri="{FF2B5EF4-FFF2-40B4-BE49-F238E27FC236}">
-                <a16:creationId xmlns:a16="http://schemas.microsoft.com/office/drawing/2014/main" id="{6AA3FF78-9DDC-7AE4-C26F-CCA40A5F6BD3}"/>
-              </a:ext>
-            </a:extLst>
-          </p:cNvPr>
-          <p:cNvSpPr>
-            <a:spLocks noGrp="1"/>
-          </p:cNvSpPr>
-          <p:nvPr>
-            <p:ph idx="1"/>
-          </p:nvPr>
-        </p:nvSpPr>
-        <p:spPr>
-          <a:xfrm>
-            <a:off x="838200" y="2254763"/>
-            <a:ext cx="10515600" cy="3922201"/>
-          </a:xfrm>
-        </p:spPr>
-        <p:txBody>
-          <a:bodyPr/>
-          <a:lstStyle/>
-          <a:p>
-            <a:endParaRPr lang="en-US" dirty="0"/>
-          </a:p>
-        </p:txBody>
-      </p:sp>
-      <p:sp>
-        <p:nvSpPr>
-          <p:cNvPr id="4" name="Rectangle 3">
-            <a:extLst>
-              <a:ext uri="{FF2B5EF4-FFF2-40B4-BE49-F238E27FC236}">
-                <a16:creationId xmlns:a16="http://schemas.microsoft.com/office/drawing/2014/main" id="{7E8188E3-5A1D-0F07-4E23-75E8FF438511}"/>
-              </a:ext>
-            </a:extLst>
-          </p:cNvPr>
-          <p:cNvSpPr/>
-          <p:nvPr/>
-        </p:nvSpPr>
-        <p:spPr>
-          <a:xfrm>
-            <a:off x="0" y="0"/>
-            <a:ext cx="12192000" cy="468086"/>
-          </a:xfrm>
-          <a:prstGeom prst="rect">
-            <a:avLst/>
-          </a:prstGeom>
-          <a:solidFill>
-            <a:schemeClr val="bg2"/>
-          </a:solidFill>
-          <a:ln>
-            <a:noFill/>
-          </a:ln>
-        </p:spPr>
-        <p:style>
-          <a:lnRef idx="2">
-            <a:schemeClr val="accent1">
-              <a:shade val="15000"/>
-            </a:schemeClr>
-          </a:lnRef>
-          <a:fillRef idx="1">
-            <a:schemeClr val="accent1"/>
-          </a:fillRef>
-          <a:effectRef idx="0">
-            <a:schemeClr val="accent1"/>
-          </a:effectRef>
-          <a:fontRef idx="minor">
-            <a:schemeClr val="lt1"/>
-          </a:fontRef>
-        </p:style>
-        <p:txBody>
-          <a:bodyPr rtlCol="0" anchor="ctr"/>
-          <a:lstStyle/>
-          <a:p>
-            <a:pPr algn="ctr"/>
-            <a:endParaRPr lang="en-US" sz="1351"/>
-          </a:p>
-        </p:txBody>
-      </p:sp>
-      <p:sp>
-        <p:nvSpPr>
-          <p:cNvPr id="5" name="Oval 4">
-            <a:extLst>
-              <a:ext uri="{FF2B5EF4-FFF2-40B4-BE49-F238E27FC236}">
-                <a16:creationId xmlns:a16="http://schemas.microsoft.com/office/drawing/2014/main" id="{FF5C2771-8DC9-909F-5172-2F9F7AD93016}"/>
-              </a:ext>
-            </a:extLst>
-          </p:cNvPr>
-          <p:cNvSpPr/>
-          <p:nvPr/>
-        </p:nvSpPr>
-        <p:spPr>
-          <a:xfrm>
-            <a:off x="129189" y="108651"/>
-            <a:ext cx="246109" cy="250784"/>
-          </a:xfrm>
-          <a:prstGeom prst="ellipse">
-            <a:avLst/>
-          </a:prstGeom>
-          <a:solidFill>
-            <a:schemeClr val="accent1"/>
-          </a:solidFill>
-          <a:ln>
-            <a:noFill/>
-          </a:ln>
-        </p:spPr>
-        <p:style>
-          <a:lnRef idx="2">
-            <a:schemeClr val="accent1">
-              <a:shade val="15000"/>
-            </a:schemeClr>
-          </a:lnRef>
-          <a:fillRef idx="1">
-            <a:schemeClr val="accent1"/>
-          </a:fillRef>
-          <a:effectRef idx="0">
-            <a:schemeClr val="accent1"/>
-          </a:effectRef>
-          <a:fontRef idx="minor">
-            <a:schemeClr val="lt1"/>
-          </a:fontRef>
-        </p:style>
-        <p:txBody>
-          <a:bodyPr rtlCol="0" anchor="ctr"/>
-          <a:lstStyle/>
-          <a:p>
-            <a:pPr algn="ctr"/>
-            <a:endParaRPr lang="en-US"/>
-          </a:p>
-        </p:txBody>
-      </p:sp>
-      <p:sp>
-        <p:nvSpPr>
-          <p:cNvPr id="8" name="Oval 7">
-            <a:extLst>
-              <a:ext uri="{FF2B5EF4-FFF2-40B4-BE49-F238E27FC236}">
-                <a16:creationId xmlns:a16="http://schemas.microsoft.com/office/drawing/2014/main" id="{2C834065-65FA-9CCD-7DF8-CF08A6A2E486}"/>
-              </a:ext>
-            </a:extLst>
-          </p:cNvPr>
-          <p:cNvSpPr/>
-          <p:nvPr/>
-        </p:nvSpPr>
-        <p:spPr>
-          <a:xfrm>
-            <a:off x="504487" y="113785"/>
-            <a:ext cx="246109" cy="250784"/>
-          </a:xfrm>
-          <a:prstGeom prst="ellipse">
-            <a:avLst/>
-          </a:prstGeom>
-          <a:solidFill>
-            <a:schemeClr val="accent3"/>
-          </a:solidFill>
-          <a:ln>
-            <a:noFill/>
-          </a:ln>
-        </p:spPr>
-        <p:style>
-          <a:lnRef idx="2">
-            <a:schemeClr val="accent1">
-              <a:shade val="15000"/>
-            </a:schemeClr>
-          </a:lnRef>
-          <a:fillRef idx="1">
-            <a:schemeClr val="accent1"/>
-          </a:fillRef>
-          <a:effectRef idx="0">
-            <a:schemeClr val="accent1"/>
-          </a:effectRef>
-          <a:fontRef idx="minor">
-            <a:schemeClr val="lt1"/>
-          </a:fontRef>
-        </p:style>
-        <p:txBody>
-          <a:bodyPr rtlCol="0" anchor="ctr"/>
-          <a:lstStyle/>
-          <a:p>
-            <a:pPr algn="ctr"/>
-            <a:endParaRPr lang="en-US"/>
-          </a:p>
-        </p:txBody>
-      </p:sp>
-      <p:sp>
-        <p:nvSpPr>
-          <p:cNvPr id="9" name="Oval 8">
-            <a:extLst>
-              <a:ext uri="{FF2B5EF4-FFF2-40B4-BE49-F238E27FC236}">
-                <a16:creationId xmlns:a16="http://schemas.microsoft.com/office/drawing/2014/main" id="{AE07ABF5-DDAE-F9B9-6072-3977F7C78F70}"/>
-              </a:ext>
-            </a:extLst>
-          </p:cNvPr>
-          <p:cNvSpPr/>
-          <p:nvPr/>
-        </p:nvSpPr>
-        <p:spPr>
-          <a:xfrm>
-            <a:off x="879785" y="108651"/>
-            <a:ext cx="246109" cy="250784"/>
-          </a:xfrm>
-          <a:prstGeom prst="ellipse">
-            <a:avLst/>
-          </a:prstGeom>
-          <a:solidFill>
-            <a:schemeClr val="accent2"/>
-          </a:solidFill>
-          <a:ln>
-            <a:noFill/>
-          </a:ln>
-        </p:spPr>
-        <p:style>
-          <a:lnRef idx="2">
-            <a:schemeClr val="accent1">
-              <a:shade val="15000"/>
-            </a:schemeClr>
-          </a:lnRef>
-          <a:fillRef idx="1">
-            <a:schemeClr val="accent1"/>
-          </a:fillRef>
-          <a:effectRef idx="0">
-            <a:schemeClr val="accent1"/>
-          </a:effectRef>
-          <a:fontRef idx="minor">
-            <a:schemeClr val="lt1"/>
-          </a:fontRef>
-        </p:style>
-        <p:txBody>
-          <a:bodyPr rtlCol="0" anchor="ctr"/>
-          <a:lstStyle/>
-          <a:p>
-            <a:pPr algn="ctr"/>
-            <a:endParaRPr lang="en-US"/>
-          </a:p>
-        </p:txBody>
-      </p:sp>
-    </p:spTree>
-    <p:extLst>
-      <p:ext uri="{BB962C8B-B14F-4D97-AF65-F5344CB8AC3E}">
-        <p14:creationId xmlns:p14="http://schemas.microsoft.com/office/powerpoint/2010/main" val="3146655257"/>
-      </p:ext>
-    </p:extLst>
-  </p:cSld>
-  <p:clrMapOvr>
-    <a:masterClrMapping/>
-  </p:clrMapOvr>
-</p:sld>
-</file>
-
-<file path=ppt/slides/slide18.xml><?xml version="1.0" encoding="utf-8"?>
 <p:sld xmlns:a="http://schemas.openxmlformats.org/drawingml/2006/main" xmlns:r="http://schemas.openxmlformats.org/officeDocument/2006/relationships" xmlns:p="http://schemas.openxmlformats.org/presentationml/2006/main">
   <p:cSld>
     <p:spTree>
@@ -6763,7 +6275,7 @@
 </p:sld>
 </file>
 
-<file path=ppt/slides/slide19.xml><?xml version="1.0" encoding="utf-8"?>
+<file path=ppt/slides/slide18.xml><?xml version="1.0" encoding="utf-8"?>
 <p:sld xmlns:a="http://schemas.openxmlformats.org/drawingml/2006/main" xmlns:r="http://schemas.openxmlformats.org/officeDocument/2006/relationships" xmlns:p="http://schemas.openxmlformats.org/presentationml/2006/main">
   <p:cSld>
     <p:spTree>
@@ -6771,7 +6283,7 @@
         <p:cNvPr id="1" name="">
           <a:extLst>
             <a:ext uri="{FF2B5EF4-FFF2-40B4-BE49-F238E27FC236}">
-              <a16:creationId xmlns:a16="http://schemas.microsoft.com/office/drawing/2014/main" id="{3231F165-B681-D9FA-4D2B-714BF70F2004}"/>
+              <a16:creationId xmlns:a16="http://schemas.microsoft.com/office/drawing/2014/main" id="{FBB8BBEA-B72C-22D9-9A34-E8E7E253C9C4}"/>
             </a:ext>
           </a:extLst>
         </p:cNvPr>
@@ -6788,40 +6300,10 @@
       </p:grpSpPr>
       <p:sp>
         <p:nvSpPr>
-          <p:cNvPr id="6" name="Title 5">
-            <a:extLst>
-              <a:ext uri="{FF2B5EF4-FFF2-40B4-BE49-F238E27FC236}">
-                <a16:creationId xmlns:a16="http://schemas.microsoft.com/office/drawing/2014/main" id="{3602F572-AA51-50B4-A0D2-C315C4F732AB}"/>
-              </a:ext>
-            </a:extLst>
-          </p:cNvPr>
-          <p:cNvSpPr>
-            <a:spLocks noGrp="1"/>
-          </p:cNvSpPr>
-          <p:nvPr>
-            <p:ph type="title"/>
-          </p:nvPr>
-        </p:nvSpPr>
-        <p:spPr>
-          <a:xfrm>
-            <a:off x="838200" y="694547"/>
-            <a:ext cx="10515600" cy="1325563"/>
-          </a:xfrm>
-        </p:spPr>
-        <p:txBody>
-          <a:bodyPr/>
-          <a:lstStyle/>
-          <a:p>
-            <a:endParaRPr lang="en-US" dirty="0"/>
-          </a:p>
-        </p:txBody>
-      </p:sp>
-      <p:sp>
-        <p:nvSpPr>
           <p:cNvPr id="7" name="Content Placeholder 6">
             <a:extLst>
               <a:ext uri="{FF2B5EF4-FFF2-40B4-BE49-F238E27FC236}">
-                <a16:creationId xmlns:a16="http://schemas.microsoft.com/office/drawing/2014/main" id="{A30924BE-36D4-908A-5B16-04207EDF2F44}"/>
+                <a16:creationId xmlns:a16="http://schemas.microsoft.com/office/drawing/2014/main" id="{CE5E54DB-0E08-3A30-5E8E-BF61A8B4F450}"/>
               </a:ext>
             </a:extLst>
           </p:cNvPr>
@@ -6834,8 +6316,8 @@
         </p:nvSpPr>
         <p:spPr>
           <a:xfrm>
-            <a:off x="838200" y="2254763"/>
-            <a:ext cx="10515600" cy="3922201"/>
+            <a:off x="838200" y="988399"/>
+            <a:ext cx="10515600" cy="5188566"/>
           </a:xfrm>
         </p:spPr>
         <p:txBody>
@@ -6851,7 +6333,7 @@
           <p:cNvPr id="4" name="Rectangle 3">
             <a:extLst>
               <a:ext uri="{FF2B5EF4-FFF2-40B4-BE49-F238E27FC236}">
-                <a16:creationId xmlns:a16="http://schemas.microsoft.com/office/drawing/2014/main" id="{1DA4E887-7982-8D5D-A2C0-6F1DE31EC691}"/>
+                <a16:creationId xmlns:a16="http://schemas.microsoft.com/office/drawing/2014/main" id="{96C3D7A8-F041-A238-5F17-8EA308298ED4}"/>
               </a:ext>
             </a:extLst>
           </p:cNvPr>
@@ -6903,7 +6385,7 @@
           <p:cNvPr id="5" name="Oval 4">
             <a:extLst>
               <a:ext uri="{FF2B5EF4-FFF2-40B4-BE49-F238E27FC236}">
-                <a16:creationId xmlns:a16="http://schemas.microsoft.com/office/drawing/2014/main" id="{011EDBC1-57CC-F2FB-F2AE-BE64616188F9}"/>
+                <a16:creationId xmlns:a16="http://schemas.microsoft.com/office/drawing/2014/main" id="{99F86D32-6AF1-5091-CF8E-1DB773B48698}"/>
               </a:ext>
             </a:extLst>
           </p:cNvPr>
@@ -6955,7 +6437,7 @@
           <p:cNvPr id="8" name="Oval 7">
             <a:extLst>
               <a:ext uri="{FF2B5EF4-FFF2-40B4-BE49-F238E27FC236}">
-                <a16:creationId xmlns:a16="http://schemas.microsoft.com/office/drawing/2014/main" id="{D6E5050B-BC0F-3084-03C1-63B4D0B1E430}"/>
+                <a16:creationId xmlns:a16="http://schemas.microsoft.com/office/drawing/2014/main" id="{E27E168E-475D-9784-12F7-4755DE03D82C}"/>
               </a:ext>
             </a:extLst>
           </p:cNvPr>
@@ -7007,7 +6489,7 @@
           <p:cNvPr id="9" name="Oval 8">
             <a:extLst>
               <a:ext uri="{FF2B5EF4-FFF2-40B4-BE49-F238E27FC236}">
-                <a16:creationId xmlns:a16="http://schemas.microsoft.com/office/drawing/2014/main" id="{A14FF317-6D55-53FB-42BC-937E175430ED}"/>
+                <a16:creationId xmlns:a16="http://schemas.microsoft.com/office/drawing/2014/main" id="{357E7E89-FC59-E0AB-1CB0-FAB110DBE5D1}"/>
               </a:ext>
             </a:extLst>
           </p:cNvPr>
@@ -7057,7 +6539,281 @@
     </p:spTree>
     <p:extLst>
       <p:ext uri="{BB962C8B-B14F-4D97-AF65-F5344CB8AC3E}">
-        <p14:creationId xmlns:p14="http://schemas.microsoft.com/office/powerpoint/2010/main" val="3040051952"/>
+        <p14:creationId xmlns:p14="http://schemas.microsoft.com/office/powerpoint/2010/main" val="3651787086"/>
+      </p:ext>
+    </p:extLst>
+  </p:cSld>
+  <p:clrMapOvr>
+    <a:masterClrMapping/>
+  </p:clrMapOvr>
+</p:sld>
+</file>
+
+<file path=ppt/slides/slide19.xml><?xml version="1.0" encoding="utf-8"?>
+<p:sld xmlns:a="http://schemas.openxmlformats.org/drawingml/2006/main" xmlns:r="http://schemas.openxmlformats.org/officeDocument/2006/relationships" xmlns:p="http://schemas.openxmlformats.org/presentationml/2006/main">
+  <p:cSld>
+    <p:spTree>
+      <p:nvGrpSpPr>
+        <p:cNvPr id="1" name="">
+          <a:extLst>
+            <a:ext uri="{FF2B5EF4-FFF2-40B4-BE49-F238E27FC236}">
+              <a16:creationId xmlns:a16="http://schemas.microsoft.com/office/drawing/2014/main" id="{4006BBBD-5C09-5940-6E05-8F30A57A4832}"/>
+            </a:ext>
+          </a:extLst>
+        </p:cNvPr>
+        <p:cNvGrpSpPr/>
+        <p:nvPr/>
+      </p:nvGrpSpPr>
+      <p:grpSpPr>
+        <a:xfrm>
+          <a:off x="0" y="0"/>
+          <a:ext cx="0" cy="0"/>
+          <a:chOff x="0" y="0"/>
+          <a:chExt cx="0" cy="0"/>
+        </a:xfrm>
+      </p:grpSpPr>
+      <p:sp>
+        <p:nvSpPr>
+          <p:cNvPr id="7" name="Content Placeholder 6">
+            <a:extLst>
+              <a:ext uri="{FF2B5EF4-FFF2-40B4-BE49-F238E27FC236}">
+                <a16:creationId xmlns:a16="http://schemas.microsoft.com/office/drawing/2014/main" id="{218FEBD3-B021-F0B6-B437-500EF2EE52D5}"/>
+              </a:ext>
+            </a:extLst>
+          </p:cNvPr>
+          <p:cNvSpPr>
+            <a:spLocks noGrp="1"/>
+          </p:cNvSpPr>
+          <p:nvPr>
+            <p:ph idx="1"/>
+          </p:nvPr>
+        </p:nvSpPr>
+        <p:spPr>
+          <a:xfrm>
+            <a:off x="838200" y="988399"/>
+            <a:ext cx="10515600" cy="5188566"/>
+          </a:xfrm>
+        </p:spPr>
+        <p:txBody>
+          <a:bodyPr/>
+          <a:lstStyle/>
+          <a:p>
+            <a:endParaRPr lang="en-US" dirty="0"/>
+          </a:p>
+        </p:txBody>
+      </p:sp>
+      <p:sp>
+        <p:nvSpPr>
+          <p:cNvPr id="4" name="Rectangle 3">
+            <a:extLst>
+              <a:ext uri="{FF2B5EF4-FFF2-40B4-BE49-F238E27FC236}">
+                <a16:creationId xmlns:a16="http://schemas.microsoft.com/office/drawing/2014/main" id="{6B734884-79B7-E49D-F8B9-7E24B1A4F9BC}"/>
+              </a:ext>
+            </a:extLst>
+          </p:cNvPr>
+          <p:cNvSpPr/>
+          <p:nvPr/>
+        </p:nvSpPr>
+        <p:spPr>
+          <a:xfrm>
+            <a:off x="0" y="0"/>
+            <a:ext cx="12192000" cy="468086"/>
+          </a:xfrm>
+          <a:prstGeom prst="rect">
+            <a:avLst/>
+          </a:prstGeom>
+          <a:solidFill>
+            <a:schemeClr val="bg2"/>
+          </a:solidFill>
+          <a:ln>
+            <a:noFill/>
+          </a:ln>
+        </p:spPr>
+        <p:style>
+          <a:lnRef idx="2">
+            <a:schemeClr val="accent1">
+              <a:shade val="15000"/>
+            </a:schemeClr>
+          </a:lnRef>
+          <a:fillRef idx="1">
+            <a:schemeClr val="accent1"/>
+          </a:fillRef>
+          <a:effectRef idx="0">
+            <a:schemeClr val="accent1"/>
+          </a:effectRef>
+          <a:fontRef idx="minor">
+            <a:schemeClr val="lt1"/>
+          </a:fontRef>
+        </p:style>
+        <p:txBody>
+          <a:bodyPr rtlCol="0" anchor="ctr"/>
+          <a:lstStyle/>
+          <a:p>
+            <a:pPr algn="ctr"/>
+            <a:endParaRPr lang="en-US" sz="1351"/>
+          </a:p>
+        </p:txBody>
+      </p:sp>
+      <p:sp>
+        <p:nvSpPr>
+          <p:cNvPr id="5" name="Oval 4">
+            <a:extLst>
+              <a:ext uri="{FF2B5EF4-FFF2-40B4-BE49-F238E27FC236}">
+                <a16:creationId xmlns:a16="http://schemas.microsoft.com/office/drawing/2014/main" id="{31E2FBF8-7E8C-B581-F42E-91DC5F9BE2A8}"/>
+              </a:ext>
+            </a:extLst>
+          </p:cNvPr>
+          <p:cNvSpPr/>
+          <p:nvPr/>
+        </p:nvSpPr>
+        <p:spPr>
+          <a:xfrm>
+            <a:off x="129189" y="108651"/>
+            <a:ext cx="246109" cy="250784"/>
+          </a:xfrm>
+          <a:prstGeom prst="ellipse">
+            <a:avLst/>
+          </a:prstGeom>
+          <a:solidFill>
+            <a:schemeClr val="accent1"/>
+          </a:solidFill>
+          <a:ln>
+            <a:noFill/>
+          </a:ln>
+        </p:spPr>
+        <p:style>
+          <a:lnRef idx="2">
+            <a:schemeClr val="accent1">
+              <a:shade val="15000"/>
+            </a:schemeClr>
+          </a:lnRef>
+          <a:fillRef idx="1">
+            <a:schemeClr val="accent1"/>
+          </a:fillRef>
+          <a:effectRef idx="0">
+            <a:schemeClr val="accent1"/>
+          </a:effectRef>
+          <a:fontRef idx="minor">
+            <a:schemeClr val="lt1"/>
+          </a:fontRef>
+        </p:style>
+        <p:txBody>
+          <a:bodyPr rtlCol="0" anchor="ctr"/>
+          <a:lstStyle/>
+          <a:p>
+            <a:pPr algn="ctr"/>
+            <a:endParaRPr lang="en-US"/>
+          </a:p>
+        </p:txBody>
+      </p:sp>
+      <p:sp>
+        <p:nvSpPr>
+          <p:cNvPr id="8" name="Oval 7">
+            <a:extLst>
+              <a:ext uri="{FF2B5EF4-FFF2-40B4-BE49-F238E27FC236}">
+                <a16:creationId xmlns:a16="http://schemas.microsoft.com/office/drawing/2014/main" id="{FC2F5809-2092-24E4-BC04-43C924B5C83A}"/>
+              </a:ext>
+            </a:extLst>
+          </p:cNvPr>
+          <p:cNvSpPr/>
+          <p:nvPr/>
+        </p:nvSpPr>
+        <p:spPr>
+          <a:xfrm>
+            <a:off x="504487" y="113785"/>
+            <a:ext cx="246109" cy="250784"/>
+          </a:xfrm>
+          <a:prstGeom prst="ellipse">
+            <a:avLst/>
+          </a:prstGeom>
+          <a:solidFill>
+            <a:schemeClr val="accent3"/>
+          </a:solidFill>
+          <a:ln>
+            <a:noFill/>
+          </a:ln>
+        </p:spPr>
+        <p:style>
+          <a:lnRef idx="2">
+            <a:schemeClr val="accent1">
+              <a:shade val="15000"/>
+            </a:schemeClr>
+          </a:lnRef>
+          <a:fillRef idx="1">
+            <a:schemeClr val="accent1"/>
+          </a:fillRef>
+          <a:effectRef idx="0">
+            <a:schemeClr val="accent1"/>
+          </a:effectRef>
+          <a:fontRef idx="minor">
+            <a:schemeClr val="lt1"/>
+          </a:fontRef>
+        </p:style>
+        <p:txBody>
+          <a:bodyPr rtlCol="0" anchor="ctr"/>
+          <a:lstStyle/>
+          <a:p>
+            <a:pPr algn="ctr"/>
+            <a:endParaRPr lang="en-US"/>
+          </a:p>
+        </p:txBody>
+      </p:sp>
+      <p:sp>
+        <p:nvSpPr>
+          <p:cNvPr id="9" name="Oval 8">
+            <a:extLst>
+              <a:ext uri="{FF2B5EF4-FFF2-40B4-BE49-F238E27FC236}">
+                <a16:creationId xmlns:a16="http://schemas.microsoft.com/office/drawing/2014/main" id="{D9172223-9867-C64D-D19E-6C8E4EEA16E7}"/>
+              </a:ext>
+            </a:extLst>
+          </p:cNvPr>
+          <p:cNvSpPr/>
+          <p:nvPr/>
+        </p:nvSpPr>
+        <p:spPr>
+          <a:xfrm>
+            <a:off x="879785" y="108651"/>
+            <a:ext cx="246109" cy="250784"/>
+          </a:xfrm>
+          <a:prstGeom prst="ellipse">
+            <a:avLst/>
+          </a:prstGeom>
+          <a:solidFill>
+            <a:schemeClr val="accent2"/>
+          </a:solidFill>
+          <a:ln>
+            <a:noFill/>
+          </a:ln>
+        </p:spPr>
+        <p:style>
+          <a:lnRef idx="2">
+            <a:schemeClr val="accent1">
+              <a:shade val="15000"/>
+            </a:schemeClr>
+          </a:lnRef>
+          <a:fillRef idx="1">
+            <a:schemeClr val="accent1"/>
+          </a:fillRef>
+          <a:effectRef idx="0">
+            <a:schemeClr val="accent1"/>
+          </a:effectRef>
+          <a:fontRef idx="minor">
+            <a:schemeClr val="lt1"/>
+          </a:fontRef>
+        </p:style>
+        <p:txBody>
+          <a:bodyPr rtlCol="0" anchor="ctr"/>
+          <a:lstStyle/>
+          <a:p>
+            <a:pPr algn="ctr"/>
+            <a:endParaRPr lang="en-US"/>
+          </a:p>
+        </p:txBody>
+      </p:sp>
+    </p:spTree>
+    <p:extLst>
+      <p:ext uri="{BB962C8B-B14F-4D97-AF65-F5344CB8AC3E}">
+        <p14:creationId xmlns:p14="http://schemas.microsoft.com/office/powerpoint/2010/main" val="3868304331"/>
       </p:ext>
     </p:extLst>
   </p:cSld>
@@ -7583,7 +7339,7 @@
         <p:cNvPr id="1" name="">
           <a:extLst>
             <a:ext uri="{FF2B5EF4-FFF2-40B4-BE49-F238E27FC236}">
-              <a16:creationId xmlns:a16="http://schemas.microsoft.com/office/drawing/2014/main" id="{E270BC7D-9A45-3697-43B3-65F2DB2FAEC3}"/>
+              <a16:creationId xmlns:a16="http://schemas.microsoft.com/office/drawing/2014/main" id="{32BEE9FE-735E-DBE7-AEFF-6CA50E45287F}"/>
             </a:ext>
           </a:extLst>
         </p:cNvPr>
@@ -7600,40 +7356,10 @@
       </p:grpSpPr>
       <p:sp>
         <p:nvSpPr>
-          <p:cNvPr id="6" name="Title 5">
-            <a:extLst>
-              <a:ext uri="{FF2B5EF4-FFF2-40B4-BE49-F238E27FC236}">
-                <a16:creationId xmlns:a16="http://schemas.microsoft.com/office/drawing/2014/main" id="{F39F9076-49A8-2E00-699B-EC1A8710713C}"/>
-              </a:ext>
-            </a:extLst>
-          </p:cNvPr>
-          <p:cNvSpPr>
-            <a:spLocks noGrp="1"/>
-          </p:cNvSpPr>
-          <p:nvPr>
-            <p:ph type="title"/>
-          </p:nvPr>
-        </p:nvSpPr>
-        <p:spPr>
-          <a:xfrm>
-            <a:off x="838200" y="694547"/>
-            <a:ext cx="10515600" cy="1325563"/>
-          </a:xfrm>
-        </p:spPr>
-        <p:txBody>
-          <a:bodyPr/>
-          <a:lstStyle/>
-          <a:p>
-            <a:endParaRPr lang="en-US" dirty="0"/>
-          </a:p>
-        </p:txBody>
-      </p:sp>
-      <p:sp>
-        <p:nvSpPr>
           <p:cNvPr id="7" name="Content Placeholder 6">
             <a:extLst>
               <a:ext uri="{FF2B5EF4-FFF2-40B4-BE49-F238E27FC236}">
-                <a16:creationId xmlns:a16="http://schemas.microsoft.com/office/drawing/2014/main" id="{1A8E1FB8-C8B4-E33B-7791-E5E22359ACF6}"/>
+                <a16:creationId xmlns:a16="http://schemas.microsoft.com/office/drawing/2014/main" id="{B7F217C8-13EE-6DE9-4130-6DEE15382423}"/>
               </a:ext>
             </a:extLst>
           </p:cNvPr>
@@ -7646,8 +7372,8 @@
         </p:nvSpPr>
         <p:spPr>
           <a:xfrm>
-            <a:off x="838200" y="2254763"/>
-            <a:ext cx="10515600" cy="3922201"/>
+            <a:off x="838200" y="988399"/>
+            <a:ext cx="10515600" cy="5188566"/>
           </a:xfrm>
         </p:spPr>
         <p:txBody>
@@ -7663,7 +7389,7 @@
           <p:cNvPr id="4" name="Rectangle 3">
             <a:extLst>
               <a:ext uri="{FF2B5EF4-FFF2-40B4-BE49-F238E27FC236}">
-                <a16:creationId xmlns:a16="http://schemas.microsoft.com/office/drawing/2014/main" id="{75DC3E03-43BB-B308-7A03-4DE02C810697}"/>
+                <a16:creationId xmlns:a16="http://schemas.microsoft.com/office/drawing/2014/main" id="{A1749CB8-47BC-D299-3D60-7B5E02CCEDC6}"/>
               </a:ext>
             </a:extLst>
           </p:cNvPr>
@@ -7715,7 +7441,7 @@
           <p:cNvPr id="5" name="Oval 4">
             <a:extLst>
               <a:ext uri="{FF2B5EF4-FFF2-40B4-BE49-F238E27FC236}">
-                <a16:creationId xmlns:a16="http://schemas.microsoft.com/office/drawing/2014/main" id="{7EEFF97A-548A-7A29-944A-F432CFC8908D}"/>
+                <a16:creationId xmlns:a16="http://schemas.microsoft.com/office/drawing/2014/main" id="{06DD29D1-9863-6BAC-D8D2-246034C9F638}"/>
               </a:ext>
             </a:extLst>
           </p:cNvPr>
@@ -7767,7 +7493,7 @@
           <p:cNvPr id="8" name="Oval 7">
             <a:extLst>
               <a:ext uri="{FF2B5EF4-FFF2-40B4-BE49-F238E27FC236}">
-                <a16:creationId xmlns:a16="http://schemas.microsoft.com/office/drawing/2014/main" id="{0F7C0D55-1705-9686-E38D-532FFDD45CF5}"/>
+                <a16:creationId xmlns:a16="http://schemas.microsoft.com/office/drawing/2014/main" id="{DFB32E11-85C1-B765-2B6C-2C0E033E888D}"/>
               </a:ext>
             </a:extLst>
           </p:cNvPr>
@@ -7819,7 +7545,7 @@
           <p:cNvPr id="9" name="Oval 8">
             <a:extLst>
               <a:ext uri="{FF2B5EF4-FFF2-40B4-BE49-F238E27FC236}">
-                <a16:creationId xmlns:a16="http://schemas.microsoft.com/office/drawing/2014/main" id="{6AFD2D3A-491F-85C2-191F-50D1C979132D}"/>
+                <a16:creationId xmlns:a16="http://schemas.microsoft.com/office/drawing/2014/main" id="{7C3B64ED-770C-A9C9-325E-D4068910481D}"/>
               </a:ext>
             </a:extLst>
           </p:cNvPr>
@@ -7869,7 +7595,7 @@
     </p:spTree>
     <p:extLst>
       <p:ext uri="{BB962C8B-B14F-4D97-AF65-F5344CB8AC3E}">
-        <p14:creationId xmlns:p14="http://schemas.microsoft.com/office/powerpoint/2010/main" val="3396782613"/>
+        <p14:creationId xmlns:p14="http://schemas.microsoft.com/office/powerpoint/2010/main" val="3093505509"/>
       </p:ext>
     </p:extLst>
   </p:cSld>
@@ -7887,7 +7613,7 @@
         <p:cNvPr id="1" name="">
           <a:extLst>
             <a:ext uri="{FF2B5EF4-FFF2-40B4-BE49-F238E27FC236}">
-              <a16:creationId xmlns:a16="http://schemas.microsoft.com/office/drawing/2014/main" id="{60979E74-6FFE-F77E-F06D-BE92D1695D98}"/>
+              <a16:creationId xmlns:a16="http://schemas.microsoft.com/office/drawing/2014/main" id="{4C8068A4-40B4-C9D4-BD02-491C5B7FB052}"/>
             </a:ext>
           </a:extLst>
         </p:cNvPr>
@@ -7904,40 +7630,10 @@
       </p:grpSpPr>
       <p:sp>
         <p:nvSpPr>
-          <p:cNvPr id="6" name="Title 5">
-            <a:extLst>
-              <a:ext uri="{FF2B5EF4-FFF2-40B4-BE49-F238E27FC236}">
-                <a16:creationId xmlns:a16="http://schemas.microsoft.com/office/drawing/2014/main" id="{F07CBD58-F80D-AA84-C51A-5171B453B2C0}"/>
-              </a:ext>
-            </a:extLst>
-          </p:cNvPr>
-          <p:cNvSpPr>
-            <a:spLocks noGrp="1"/>
-          </p:cNvSpPr>
-          <p:nvPr>
-            <p:ph type="title"/>
-          </p:nvPr>
-        </p:nvSpPr>
-        <p:spPr>
-          <a:xfrm>
-            <a:off x="838200" y="694547"/>
-            <a:ext cx="10515600" cy="1325563"/>
-          </a:xfrm>
-        </p:spPr>
-        <p:txBody>
-          <a:bodyPr/>
-          <a:lstStyle/>
-          <a:p>
-            <a:endParaRPr lang="en-US" dirty="0"/>
-          </a:p>
-        </p:txBody>
-      </p:sp>
-      <p:sp>
-        <p:nvSpPr>
           <p:cNvPr id="7" name="Content Placeholder 6">
             <a:extLst>
               <a:ext uri="{FF2B5EF4-FFF2-40B4-BE49-F238E27FC236}">
-                <a16:creationId xmlns:a16="http://schemas.microsoft.com/office/drawing/2014/main" id="{2DF87FB7-4F8C-3129-F245-8E922573B243}"/>
+                <a16:creationId xmlns:a16="http://schemas.microsoft.com/office/drawing/2014/main" id="{B7824B80-2897-830F-34D5-3E02FE6DABB8}"/>
               </a:ext>
             </a:extLst>
           </p:cNvPr>
@@ -7950,8 +7646,8 @@
         </p:nvSpPr>
         <p:spPr>
           <a:xfrm>
-            <a:off x="838200" y="2254763"/>
-            <a:ext cx="10515600" cy="3922201"/>
+            <a:off x="838200" y="988399"/>
+            <a:ext cx="10515600" cy="5188566"/>
           </a:xfrm>
         </p:spPr>
         <p:txBody>
@@ -7967,7 +7663,7 @@
           <p:cNvPr id="4" name="Rectangle 3">
             <a:extLst>
               <a:ext uri="{FF2B5EF4-FFF2-40B4-BE49-F238E27FC236}">
-                <a16:creationId xmlns:a16="http://schemas.microsoft.com/office/drawing/2014/main" id="{FA314FEC-46F7-C49E-565C-4DE857DFED4C}"/>
+                <a16:creationId xmlns:a16="http://schemas.microsoft.com/office/drawing/2014/main" id="{D598E26D-29EF-ECA1-79BA-FF79AAC7CAF0}"/>
               </a:ext>
             </a:extLst>
           </p:cNvPr>
@@ -8019,7 +7715,7 @@
           <p:cNvPr id="5" name="Oval 4">
             <a:extLst>
               <a:ext uri="{FF2B5EF4-FFF2-40B4-BE49-F238E27FC236}">
-                <a16:creationId xmlns:a16="http://schemas.microsoft.com/office/drawing/2014/main" id="{0D58C3B6-7E3B-CB30-4C84-D4E936444435}"/>
+                <a16:creationId xmlns:a16="http://schemas.microsoft.com/office/drawing/2014/main" id="{E4269344-8580-7C33-2103-8527A67BD717}"/>
               </a:ext>
             </a:extLst>
           </p:cNvPr>
@@ -8071,7 +7767,7 @@
           <p:cNvPr id="8" name="Oval 7">
             <a:extLst>
               <a:ext uri="{FF2B5EF4-FFF2-40B4-BE49-F238E27FC236}">
-                <a16:creationId xmlns:a16="http://schemas.microsoft.com/office/drawing/2014/main" id="{FD469E9E-75BB-C09E-2927-20178CD3C0A6}"/>
+                <a16:creationId xmlns:a16="http://schemas.microsoft.com/office/drawing/2014/main" id="{A78B6879-7BDB-4BBC-BF72-70E24FD34B65}"/>
               </a:ext>
             </a:extLst>
           </p:cNvPr>
@@ -8123,7 +7819,7 @@
           <p:cNvPr id="9" name="Oval 8">
             <a:extLst>
               <a:ext uri="{FF2B5EF4-FFF2-40B4-BE49-F238E27FC236}">
-                <a16:creationId xmlns:a16="http://schemas.microsoft.com/office/drawing/2014/main" id="{E5144132-DD81-0D74-910C-545308DFAFDE}"/>
+                <a16:creationId xmlns:a16="http://schemas.microsoft.com/office/drawing/2014/main" id="{9197FB46-B145-6CDA-F333-8A9C783D9C94}"/>
               </a:ext>
             </a:extLst>
           </p:cNvPr>
@@ -8173,7 +7869,7 @@
     </p:spTree>
     <p:extLst>
       <p:ext uri="{BB962C8B-B14F-4D97-AF65-F5344CB8AC3E}">
-        <p14:creationId xmlns:p14="http://schemas.microsoft.com/office/powerpoint/2010/main" val="822141317"/>
+        <p14:creationId xmlns:p14="http://schemas.microsoft.com/office/powerpoint/2010/main" val="3748489237"/>
       </p:ext>
     </p:extLst>
   </p:cSld>
@@ -8184,310 +7880,6 @@
 </file>
 
 <file path=ppt/slides/slide22.xml><?xml version="1.0" encoding="utf-8"?>
-<p:sld xmlns:a="http://schemas.openxmlformats.org/drawingml/2006/main" xmlns:r="http://schemas.openxmlformats.org/officeDocument/2006/relationships" xmlns:p="http://schemas.openxmlformats.org/presentationml/2006/main">
-  <p:cSld>
-    <p:spTree>
-      <p:nvGrpSpPr>
-        <p:cNvPr id="1" name="">
-          <a:extLst>
-            <a:ext uri="{FF2B5EF4-FFF2-40B4-BE49-F238E27FC236}">
-              <a16:creationId xmlns:a16="http://schemas.microsoft.com/office/drawing/2014/main" id="{4BFDF45E-EA34-FB0C-2837-D289EC723FFB}"/>
-            </a:ext>
-          </a:extLst>
-        </p:cNvPr>
-        <p:cNvGrpSpPr/>
-        <p:nvPr/>
-      </p:nvGrpSpPr>
-      <p:grpSpPr>
-        <a:xfrm>
-          <a:off x="0" y="0"/>
-          <a:ext cx="0" cy="0"/>
-          <a:chOff x="0" y="0"/>
-          <a:chExt cx="0" cy="0"/>
-        </a:xfrm>
-      </p:grpSpPr>
-      <p:sp>
-        <p:nvSpPr>
-          <p:cNvPr id="6" name="Title 5">
-            <a:extLst>
-              <a:ext uri="{FF2B5EF4-FFF2-40B4-BE49-F238E27FC236}">
-                <a16:creationId xmlns:a16="http://schemas.microsoft.com/office/drawing/2014/main" id="{E02253A1-0548-EB69-54A1-CA8B606AC150}"/>
-              </a:ext>
-            </a:extLst>
-          </p:cNvPr>
-          <p:cNvSpPr>
-            <a:spLocks noGrp="1"/>
-          </p:cNvSpPr>
-          <p:nvPr>
-            <p:ph type="title"/>
-          </p:nvPr>
-        </p:nvSpPr>
-        <p:spPr>
-          <a:xfrm>
-            <a:off x="838200" y="694547"/>
-            <a:ext cx="10515600" cy="1325563"/>
-          </a:xfrm>
-        </p:spPr>
-        <p:txBody>
-          <a:bodyPr/>
-          <a:lstStyle/>
-          <a:p>
-            <a:endParaRPr lang="en-US" dirty="0"/>
-          </a:p>
-        </p:txBody>
-      </p:sp>
-      <p:sp>
-        <p:nvSpPr>
-          <p:cNvPr id="7" name="Content Placeholder 6">
-            <a:extLst>
-              <a:ext uri="{FF2B5EF4-FFF2-40B4-BE49-F238E27FC236}">
-                <a16:creationId xmlns:a16="http://schemas.microsoft.com/office/drawing/2014/main" id="{0A1BF2A2-0CF1-26DA-AC69-E2F7F5D78762}"/>
-              </a:ext>
-            </a:extLst>
-          </p:cNvPr>
-          <p:cNvSpPr>
-            <a:spLocks noGrp="1"/>
-          </p:cNvSpPr>
-          <p:nvPr>
-            <p:ph idx="1"/>
-          </p:nvPr>
-        </p:nvSpPr>
-        <p:spPr>
-          <a:xfrm>
-            <a:off x="838200" y="2254763"/>
-            <a:ext cx="10515600" cy="3922201"/>
-          </a:xfrm>
-        </p:spPr>
-        <p:txBody>
-          <a:bodyPr/>
-          <a:lstStyle/>
-          <a:p>
-            <a:endParaRPr lang="en-US" dirty="0"/>
-          </a:p>
-        </p:txBody>
-      </p:sp>
-      <p:sp>
-        <p:nvSpPr>
-          <p:cNvPr id="4" name="Rectangle 3">
-            <a:extLst>
-              <a:ext uri="{FF2B5EF4-FFF2-40B4-BE49-F238E27FC236}">
-                <a16:creationId xmlns:a16="http://schemas.microsoft.com/office/drawing/2014/main" id="{406DF293-CFBA-D43D-B004-8AC5DBCA1A2B}"/>
-              </a:ext>
-            </a:extLst>
-          </p:cNvPr>
-          <p:cNvSpPr/>
-          <p:nvPr/>
-        </p:nvSpPr>
-        <p:spPr>
-          <a:xfrm>
-            <a:off x="0" y="0"/>
-            <a:ext cx="12192000" cy="468086"/>
-          </a:xfrm>
-          <a:prstGeom prst="rect">
-            <a:avLst/>
-          </a:prstGeom>
-          <a:solidFill>
-            <a:schemeClr val="bg2"/>
-          </a:solidFill>
-          <a:ln>
-            <a:noFill/>
-          </a:ln>
-        </p:spPr>
-        <p:style>
-          <a:lnRef idx="2">
-            <a:schemeClr val="accent1">
-              <a:shade val="15000"/>
-            </a:schemeClr>
-          </a:lnRef>
-          <a:fillRef idx="1">
-            <a:schemeClr val="accent1"/>
-          </a:fillRef>
-          <a:effectRef idx="0">
-            <a:schemeClr val="accent1"/>
-          </a:effectRef>
-          <a:fontRef idx="minor">
-            <a:schemeClr val="lt1"/>
-          </a:fontRef>
-        </p:style>
-        <p:txBody>
-          <a:bodyPr rtlCol="0" anchor="ctr"/>
-          <a:lstStyle/>
-          <a:p>
-            <a:pPr algn="ctr"/>
-            <a:endParaRPr lang="en-US" sz="1351"/>
-          </a:p>
-        </p:txBody>
-      </p:sp>
-      <p:sp>
-        <p:nvSpPr>
-          <p:cNvPr id="5" name="Oval 4">
-            <a:extLst>
-              <a:ext uri="{FF2B5EF4-FFF2-40B4-BE49-F238E27FC236}">
-                <a16:creationId xmlns:a16="http://schemas.microsoft.com/office/drawing/2014/main" id="{A4B8F599-64DE-E390-15AD-4744AC10C2B5}"/>
-              </a:ext>
-            </a:extLst>
-          </p:cNvPr>
-          <p:cNvSpPr/>
-          <p:nvPr/>
-        </p:nvSpPr>
-        <p:spPr>
-          <a:xfrm>
-            <a:off x="129189" y="108651"/>
-            <a:ext cx="246109" cy="250784"/>
-          </a:xfrm>
-          <a:prstGeom prst="ellipse">
-            <a:avLst/>
-          </a:prstGeom>
-          <a:solidFill>
-            <a:schemeClr val="accent1"/>
-          </a:solidFill>
-          <a:ln>
-            <a:noFill/>
-          </a:ln>
-        </p:spPr>
-        <p:style>
-          <a:lnRef idx="2">
-            <a:schemeClr val="accent1">
-              <a:shade val="15000"/>
-            </a:schemeClr>
-          </a:lnRef>
-          <a:fillRef idx="1">
-            <a:schemeClr val="accent1"/>
-          </a:fillRef>
-          <a:effectRef idx="0">
-            <a:schemeClr val="accent1"/>
-          </a:effectRef>
-          <a:fontRef idx="minor">
-            <a:schemeClr val="lt1"/>
-          </a:fontRef>
-        </p:style>
-        <p:txBody>
-          <a:bodyPr rtlCol="0" anchor="ctr"/>
-          <a:lstStyle/>
-          <a:p>
-            <a:pPr algn="ctr"/>
-            <a:endParaRPr lang="en-US"/>
-          </a:p>
-        </p:txBody>
-      </p:sp>
-      <p:sp>
-        <p:nvSpPr>
-          <p:cNvPr id="8" name="Oval 7">
-            <a:extLst>
-              <a:ext uri="{FF2B5EF4-FFF2-40B4-BE49-F238E27FC236}">
-                <a16:creationId xmlns:a16="http://schemas.microsoft.com/office/drawing/2014/main" id="{27E5A692-93ED-328A-5E4F-60FAFF09E51E}"/>
-              </a:ext>
-            </a:extLst>
-          </p:cNvPr>
-          <p:cNvSpPr/>
-          <p:nvPr/>
-        </p:nvSpPr>
-        <p:spPr>
-          <a:xfrm>
-            <a:off x="504487" y="113785"/>
-            <a:ext cx="246109" cy="250784"/>
-          </a:xfrm>
-          <a:prstGeom prst="ellipse">
-            <a:avLst/>
-          </a:prstGeom>
-          <a:solidFill>
-            <a:schemeClr val="accent3"/>
-          </a:solidFill>
-          <a:ln>
-            <a:noFill/>
-          </a:ln>
-        </p:spPr>
-        <p:style>
-          <a:lnRef idx="2">
-            <a:schemeClr val="accent1">
-              <a:shade val="15000"/>
-            </a:schemeClr>
-          </a:lnRef>
-          <a:fillRef idx="1">
-            <a:schemeClr val="accent1"/>
-          </a:fillRef>
-          <a:effectRef idx="0">
-            <a:schemeClr val="accent1"/>
-          </a:effectRef>
-          <a:fontRef idx="minor">
-            <a:schemeClr val="lt1"/>
-          </a:fontRef>
-        </p:style>
-        <p:txBody>
-          <a:bodyPr rtlCol="0" anchor="ctr"/>
-          <a:lstStyle/>
-          <a:p>
-            <a:pPr algn="ctr"/>
-            <a:endParaRPr lang="en-US"/>
-          </a:p>
-        </p:txBody>
-      </p:sp>
-      <p:sp>
-        <p:nvSpPr>
-          <p:cNvPr id="9" name="Oval 8">
-            <a:extLst>
-              <a:ext uri="{FF2B5EF4-FFF2-40B4-BE49-F238E27FC236}">
-                <a16:creationId xmlns:a16="http://schemas.microsoft.com/office/drawing/2014/main" id="{98873DBD-C16B-C14C-846D-8F5008436C9D}"/>
-              </a:ext>
-            </a:extLst>
-          </p:cNvPr>
-          <p:cNvSpPr/>
-          <p:nvPr/>
-        </p:nvSpPr>
-        <p:spPr>
-          <a:xfrm>
-            <a:off x="879785" y="108651"/>
-            <a:ext cx="246109" cy="250784"/>
-          </a:xfrm>
-          <a:prstGeom prst="ellipse">
-            <a:avLst/>
-          </a:prstGeom>
-          <a:solidFill>
-            <a:schemeClr val="accent2"/>
-          </a:solidFill>
-          <a:ln>
-            <a:noFill/>
-          </a:ln>
-        </p:spPr>
-        <p:style>
-          <a:lnRef idx="2">
-            <a:schemeClr val="accent1">
-              <a:shade val="15000"/>
-            </a:schemeClr>
-          </a:lnRef>
-          <a:fillRef idx="1">
-            <a:schemeClr val="accent1"/>
-          </a:fillRef>
-          <a:effectRef idx="0">
-            <a:schemeClr val="accent1"/>
-          </a:effectRef>
-          <a:fontRef idx="minor">
-            <a:schemeClr val="lt1"/>
-          </a:fontRef>
-        </p:style>
-        <p:txBody>
-          <a:bodyPr rtlCol="0" anchor="ctr"/>
-          <a:lstStyle/>
-          <a:p>
-            <a:pPr algn="ctr"/>
-            <a:endParaRPr lang="en-US"/>
-          </a:p>
-        </p:txBody>
-      </p:sp>
-    </p:spTree>
-    <p:extLst>
-      <p:ext uri="{BB962C8B-B14F-4D97-AF65-F5344CB8AC3E}">
-        <p14:creationId xmlns:p14="http://schemas.microsoft.com/office/powerpoint/2010/main" val="4138792433"/>
-      </p:ext>
-    </p:extLst>
-  </p:cSld>
-  <p:clrMapOvr>
-    <a:masterClrMapping/>
-  </p:clrMapOvr>
-</p:sld>
-</file>
-
-<file path=ppt/slides/slide23.xml><?xml version="1.0" encoding="utf-8"?>
 <p:sld xmlns:a="http://schemas.openxmlformats.org/drawingml/2006/main" xmlns:r="http://schemas.openxmlformats.org/officeDocument/2006/relationships" xmlns:p="http://schemas.openxmlformats.org/presentationml/2006/main">
   <p:cSld>
     <p:spTree>
@@ -8569,6 +7961,59 @@
           <a:bodyPr/>
           <a:lstStyle/>
           <a:p>
+            <a:r>
+              <a:rPr lang="en-US" dirty="0"/>
+              <a:t>The programming language name is “English Programming Language” or EPL for short</a:t>
+            </a:r>
+          </a:p>
+          <a:p>
+            <a:r>
+              <a:rPr lang="en-US" dirty="0"/>
+              <a:t>It can contain stuff like</a:t>
+            </a:r>
+            <a:br>
+              <a:rPr lang="en-US" dirty="0"/>
+            </a:br>
+            <a:r>
+              <a:rPr lang="en-US" dirty="0"/>
+              <a:t>can you please </a:t>
+            </a:r>
+            <a:r>
+              <a:rPr lang="en-US" dirty="0">
+                <a:solidFill>
+                  <a:schemeClr val="accent1"/>
+                </a:solidFill>
+              </a:rPr>
+              <a:t>print </a:t>
+            </a:r>
+            <a:r>
+              <a:rPr lang="en-US" dirty="0"/>
+              <a:t>stuff like </a:t>
+            </a:r>
+            <a:r>
+              <a:rPr lang="en-US" dirty="0">
+                <a:solidFill>
+                  <a:schemeClr val="accent2"/>
+                </a:solidFill>
+              </a:rPr>
+              <a:t>“Hello World!!!”</a:t>
+            </a:r>
+            <a:r>
+              <a:rPr lang="en-US" dirty="0">
+                <a:solidFill>
+                  <a:schemeClr val="accent6"/>
+                </a:solidFill>
+              </a:rPr>
+              <a:t>.</a:t>
+            </a:r>
+          </a:p>
+          <a:p>
+            <a:r>
+              <a:rPr lang="en-US" dirty="0"/>
+              <a:t>Here only print is read by my compiler and it only prints whatever is present in double inverted commas, the line ends with the full stop (replacement for semicolon)</a:t>
+            </a:r>
+          </a:p>
+          <a:p>
             <a:endParaRPr lang="en-US" dirty="0"/>
           </a:p>
         </p:txBody>
@@ -8785,6 +8230,350 @@
     <p:extLst>
       <p:ext uri="{BB962C8B-B14F-4D97-AF65-F5344CB8AC3E}">
         <p14:creationId xmlns:p14="http://schemas.microsoft.com/office/powerpoint/2010/main" val="3264929547"/>
+      </p:ext>
+    </p:extLst>
+  </p:cSld>
+  <p:clrMapOvr>
+    <a:masterClrMapping/>
+  </p:clrMapOvr>
+</p:sld>
+</file>
+
+<file path=ppt/slides/slide23.xml><?xml version="1.0" encoding="utf-8"?>
+<p:sld xmlns:a="http://schemas.openxmlformats.org/drawingml/2006/main" xmlns:r="http://schemas.openxmlformats.org/officeDocument/2006/relationships" xmlns:p="http://schemas.openxmlformats.org/presentationml/2006/main">
+  <p:cSld>
+    <p:spTree>
+      <p:nvGrpSpPr>
+        <p:cNvPr id="1" name="">
+          <a:extLst>
+            <a:ext uri="{FF2B5EF4-FFF2-40B4-BE49-F238E27FC236}">
+              <a16:creationId xmlns:a16="http://schemas.microsoft.com/office/drawing/2014/main" id="{D4BB2BCE-1F27-F9EB-3EDA-B2C1F2E70C3A}"/>
+            </a:ext>
+          </a:extLst>
+        </p:cNvPr>
+        <p:cNvGrpSpPr/>
+        <p:nvPr/>
+      </p:nvGrpSpPr>
+      <p:grpSpPr>
+        <a:xfrm>
+          <a:off x="0" y="0"/>
+          <a:ext cx="0" cy="0"/>
+          <a:chOff x="0" y="0"/>
+          <a:chExt cx="0" cy="0"/>
+        </a:xfrm>
+      </p:grpSpPr>
+      <p:sp>
+        <p:nvSpPr>
+          <p:cNvPr id="7" name="Content Placeholder 6">
+            <a:extLst>
+              <a:ext uri="{FF2B5EF4-FFF2-40B4-BE49-F238E27FC236}">
+                <a16:creationId xmlns:a16="http://schemas.microsoft.com/office/drawing/2014/main" id="{EC27B04B-0B42-BF7C-9066-0B82CCBAE0AB}"/>
+              </a:ext>
+            </a:extLst>
+          </p:cNvPr>
+          <p:cNvSpPr>
+            <a:spLocks noGrp="1"/>
+          </p:cNvSpPr>
+          <p:nvPr>
+            <p:ph idx="1"/>
+          </p:nvPr>
+        </p:nvSpPr>
+        <p:spPr>
+          <a:xfrm>
+            <a:off x="838200" y="988399"/>
+            <a:ext cx="10515600" cy="5188566"/>
+          </a:xfrm>
+        </p:spPr>
+        <p:txBody>
+          <a:bodyPr/>
+          <a:lstStyle/>
+          <a:p>
+            <a:r>
+              <a:rPr lang="en-US" dirty="0"/>
+              <a:t>It can even do things like</a:t>
+            </a:r>
+            <a:br>
+              <a:rPr lang="en-US" dirty="0"/>
+            </a:br>
+            <a:r>
+              <a:rPr lang="en-US" dirty="0"/>
+              <a:t>can you </a:t>
+            </a:r>
+            <a:r>
+              <a:rPr lang="en-US" dirty="0">
+                <a:solidFill>
+                  <a:schemeClr val="accent1"/>
+                </a:solidFill>
+              </a:rPr>
+              <a:t>let </a:t>
+            </a:r>
+            <a:r>
+              <a:rPr lang="en-US" dirty="0"/>
+              <a:t>‘x’ be of </a:t>
+            </a:r>
+            <a:r>
+              <a:rPr lang="en-US" dirty="0">
+                <a:solidFill>
+                  <a:schemeClr val="accent1"/>
+                </a:solidFill>
+              </a:rPr>
+              <a:t>type</a:t>
+            </a:r>
+            <a:r>
+              <a:rPr lang="en-US" dirty="0"/>
+              <a:t> </a:t>
+            </a:r>
+            <a:r>
+              <a:rPr lang="en-US" dirty="0">
+                <a:solidFill>
+                  <a:schemeClr val="accent5"/>
+                </a:solidFill>
+              </a:rPr>
+              <a:t>integer</a:t>
+            </a:r>
+            <a:r>
+              <a:rPr lang="en-US" dirty="0"/>
+              <a:t> “5”.</a:t>
+            </a:r>
+          </a:p>
+          <a:p>
+            <a:r>
+              <a:rPr lang="en-US" dirty="0"/>
+              <a:t>Basically, my compiler translates EPL into C code then it uses GCC to compile it into a binary lmao.</a:t>
+            </a:r>
+          </a:p>
+          <a:p>
+            <a:r>
+              <a:rPr lang="en-US" dirty="0"/>
+              <a:t>Here you could say that the c code is my intermediate representation.</a:t>
+            </a:r>
+          </a:p>
+          <a:p>
+            <a:r>
+              <a:rPr lang="en-US" dirty="0"/>
+              <a:t>The frontend part translates EPL into C, there is no optimization step, the backend is just GCC, hence the C code gets converted into machine code ready to be executed. (insaneee ik)</a:t>
+            </a:r>
+          </a:p>
+          <a:p>
+            <a:r>
+              <a:rPr lang="en-US" dirty="0"/>
+              <a:t>And also note, my compiler is written in C (oof)</a:t>
+            </a:r>
+          </a:p>
+        </p:txBody>
+      </p:sp>
+      <p:sp>
+        <p:nvSpPr>
+          <p:cNvPr id="4" name="Rectangle 3">
+            <a:extLst>
+              <a:ext uri="{FF2B5EF4-FFF2-40B4-BE49-F238E27FC236}">
+                <a16:creationId xmlns:a16="http://schemas.microsoft.com/office/drawing/2014/main" id="{50511AF6-3C49-345B-CCAE-D6BF2FDE6366}"/>
+              </a:ext>
+            </a:extLst>
+          </p:cNvPr>
+          <p:cNvSpPr/>
+          <p:nvPr/>
+        </p:nvSpPr>
+        <p:spPr>
+          <a:xfrm>
+            <a:off x="0" y="0"/>
+            <a:ext cx="12192000" cy="468086"/>
+          </a:xfrm>
+          <a:prstGeom prst="rect">
+            <a:avLst/>
+          </a:prstGeom>
+          <a:solidFill>
+            <a:schemeClr val="bg2"/>
+          </a:solidFill>
+          <a:ln>
+            <a:noFill/>
+          </a:ln>
+        </p:spPr>
+        <p:style>
+          <a:lnRef idx="2">
+            <a:schemeClr val="accent1">
+              <a:shade val="15000"/>
+            </a:schemeClr>
+          </a:lnRef>
+          <a:fillRef idx="1">
+            <a:schemeClr val="accent1"/>
+          </a:fillRef>
+          <a:effectRef idx="0">
+            <a:schemeClr val="accent1"/>
+          </a:effectRef>
+          <a:fontRef idx="minor">
+            <a:schemeClr val="lt1"/>
+          </a:fontRef>
+        </p:style>
+        <p:txBody>
+          <a:bodyPr rtlCol="0" anchor="ctr"/>
+          <a:lstStyle/>
+          <a:p>
+            <a:pPr algn="ctr"/>
+            <a:endParaRPr lang="en-US" sz="1351"/>
+          </a:p>
+        </p:txBody>
+      </p:sp>
+      <p:sp>
+        <p:nvSpPr>
+          <p:cNvPr id="5" name="Oval 4">
+            <a:extLst>
+              <a:ext uri="{FF2B5EF4-FFF2-40B4-BE49-F238E27FC236}">
+                <a16:creationId xmlns:a16="http://schemas.microsoft.com/office/drawing/2014/main" id="{A1AF8711-F559-0A4F-41B7-BF8E76C9026D}"/>
+              </a:ext>
+            </a:extLst>
+          </p:cNvPr>
+          <p:cNvSpPr/>
+          <p:nvPr/>
+        </p:nvSpPr>
+        <p:spPr>
+          <a:xfrm>
+            <a:off x="129189" y="108651"/>
+            <a:ext cx="246109" cy="250784"/>
+          </a:xfrm>
+          <a:prstGeom prst="ellipse">
+            <a:avLst/>
+          </a:prstGeom>
+          <a:solidFill>
+            <a:schemeClr val="accent1"/>
+          </a:solidFill>
+          <a:ln>
+            <a:noFill/>
+          </a:ln>
+        </p:spPr>
+        <p:style>
+          <a:lnRef idx="2">
+            <a:schemeClr val="accent1">
+              <a:shade val="15000"/>
+            </a:schemeClr>
+          </a:lnRef>
+          <a:fillRef idx="1">
+            <a:schemeClr val="accent1"/>
+          </a:fillRef>
+          <a:effectRef idx="0">
+            <a:schemeClr val="accent1"/>
+          </a:effectRef>
+          <a:fontRef idx="minor">
+            <a:schemeClr val="lt1"/>
+          </a:fontRef>
+        </p:style>
+        <p:txBody>
+          <a:bodyPr rtlCol="0" anchor="ctr"/>
+          <a:lstStyle/>
+          <a:p>
+            <a:pPr algn="ctr"/>
+            <a:endParaRPr lang="en-US"/>
+          </a:p>
+        </p:txBody>
+      </p:sp>
+      <p:sp>
+        <p:nvSpPr>
+          <p:cNvPr id="8" name="Oval 7">
+            <a:extLst>
+              <a:ext uri="{FF2B5EF4-FFF2-40B4-BE49-F238E27FC236}">
+                <a16:creationId xmlns:a16="http://schemas.microsoft.com/office/drawing/2014/main" id="{AC3E67B0-A6BC-7FB9-3653-D4F5F4EBD8F2}"/>
+              </a:ext>
+            </a:extLst>
+          </p:cNvPr>
+          <p:cNvSpPr/>
+          <p:nvPr/>
+        </p:nvSpPr>
+        <p:spPr>
+          <a:xfrm>
+            <a:off x="504487" y="113785"/>
+            <a:ext cx="246109" cy="250784"/>
+          </a:xfrm>
+          <a:prstGeom prst="ellipse">
+            <a:avLst/>
+          </a:prstGeom>
+          <a:solidFill>
+            <a:schemeClr val="accent3"/>
+          </a:solidFill>
+          <a:ln>
+            <a:noFill/>
+          </a:ln>
+        </p:spPr>
+        <p:style>
+          <a:lnRef idx="2">
+            <a:schemeClr val="accent1">
+              <a:shade val="15000"/>
+            </a:schemeClr>
+          </a:lnRef>
+          <a:fillRef idx="1">
+            <a:schemeClr val="accent1"/>
+          </a:fillRef>
+          <a:effectRef idx="0">
+            <a:schemeClr val="accent1"/>
+          </a:effectRef>
+          <a:fontRef idx="minor">
+            <a:schemeClr val="lt1"/>
+          </a:fontRef>
+        </p:style>
+        <p:txBody>
+          <a:bodyPr rtlCol="0" anchor="ctr"/>
+          <a:lstStyle/>
+          <a:p>
+            <a:pPr algn="ctr"/>
+            <a:endParaRPr lang="en-US"/>
+          </a:p>
+        </p:txBody>
+      </p:sp>
+      <p:sp>
+        <p:nvSpPr>
+          <p:cNvPr id="9" name="Oval 8">
+            <a:extLst>
+              <a:ext uri="{FF2B5EF4-FFF2-40B4-BE49-F238E27FC236}">
+                <a16:creationId xmlns:a16="http://schemas.microsoft.com/office/drawing/2014/main" id="{D39BFEC0-380A-3C95-FDF7-405FB3E0A021}"/>
+              </a:ext>
+            </a:extLst>
+          </p:cNvPr>
+          <p:cNvSpPr/>
+          <p:nvPr/>
+        </p:nvSpPr>
+        <p:spPr>
+          <a:xfrm>
+            <a:off x="879785" y="108651"/>
+            <a:ext cx="246109" cy="250784"/>
+          </a:xfrm>
+          <a:prstGeom prst="ellipse">
+            <a:avLst/>
+          </a:prstGeom>
+          <a:solidFill>
+            <a:schemeClr val="accent2"/>
+          </a:solidFill>
+          <a:ln>
+            <a:noFill/>
+          </a:ln>
+        </p:spPr>
+        <p:style>
+          <a:lnRef idx="2">
+            <a:schemeClr val="accent1">
+              <a:shade val="15000"/>
+            </a:schemeClr>
+          </a:lnRef>
+          <a:fillRef idx="1">
+            <a:schemeClr val="accent1"/>
+          </a:fillRef>
+          <a:effectRef idx="0">
+            <a:schemeClr val="accent1"/>
+          </a:effectRef>
+          <a:fontRef idx="minor">
+            <a:schemeClr val="lt1"/>
+          </a:fontRef>
+        </p:style>
+        <p:txBody>
+          <a:bodyPr rtlCol="0" anchor="ctr"/>
+          <a:lstStyle/>
+          <a:p>
+            <a:pPr algn="ctr"/>
+            <a:endParaRPr lang="en-US"/>
+          </a:p>
+        </p:txBody>
+      </p:sp>
+    </p:spTree>
+    <p:extLst>
+      <p:ext uri="{BB962C8B-B14F-4D97-AF65-F5344CB8AC3E}">
+        <p14:creationId xmlns:p14="http://schemas.microsoft.com/office/powerpoint/2010/main" val="898163375"/>
       </p:ext>
     </p:extLst>
   </p:cSld>
@@ -8802,7 +8591,7 @@
         <p:cNvPr id="1" name="">
           <a:extLst>
             <a:ext uri="{FF2B5EF4-FFF2-40B4-BE49-F238E27FC236}">
-              <a16:creationId xmlns:a16="http://schemas.microsoft.com/office/drawing/2014/main" id="{12583145-6B12-90D9-879F-2191D6FAB3FB}"/>
+              <a16:creationId xmlns:a16="http://schemas.microsoft.com/office/drawing/2014/main" id="{F85DEDA4-6CB9-EE2E-D23D-943D4E7A92E6}"/>
             </a:ext>
           </a:extLst>
         </p:cNvPr>
@@ -8819,40 +8608,10 @@
       </p:grpSpPr>
       <p:sp>
         <p:nvSpPr>
-          <p:cNvPr id="6" name="Title 5">
-            <a:extLst>
-              <a:ext uri="{FF2B5EF4-FFF2-40B4-BE49-F238E27FC236}">
-                <a16:creationId xmlns:a16="http://schemas.microsoft.com/office/drawing/2014/main" id="{06615D88-973B-3485-F465-10369CFEA6B3}"/>
-              </a:ext>
-            </a:extLst>
-          </p:cNvPr>
-          <p:cNvSpPr>
-            <a:spLocks noGrp="1"/>
-          </p:cNvSpPr>
-          <p:nvPr>
-            <p:ph type="title"/>
-          </p:nvPr>
-        </p:nvSpPr>
-        <p:spPr>
-          <a:xfrm>
-            <a:off x="838200" y="694547"/>
-            <a:ext cx="10515600" cy="1325563"/>
-          </a:xfrm>
-        </p:spPr>
-        <p:txBody>
-          <a:bodyPr/>
-          <a:lstStyle/>
-          <a:p>
-            <a:endParaRPr lang="en-US" dirty="0"/>
-          </a:p>
-        </p:txBody>
-      </p:sp>
-      <p:sp>
-        <p:nvSpPr>
           <p:cNvPr id="7" name="Content Placeholder 6">
             <a:extLst>
               <a:ext uri="{FF2B5EF4-FFF2-40B4-BE49-F238E27FC236}">
-                <a16:creationId xmlns:a16="http://schemas.microsoft.com/office/drawing/2014/main" id="{CB382495-4B1E-8879-C49D-B3DE3DA23D8D}"/>
+                <a16:creationId xmlns:a16="http://schemas.microsoft.com/office/drawing/2014/main" id="{0036EEB7-44CE-7C32-9F41-483B0AA5BCCC}"/>
               </a:ext>
             </a:extLst>
           </p:cNvPr>
@@ -8865,8 +8624,8 @@
         </p:nvSpPr>
         <p:spPr>
           <a:xfrm>
-            <a:off x="838200" y="2254763"/>
-            <a:ext cx="10515600" cy="3922201"/>
+            <a:off x="838200" y="988399"/>
+            <a:ext cx="10515600" cy="5188566"/>
           </a:xfrm>
         </p:spPr>
         <p:txBody>
@@ -8882,7 +8641,7 @@
           <p:cNvPr id="4" name="Rectangle 3">
             <a:extLst>
               <a:ext uri="{FF2B5EF4-FFF2-40B4-BE49-F238E27FC236}">
-                <a16:creationId xmlns:a16="http://schemas.microsoft.com/office/drawing/2014/main" id="{78CDFCEE-FF5A-47F8-0ECB-091115E055C1}"/>
+                <a16:creationId xmlns:a16="http://schemas.microsoft.com/office/drawing/2014/main" id="{1BF608EE-39CD-22FB-3167-C91D91077C06}"/>
               </a:ext>
             </a:extLst>
           </p:cNvPr>
@@ -8934,7 +8693,7 @@
           <p:cNvPr id="5" name="Oval 4">
             <a:extLst>
               <a:ext uri="{FF2B5EF4-FFF2-40B4-BE49-F238E27FC236}">
-                <a16:creationId xmlns:a16="http://schemas.microsoft.com/office/drawing/2014/main" id="{1212AEE6-834B-7482-54BE-FBC11CE2B04F}"/>
+                <a16:creationId xmlns:a16="http://schemas.microsoft.com/office/drawing/2014/main" id="{189520A7-9CDE-71B5-F5EA-1A0BF6CF830B}"/>
               </a:ext>
             </a:extLst>
           </p:cNvPr>
@@ -8986,7 +8745,7 @@
           <p:cNvPr id="8" name="Oval 7">
             <a:extLst>
               <a:ext uri="{FF2B5EF4-FFF2-40B4-BE49-F238E27FC236}">
-                <a16:creationId xmlns:a16="http://schemas.microsoft.com/office/drawing/2014/main" id="{FB91025F-88A4-3E46-9016-C6345FC1FAA1}"/>
+                <a16:creationId xmlns:a16="http://schemas.microsoft.com/office/drawing/2014/main" id="{6D488FE2-1724-80DD-4D8F-F0B54314BB08}"/>
               </a:ext>
             </a:extLst>
           </p:cNvPr>
@@ -9038,7 +8797,7 @@
           <p:cNvPr id="9" name="Oval 8">
             <a:extLst>
               <a:ext uri="{FF2B5EF4-FFF2-40B4-BE49-F238E27FC236}">
-                <a16:creationId xmlns:a16="http://schemas.microsoft.com/office/drawing/2014/main" id="{42CF4BCD-90FF-F1D7-5AE7-911655743C0A}"/>
+                <a16:creationId xmlns:a16="http://schemas.microsoft.com/office/drawing/2014/main" id="{0541E38E-CCAA-4FF0-E14B-501CF1E54079}"/>
               </a:ext>
             </a:extLst>
           </p:cNvPr>
@@ -9088,311 +8847,7 @@
     </p:spTree>
     <p:extLst>
       <p:ext uri="{BB962C8B-B14F-4D97-AF65-F5344CB8AC3E}">
-        <p14:creationId xmlns:p14="http://schemas.microsoft.com/office/powerpoint/2010/main" val="2118145895"/>
-      </p:ext>
-    </p:extLst>
-  </p:cSld>
-  <p:clrMapOvr>
-    <a:masterClrMapping/>
-  </p:clrMapOvr>
-</p:sld>
-</file>
-
-<file path=ppt/slides/slide25.xml><?xml version="1.0" encoding="utf-8"?>
-<p:sld xmlns:a="http://schemas.openxmlformats.org/drawingml/2006/main" xmlns:r="http://schemas.openxmlformats.org/officeDocument/2006/relationships" xmlns:p="http://schemas.openxmlformats.org/presentationml/2006/main">
-  <p:cSld>
-    <p:spTree>
-      <p:nvGrpSpPr>
-        <p:cNvPr id="1" name="">
-          <a:extLst>
-            <a:ext uri="{FF2B5EF4-FFF2-40B4-BE49-F238E27FC236}">
-              <a16:creationId xmlns:a16="http://schemas.microsoft.com/office/drawing/2014/main" id="{2049ABD4-C70B-229B-F019-8FEBB69F5E90}"/>
-            </a:ext>
-          </a:extLst>
-        </p:cNvPr>
-        <p:cNvGrpSpPr/>
-        <p:nvPr/>
-      </p:nvGrpSpPr>
-      <p:grpSpPr>
-        <a:xfrm>
-          <a:off x="0" y="0"/>
-          <a:ext cx="0" cy="0"/>
-          <a:chOff x="0" y="0"/>
-          <a:chExt cx="0" cy="0"/>
-        </a:xfrm>
-      </p:grpSpPr>
-      <p:sp>
-        <p:nvSpPr>
-          <p:cNvPr id="6" name="Title 5">
-            <a:extLst>
-              <a:ext uri="{FF2B5EF4-FFF2-40B4-BE49-F238E27FC236}">
-                <a16:creationId xmlns:a16="http://schemas.microsoft.com/office/drawing/2014/main" id="{CA4ADF60-C78D-5BA5-CDDC-BDBF8502A6E6}"/>
-              </a:ext>
-            </a:extLst>
-          </p:cNvPr>
-          <p:cNvSpPr>
-            <a:spLocks noGrp="1"/>
-          </p:cNvSpPr>
-          <p:nvPr>
-            <p:ph type="title"/>
-          </p:nvPr>
-        </p:nvSpPr>
-        <p:spPr>
-          <a:xfrm>
-            <a:off x="838200" y="694547"/>
-            <a:ext cx="10515600" cy="1325563"/>
-          </a:xfrm>
-        </p:spPr>
-        <p:txBody>
-          <a:bodyPr/>
-          <a:lstStyle/>
-          <a:p>
-            <a:endParaRPr lang="en-US" dirty="0"/>
-          </a:p>
-        </p:txBody>
-      </p:sp>
-      <p:sp>
-        <p:nvSpPr>
-          <p:cNvPr id="7" name="Content Placeholder 6">
-            <a:extLst>
-              <a:ext uri="{FF2B5EF4-FFF2-40B4-BE49-F238E27FC236}">
-                <a16:creationId xmlns:a16="http://schemas.microsoft.com/office/drawing/2014/main" id="{24939951-DDAC-2BB0-8CCD-3423838AE1A6}"/>
-              </a:ext>
-            </a:extLst>
-          </p:cNvPr>
-          <p:cNvSpPr>
-            <a:spLocks noGrp="1"/>
-          </p:cNvSpPr>
-          <p:nvPr>
-            <p:ph idx="1"/>
-          </p:nvPr>
-        </p:nvSpPr>
-        <p:spPr>
-          <a:xfrm>
-            <a:off x="838200" y="2254763"/>
-            <a:ext cx="10515600" cy="3922201"/>
-          </a:xfrm>
-        </p:spPr>
-        <p:txBody>
-          <a:bodyPr/>
-          <a:lstStyle/>
-          <a:p>
-            <a:endParaRPr lang="en-US" dirty="0"/>
-          </a:p>
-        </p:txBody>
-      </p:sp>
-      <p:sp>
-        <p:nvSpPr>
-          <p:cNvPr id="4" name="Rectangle 3">
-            <a:extLst>
-              <a:ext uri="{FF2B5EF4-FFF2-40B4-BE49-F238E27FC236}">
-                <a16:creationId xmlns:a16="http://schemas.microsoft.com/office/drawing/2014/main" id="{17BAB443-0273-36FA-E697-C1BB87DF55A7}"/>
-              </a:ext>
-            </a:extLst>
-          </p:cNvPr>
-          <p:cNvSpPr/>
-          <p:nvPr/>
-        </p:nvSpPr>
-        <p:spPr>
-          <a:xfrm>
-            <a:off x="0" y="0"/>
-            <a:ext cx="12192000" cy="468086"/>
-          </a:xfrm>
-          <a:prstGeom prst="rect">
-            <a:avLst/>
-          </a:prstGeom>
-          <a:solidFill>
-            <a:schemeClr val="bg2"/>
-          </a:solidFill>
-          <a:ln>
-            <a:noFill/>
-          </a:ln>
-        </p:spPr>
-        <p:style>
-          <a:lnRef idx="2">
-            <a:schemeClr val="accent1">
-              <a:shade val="15000"/>
-            </a:schemeClr>
-          </a:lnRef>
-          <a:fillRef idx="1">
-            <a:schemeClr val="accent1"/>
-          </a:fillRef>
-          <a:effectRef idx="0">
-            <a:schemeClr val="accent1"/>
-          </a:effectRef>
-          <a:fontRef idx="minor">
-            <a:schemeClr val="lt1"/>
-          </a:fontRef>
-        </p:style>
-        <p:txBody>
-          <a:bodyPr rtlCol="0" anchor="ctr"/>
-          <a:lstStyle/>
-          <a:p>
-            <a:pPr algn="ctr"/>
-            <a:endParaRPr lang="en-US" sz="1351"/>
-          </a:p>
-        </p:txBody>
-      </p:sp>
-      <p:sp>
-        <p:nvSpPr>
-          <p:cNvPr id="5" name="Oval 4">
-            <a:extLst>
-              <a:ext uri="{FF2B5EF4-FFF2-40B4-BE49-F238E27FC236}">
-                <a16:creationId xmlns:a16="http://schemas.microsoft.com/office/drawing/2014/main" id="{8F82ECB2-7FFF-AE86-D805-6358D75AC228}"/>
-              </a:ext>
-            </a:extLst>
-          </p:cNvPr>
-          <p:cNvSpPr/>
-          <p:nvPr/>
-        </p:nvSpPr>
-        <p:spPr>
-          <a:xfrm>
-            <a:off x="129189" y="108651"/>
-            <a:ext cx="246109" cy="250784"/>
-          </a:xfrm>
-          <a:prstGeom prst="ellipse">
-            <a:avLst/>
-          </a:prstGeom>
-          <a:solidFill>
-            <a:schemeClr val="accent1"/>
-          </a:solidFill>
-          <a:ln>
-            <a:noFill/>
-          </a:ln>
-        </p:spPr>
-        <p:style>
-          <a:lnRef idx="2">
-            <a:schemeClr val="accent1">
-              <a:shade val="15000"/>
-            </a:schemeClr>
-          </a:lnRef>
-          <a:fillRef idx="1">
-            <a:schemeClr val="accent1"/>
-          </a:fillRef>
-          <a:effectRef idx="0">
-            <a:schemeClr val="accent1"/>
-          </a:effectRef>
-          <a:fontRef idx="minor">
-            <a:schemeClr val="lt1"/>
-          </a:fontRef>
-        </p:style>
-        <p:txBody>
-          <a:bodyPr rtlCol="0" anchor="ctr"/>
-          <a:lstStyle/>
-          <a:p>
-            <a:pPr algn="ctr"/>
-            <a:endParaRPr lang="en-US"/>
-          </a:p>
-        </p:txBody>
-      </p:sp>
-      <p:sp>
-        <p:nvSpPr>
-          <p:cNvPr id="8" name="Oval 7">
-            <a:extLst>
-              <a:ext uri="{FF2B5EF4-FFF2-40B4-BE49-F238E27FC236}">
-                <a16:creationId xmlns:a16="http://schemas.microsoft.com/office/drawing/2014/main" id="{8E3DD73D-8FDA-EA61-ADD0-98FD046B4EE8}"/>
-              </a:ext>
-            </a:extLst>
-          </p:cNvPr>
-          <p:cNvSpPr/>
-          <p:nvPr/>
-        </p:nvSpPr>
-        <p:spPr>
-          <a:xfrm>
-            <a:off x="504487" y="113785"/>
-            <a:ext cx="246109" cy="250784"/>
-          </a:xfrm>
-          <a:prstGeom prst="ellipse">
-            <a:avLst/>
-          </a:prstGeom>
-          <a:solidFill>
-            <a:schemeClr val="accent3"/>
-          </a:solidFill>
-          <a:ln>
-            <a:noFill/>
-          </a:ln>
-        </p:spPr>
-        <p:style>
-          <a:lnRef idx="2">
-            <a:schemeClr val="accent1">
-              <a:shade val="15000"/>
-            </a:schemeClr>
-          </a:lnRef>
-          <a:fillRef idx="1">
-            <a:schemeClr val="accent1"/>
-          </a:fillRef>
-          <a:effectRef idx="0">
-            <a:schemeClr val="accent1"/>
-          </a:effectRef>
-          <a:fontRef idx="minor">
-            <a:schemeClr val="lt1"/>
-          </a:fontRef>
-        </p:style>
-        <p:txBody>
-          <a:bodyPr rtlCol="0" anchor="ctr"/>
-          <a:lstStyle/>
-          <a:p>
-            <a:pPr algn="ctr"/>
-            <a:endParaRPr lang="en-US"/>
-          </a:p>
-        </p:txBody>
-      </p:sp>
-      <p:sp>
-        <p:nvSpPr>
-          <p:cNvPr id="9" name="Oval 8">
-            <a:extLst>
-              <a:ext uri="{FF2B5EF4-FFF2-40B4-BE49-F238E27FC236}">
-                <a16:creationId xmlns:a16="http://schemas.microsoft.com/office/drawing/2014/main" id="{5F8547C7-0336-1D52-0DCD-9F77E8501ED3}"/>
-              </a:ext>
-            </a:extLst>
-          </p:cNvPr>
-          <p:cNvSpPr/>
-          <p:nvPr/>
-        </p:nvSpPr>
-        <p:spPr>
-          <a:xfrm>
-            <a:off x="879785" y="108651"/>
-            <a:ext cx="246109" cy="250784"/>
-          </a:xfrm>
-          <a:prstGeom prst="ellipse">
-            <a:avLst/>
-          </a:prstGeom>
-          <a:solidFill>
-            <a:schemeClr val="accent2"/>
-          </a:solidFill>
-          <a:ln>
-            <a:noFill/>
-          </a:ln>
-        </p:spPr>
-        <p:style>
-          <a:lnRef idx="2">
-            <a:schemeClr val="accent1">
-              <a:shade val="15000"/>
-            </a:schemeClr>
-          </a:lnRef>
-          <a:fillRef idx="1">
-            <a:schemeClr val="accent1"/>
-          </a:fillRef>
-          <a:effectRef idx="0">
-            <a:schemeClr val="accent1"/>
-          </a:effectRef>
-          <a:fontRef idx="minor">
-            <a:schemeClr val="lt1"/>
-          </a:fontRef>
-        </p:style>
-        <p:txBody>
-          <a:bodyPr rtlCol="0" anchor="ctr"/>
-          <a:lstStyle/>
-          <a:p>
-            <a:pPr algn="ctr"/>
-            <a:endParaRPr lang="en-US"/>
-          </a:p>
-        </p:txBody>
-      </p:sp>
-    </p:spTree>
-    <p:extLst>
-      <p:ext uri="{BB962C8B-B14F-4D97-AF65-F5344CB8AC3E}">
-        <p14:creationId xmlns:p14="http://schemas.microsoft.com/office/powerpoint/2010/main" val="1801838751"/>
+        <p14:creationId xmlns:p14="http://schemas.microsoft.com/office/powerpoint/2010/main" val="2955507698"/>
       </p:ext>
     </p:extLst>
   </p:cSld>
@@ -12058,7 +11513,10 @@
           <a:bodyPr/>
           <a:lstStyle/>
           <a:p>
-            <a:endParaRPr lang="en-US" dirty="0"/>
+            <a:r>
+              <a:rPr lang="en-US" dirty="0"/>
+              <a:t>It takes the source code and directly executes it.</a:t>
+            </a:r>
           </a:p>
         </p:txBody>
       </p:sp>
@@ -12291,7 +11749,7 @@
         <p:cNvPr id="1" name="">
           <a:extLst>
             <a:ext uri="{FF2B5EF4-FFF2-40B4-BE49-F238E27FC236}">
-              <a16:creationId xmlns:a16="http://schemas.microsoft.com/office/drawing/2014/main" id="{B82D3BB3-44D8-6D36-1F5D-9AAD2EE9961E}"/>
+              <a16:creationId xmlns:a16="http://schemas.microsoft.com/office/drawing/2014/main" id="{9C18E758-ED1E-A5DA-D6EF-E9DF5C699923}"/>
             </a:ext>
           </a:extLst>
         </p:cNvPr>
@@ -12311,7 +11769,7 @@
           <p:cNvPr id="6" name="Title 5">
             <a:extLst>
               <a:ext uri="{FF2B5EF4-FFF2-40B4-BE49-F238E27FC236}">
-                <a16:creationId xmlns:a16="http://schemas.microsoft.com/office/drawing/2014/main" id="{AD977B9A-1BC1-426B-DC1C-701748411B84}"/>
+                <a16:creationId xmlns:a16="http://schemas.microsoft.com/office/drawing/2014/main" id="{FA4C2B05-E648-9FA4-DCD7-B1EDB9F3BECF}"/>
               </a:ext>
             </a:extLst>
           </p:cNvPr>
@@ -12332,7 +11790,10 @@
           <a:bodyPr/>
           <a:lstStyle/>
           <a:p>
-            <a:endParaRPr lang="en-US" dirty="0"/>
+            <a:r>
+              <a:rPr lang="en-US" dirty="0"/>
+              <a:t>Compilers vs Interpreters</a:t>
+            </a:r>
           </a:p>
         </p:txBody>
       </p:sp>
@@ -12341,7 +11802,7 @@
           <p:cNvPr id="7" name="Content Placeholder 6">
             <a:extLst>
               <a:ext uri="{FF2B5EF4-FFF2-40B4-BE49-F238E27FC236}">
-                <a16:creationId xmlns:a16="http://schemas.microsoft.com/office/drawing/2014/main" id="{233CD246-9200-ED13-E469-12174F984581}"/>
+                <a16:creationId xmlns:a16="http://schemas.microsoft.com/office/drawing/2014/main" id="{D368607E-2AAD-DBDE-9480-8D578F7AC080}"/>
               </a:ext>
             </a:extLst>
           </p:cNvPr>
@@ -12362,6 +11823,36 @@
           <a:bodyPr/>
           <a:lstStyle/>
           <a:p>
+            <a:r>
+              <a:rPr lang="en-US" dirty="0"/>
+              <a:t>U can write an </a:t>
+            </a:r>
+            <a:r>
+              <a:rPr lang="en-US" dirty="0">
+                <a:solidFill>
+                  <a:schemeClr val="accent2"/>
+                </a:solidFill>
+              </a:rPr>
+              <a:t>interpreter for C </a:t>
+            </a:r>
+            <a:r>
+              <a:rPr lang="en-US" dirty="0"/>
+              <a:t>and a </a:t>
+            </a:r>
+            <a:r>
+              <a:rPr lang="en-US" dirty="0">
+                <a:solidFill>
+                  <a:schemeClr val="accent1"/>
+                </a:solidFill>
+              </a:rPr>
+              <a:t>compiler for JavaScript</a:t>
+            </a:r>
+            <a:r>
+              <a:rPr lang="en-US" dirty="0"/>
+              <a:t>.</a:t>
+            </a:r>
+          </a:p>
+          <a:p>
             <a:endParaRPr lang="en-US" dirty="0"/>
           </a:p>
         </p:txBody>
@@ -12371,7 +11862,7 @@
           <p:cNvPr id="4" name="Rectangle 3">
             <a:extLst>
               <a:ext uri="{FF2B5EF4-FFF2-40B4-BE49-F238E27FC236}">
-                <a16:creationId xmlns:a16="http://schemas.microsoft.com/office/drawing/2014/main" id="{B37B9716-5F46-6466-F134-231965C8C2F7}"/>
+                <a16:creationId xmlns:a16="http://schemas.microsoft.com/office/drawing/2014/main" id="{F233A266-49F8-6F15-9B2E-4BDFA08D628A}"/>
               </a:ext>
             </a:extLst>
           </p:cNvPr>
@@ -12423,7 +11914,7 @@
           <p:cNvPr id="5" name="Oval 4">
             <a:extLst>
               <a:ext uri="{FF2B5EF4-FFF2-40B4-BE49-F238E27FC236}">
-                <a16:creationId xmlns:a16="http://schemas.microsoft.com/office/drawing/2014/main" id="{32FA1AC5-60A7-81D9-8135-CB1D08E290B9}"/>
+                <a16:creationId xmlns:a16="http://schemas.microsoft.com/office/drawing/2014/main" id="{6C2DB65A-3098-E41E-5444-5D4FDADFAAB2}"/>
               </a:ext>
             </a:extLst>
           </p:cNvPr>
@@ -12475,7 +11966,7 @@
           <p:cNvPr id="8" name="Oval 7">
             <a:extLst>
               <a:ext uri="{FF2B5EF4-FFF2-40B4-BE49-F238E27FC236}">
-                <a16:creationId xmlns:a16="http://schemas.microsoft.com/office/drawing/2014/main" id="{9206C3FF-11A0-91DD-7723-A1BB5C0A5139}"/>
+                <a16:creationId xmlns:a16="http://schemas.microsoft.com/office/drawing/2014/main" id="{E833ED17-7925-7B42-2DA8-68FFB1A203C0}"/>
               </a:ext>
             </a:extLst>
           </p:cNvPr>
@@ -12527,7 +12018,7 @@
           <p:cNvPr id="9" name="Oval 8">
             <a:extLst>
               <a:ext uri="{FF2B5EF4-FFF2-40B4-BE49-F238E27FC236}">
-                <a16:creationId xmlns:a16="http://schemas.microsoft.com/office/drawing/2014/main" id="{E92B25E2-AB25-73B6-845B-418A52700116}"/>
+                <a16:creationId xmlns:a16="http://schemas.microsoft.com/office/drawing/2014/main" id="{649FFE16-93D7-CFAB-2B7F-C225D824A923}"/>
               </a:ext>
             </a:extLst>
           </p:cNvPr>
@@ -12577,7 +12068,7 @@
     </p:spTree>
     <p:extLst>
       <p:ext uri="{BB962C8B-B14F-4D97-AF65-F5344CB8AC3E}">
-        <p14:creationId xmlns:p14="http://schemas.microsoft.com/office/powerpoint/2010/main" val="1606818620"/>
+        <p14:creationId xmlns:p14="http://schemas.microsoft.com/office/powerpoint/2010/main" val="3444062210"/>
       </p:ext>
     </p:extLst>
   </p:cSld>

</xml_diff>

<commit_message>
added some info on interpreters
</commit_message>
<xml_diff>
--- a/Compilers.pptx
+++ b/Compilers.pptx
@@ -5,7 +5,7 @@
     <p:sldMasterId id="2147483648" r:id="rId1"/>
   </p:sldMasterIdLst>
   <p:notesMasterIdLst>
-    <p:notesMasterId r:id="rId26"/>
+    <p:notesMasterId r:id="rId27"/>
   </p:notesMasterIdLst>
   <p:sldIdLst>
     <p:sldId id="256" r:id="rId2"/>
@@ -16,22 +16,23 @@
     <p:sldId id="258" r:id="rId7"/>
     <p:sldId id="259" r:id="rId8"/>
     <p:sldId id="262" r:id="rId9"/>
-    <p:sldId id="264" r:id="rId10"/>
-    <p:sldId id="283" r:id="rId11"/>
-    <p:sldId id="266" r:id="rId12"/>
-    <p:sldId id="267" r:id="rId13"/>
-    <p:sldId id="284" r:id="rId14"/>
-    <p:sldId id="285" r:id="rId15"/>
-    <p:sldId id="286" r:id="rId16"/>
-    <p:sldId id="287" r:id="rId17"/>
-    <p:sldId id="272" r:id="rId18"/>
-    <p:sldId id="288" r:id="rId19"/>
-    <p:sldId id="289" r:id="rId20"/>
-    <p:sldId id="290" r:id="rId21"/>
-    <p:sldId id="291" r:id="rId22"/>
-    <p:sldId id="277" r:id="rId23"/>
-    <p:sldId id="292" r:id="rId24"/>
-    <p:sldId id="293" r:id="rId25"/>
+    <p:sldId id="294" r:id="rId10"/>
+    <p:sldId id="264" r:id="rId11"/>
+    <p:sldId id="283" r:id="rId12"/>
+    <p:sldId id="266" r:id="rId13"/>
+    <p:sldId id="267" r:id="rId14"/>
+    <p:sldId id="284" r:id="rId15"/>
+    <p:sldId id="285" r:id="rId16"/>
+    <p:sldId id="286" r:id="rId17"/>
+    <p:sldId id="287" r:id="rId18"/>
+    <p:sldId id="272" r:id="rId19"/>
+    <p:sldId id="288" r:id="rId20"/>
+    <p:sldId id="289" r:id="rId21"/>
+    <p:sldId id="290" r:id="rId22"/>
+    <p:sldId id="291" r:id="rId23"/>
+    <p:sldId id="277" r:id="rId24"/>
+    <p:sldId id="292" r:id="rId25"/>
+    <p:sldId id="293" r:id="rId26"/>
   </p:sldIdLst>
   <p:sldSz cx="12192000" cy="6858000"/>
   <p:notesSz cx="6858000" cy="9144000"/>
@@ -3992,6 +3993,343 @@
         <p:cNvPr id="1" name="">
           <a:extLst>
             <a:ext uri="{FF2B5EF4-FFF2-40B4-BE49-F238E27FC236}">
+              <a16:creationId xmlns:a16="http://schemas.microsoft.com/office/drawing/2014/main" id="{9C18E758-ED1E-A5DA-D6EF-E9DF5C699923}"/>
+            </a:ext>
+          </a:extLst>
+        </p:cNvPr>
+        <p:cNvGrpSpPr/>
+        <p:nvPr/>
+      </p:nvGrpSpPr>
+      <p:grpSpPr>
+        <a:xfrm>
+          <a:off x="0" y="0"/>
+          <a:ext cx="0" cy="0"/>
+          <a:chOff x="0" y="0"/>
+          <a:chExt cx="0" cy="0"/>
+        </a:xfrm>
+      </p:grpSpPr>
+      <p:sp>
+        <p:nvSpPr>
+          <p:cNvPr id="6" name="Title 5">
+            <a:extLst>
+              <a:ext uri="{FF2B5EF4-FFF2-40B4-BE49-F238E27FC236}">
+                <a16:creationId xmlns:a16="http://schemas.microsoft.com/office/drawing/2014/main" id="{FA4C2B05-E648-9FA4-DCD7-B1EDB9F3BECF}"/>
+              </a:ext>
+            </a:extLst>
+          </p:cNvPr>
+          <p:cNvSpPr>
+            <a:spLocks noGrp="1"/>
+          </p:cNvSpPr>
+          <p:nvPr>
+            <p:ph type="title"/>
+          </p:nvPr>
+        </p:nvSpPr>
+        <p:spPr>
+          <a:xfrm>
+            <a:off x="838200" y="694547"/>
+            <a:ext cx="10515600" cy="1325563"/>
+          </a:xfrm>
+        </p:spPr>
+        <p:txBody>
+          <a:bodyPr/>
+          <a:lstStyle/>
+          <a:p>
+            <a:r>
+              <a:rPr lang="en-US" dirty="0"/>
+              <a:t>Compilers vs Interpreters</a:t>
+            </a:r>
+          </a:p>
+        </p:txBody>
+      </p:sp>
+      <p:sp>
+        <p:nvSpPr>
+          <p:cNvPr id="7" name="Content Placeholder 6">
+            <a:extLst>
+              <a:ext uri="{FF2B5EF4-FFF2-40B4-BE49-F238E27FC236}">
+                <a16:creationId xmlns:a16="http://schemas.microsoft.com/office/drawing/2014/main" id="{D368607E-2AAD-DBDE-9480-8D578F7AC080}"/>
+              </a:ext>
+            </a:extLst>
+          </p:cNvPr>
+          <p:cNvSpPr>
+            <a:spLocks noGrp="1"/>
+          </p:cNvSpPr>
+          <p:nvPr>
+            <p:ph idx="1"/>
+          </p:nvPr>
+        </p:nvSpPr>
+        <p:spPr>
+          <a:xfrm>
+            <a:off x="838200" y="2254763"/>
+            <a:ext cx="10515600" cy="3922201"/>
+          </a:xfrm>
+        </p:spPr>
+        <p:txBody>
+          <a:bodyPr/>
+          <a:lstStyle/>
+          <a:p>
+            <a:r>
+              <a:rPr lang="en-US" dirty="0"/>
+              <a:t>U can write an </a:t>
+            </a:r>
+            <a:r>
+              <a:rPr lang="en-US" dirty="0">
+                <a:solidFill>
+                  <a:schemeClr val="accent2"/>
+                </a:solidFill>
+              </a:rPr>
+              <a:t>interpreter for C </a:t>
+            </a:r>
+            <a:r>
+              <a:rPr lang="en-US" dirty="0"/>
+              <a:t>and a </a:t>
+            </a:r>
+            <a:r>
+              <a:rPr lang="en-US" dirty="0">
+                <a:solidFill>
+                  <a:schemeClr val="accent1"/>
+                </a:solidFill>
+              </a:rPr>
+              <a:t>compiler for JavaScript</a:t>
+            </a:r>
+            <a:r>
+              <a:rPr lang="en-US" dirty="0"/>
+              <a:t>.</a:t>
+            </a:r>
+          </a:p>
+          <a:p>
+            <a:endParaRPr lang="en-US" dirty="0"/>
+          </a:p>
+        </p:txBody>
+      </p:sp>
+      <p:sp>
+        <p:nvSpPr>
+          <p:cNvPr id="4" name="Rectangle 3">
+            <a:extLst>
+              <a:ext uri="{FF2B5EF4-FFF2-40B4-BE49-F238E27FC236}">
+                <a16:creationId xmlns:a16="http://schemas.microsoft.com/office/drawing/2014/main" id="{F233A266-49F8-6F15-9B2E-4BDFA08D628A}"/>
+              </a:ext>
+            </a:extLst>
+          </p:cNvPr>
+          <p:cNvSpPr/>
+          <p:nvPr/>
+        </p:nvSpPr>
+        <p:spPr>
+          <a:xfrm>
+            <a:off x="0" y="0"/>
+            <a:ext cx="12192000" cy="468086"/>
+          </a:xfrm>
+          <a:prstGeom prst="rect">
+            <a:avLst/>
+          </a:prstGeom>
+          <a:solidFill>
+            <a:schemeClr val="bg2"/>
+          </a:solidFill>
+          <a:ln>
+            <a:noFill/>
+          </a:ln>
+        </p:spPr>
+        <p:style>
+          <a:lnRef idx="2">
+            <a:schemeClr val="accent1">
+              <a:shade val="15000"/>
+            </a:schemeClr>
+          </a:lnRef>
+          <a:fillRef idx="1">
+            <a:schemeClr val="accent1"/>
+          </a:fillRef>
+          <a:effectRef idx="0">
+            <a:schemeClr val="accent1"/>
+          </a:effectRef>
+          <a:fontRef idx="minor">
+            <a:schemeClr val="lt1"/>
+          </a:fontRef>
+        </p:style>
+        <p:txBody>
+          <a:bodyPr rtlCol="0" anchor="ctr"/>
+          <a:lstStyle/>
+          <a:p>
+            <a:pPr algn="ctr"/>
+            <a:endParaRPr lang="en-US" sz="1351"/>
+          </a:p>
+        </p:txBody>
+      </p:sp>
+      <p:sp>
+        <p:nvSpPr>
+          <p:cNvPr id="5" name="Oval 4">
+            <a:extLst>
+              <a:ext uri="{FF2B5EF4-FFF2-40B4-BE49-F238E27FC236}">
+                <a16:creationId xmlns:a16="http://schemas.microsoft.com/office/drawing/2014/main" id="{6C2DB65A-3098-E41E-5444-5D4FDADFAAB2}"/>
+              </a:ext>
+            </a:extLst>
+          </p:cNvPr>
+          <p:cNvSpPr/>
+          <p:nvPr/>
+        </p:nvSpPr>
+        <p:spPr>
+          <a:xfrm>
+            <a:off x="129189" y="108651"/>
+            <a:ext cx="246109" cy="250784"/>
+          </a:xfrm>
+          <a:prstGeom prst="ellipse">
+            <a:avLst/>
+          </a:prstGeom>
+          <a:solidFill>
+            <a:schemeClr val="accent1"/>
+          </a:solidFill>
+          <a:ln>
+            <a:noFill/>
+          </a:ln>
+        </p:spPr>
+        <p:style>
+          <a:lnRef idx="2">
+            <a:schemeClr val="accent1">
+              <a:shade val="15000"/>
+            </a:schemeClr>
+          </a:lnRef>
+          <a:fillRef idx="1">
+            <a:schemeClr val="accent1"/>
+          </a:fillRef>
+          <a:effectRef idx="0">
+            <a:schemeClr val="accent1"/>
+          </a:effectRef>
+          <a:fontRef idx="minor">
+            <a:schemeClr val="lt1"/>
+          </a:fontRef>
+        </p:style>
+        <p:txBody>
+          <a:bodyPr rtlCol="0" anchor="ctr"/>
+          <a:lstStyle/>
+          <a:p>
+            <a:pPr algn="ctr"/>
+            <a:endParaRPr lang="en-US"/>
+          </a:p>
+        </p:txBody>
+      </p:sp>
+      <p:sp>
+        <p:nvSpPr>
+          <p:cNvPr id="8" name="Oval 7">
+            <a:extLst>
+              <a:ext uri="{FF2B5EF4-FFF2-40B4-BE49-F238E27FC236}">
+                <a16:creationId xmlns:a16="http://schemas.microsoft.com/office/drawing/2014/main" id="{E833ED17-7925-7B42-2DA8-68FFB1A203C0}"/>
+              </a:ext>
+            </a:extLst>
+          </p:cNvPr>
+          <p:cNvSpPr/>
+          <p:nvPr/>
+        </p:nvSpPr>
+        <p:spPr>
+          <a:xfrm>
+            <a:off x="504487" y="113785"/>
+            <a:ext cx="246109" cy="250784"/>
+          </a:xfrm>
+          <a:prstGeom prst="ellipse">
+            <a:avLst/>
+          </a:prstGeom>
+          <a:solidFill>
+            <a:schemeClr val="accent3"/>
+          </a:solidFill>
+          <a:ln>
+            <a:noFill/>
+          </a:ln>
+        </p:spPr>
+        <p:style>
+          <a:lnRef idx="2">
+            <a:schemeClr val="accent1">
+              <a:shade val="15000"/>
+            </a:schemeClr>
+          </a:lnRef>
+          <a:fillRef idx="1">
+            <a:schemeClr val="accent1"/>
+          </a:fillRef>
+          <a:effectRef idx="0">
+            <a:schemeClr val="accent1"/>
+          </a:effectRef>
+          <a:fontRef idx="minor">
+            <a:schemeClr val="lt1"/>
+          </a:fontRef>
+        </p:style>
+        <p:txBody>
+          <a:bodyPr rtlCol="0" anchor="ctr"/>
+          <a:lstStyle/>
+          <a:p>
+            <a:pPr algn="ctr"/>
+            <a:endParaRPr lang="en-US"/>
+          </a:p>
+        </p:txBody>
+      </p:sp>
+      <p:sp>
+        <p:nvSpPr>
+          <p:cNvPr id="9" name="Oval 8">
+            <a:extLst>
+              <a:ext uri="{FF2B5EF4-FFF2-40B4-BE49-F238E27FC236}">
+                <a16:creationId xmlns:a16="http://schemas.microsoft.com/office/drawing/2014/main" id="{649FFE16-93D7-CFAB-2B7F-C225D824A923}"/>
+              </a:ext>
+            </a:extLst>
+          </p:cNvPr>
+          <p:cNvSpPr/>
+          <p:nvPr/>
+        </p:nvSpPr>
+        <p:spPr>
+          <a:xfrm>
+            <a:off x="879785" y="108651"/>
+            <a:ext cx="246109" cy="250784"/>
+          </a:xfrm>
+          <a:prstGeom prst="ellipse">
+            <a:avLst/>
+          </a:prstGeom>
+          <a:solidFill>
+            <a:schemeClr val="accent2"/>
+          </a:solidFill>
+          <a:ln>
+            <a:noFill/>
+          </a:ln>
+        </p:spPr>
+        <p:style>
+          <a:lnRef idx="2">
+            <a:schemeClr val="accent1">
+              <a:shade val="15000"/>
+            </a:schemeClr>
+          </a:lnRef>
+          <a:fillRef idx="1">
+            <a:schemeClr val="accent1"/>
+          </a:fillRef>
+          <a:effectRef idx="0">
+            <a:schemeClr val="accent1"/>
+          </a:effectRef>
+          <a:fontRef idx="minor">
+            <a:schemeClr val="lt1"/>
+          </a:fontRef>
+        </p:style>
+        <p:txBody>
+          <a:bodyPr rtlCol="0" anchor="ctr"/>
+          <a:lstStyle/>
+          <a:p>
+            <a:pPr algn="ctr"/>
+            <a:endParaRPr lang="en-US"/>
+          </a:p>
+        </p:txBody>
+      </p:sp>
+    </p:spTree>
+    <p:extLst>
+      <p:ext uri="{BB962C8B-B14F-4D97-AF65-F5344CB8AC3E}">
+        <p14:creationId xmlns:p14="http://schemas.microsoft.com/office/powerpoint/2010/main" val="3444062210"/>
+      </p:ext>
+    </p:extLst>
+  </p:cSld>
+  <p:clrMapOvr>
+    <a:masterClrMapping/>
+  </p:clrMapOvr>
+</p:sld>
+</file>
+
+<file path=ppt/slides/slide11.xml><?xml version="1.0" encoding="utf-8"?>
+<p:sld xmlns:a="http://schemas.openxmlformats.org/drawingml/2006/main" xmlns:r="http://schemas.openxmlformats.org/officeDocument/2006/relationships" xmlns:p="http://schemas.openxmlformats.org/presentationml/2006/main">
+  <p:cSld>
+    <p:spTree>
+      <p:nvGrpSpPr>
+        <p:cNvPr id="1" name="">
+          <a:extLst>
+            <a:ext uri="{FF2B5EF4-FFF2-40B4-BE49-F238E27FC236}">
               <a16:creationId xmlns:a16="http://schemas.microsoft.com/office/drawing/2014/main" id="{BE705356-F522-421E-B70C-296C57450B8C}"/>
             </a:ext>
           </a:extLst>
@@ -4258,7 +4596,7 @@
 </p:sld>
 </file>
 
-<file path=ppt/slides/slide11.xml><?xml version="1.0" encoding="utf-8"?>
+<file path=ppt/slides/slide12.xml><?xml version="1.0" encoding="utf-8"?>
 <p:sld xmlns:a="http://schemas.openxmlformats.org/drawingml/2006/main" xmlns:r="http://schemas.openxmlformats.org/officeDocument/2006/relationships" xmlns:p="http://schemas.openxmlformats.org/presentationml/2006/main">
   <p:cSld>
     <p:spTree>
@@ -4340,7 +4678,10 @@
           <a:bodyPr/>
           <a:lstStyle/>
           <a:p>
-            <a:endParaRPr lang="en-US" dirty="0"/>
+            <a:r>
+              <a:rPr lang="en-US" dirty="0"/>
+              <a:t>This guy is very cool, it runs the program a few times then sees what to optimize and then optimizes it just in time.</a:t>
+            </a:r>
           </a:p>
         </p:txBody>
       </p:sp>
@@ -4565,7 +4906,7 @@
 </p:sld>
 </file>
 
-<file path=ppt/slides/slide12.xml><?xml version="1.0" encoding="utf-8"?>
+<file path=ppt/slides/slide13.xml><?xml version="1.0" encoding="utf-8"?>
 <p:sld xmlns:a="http://schemas.openxmlformats.org/drawingml/2006/main" xmlns:r="http://schemas.openxmlformats.org/officeDocument/2006/relationships" xmlns:p="http://schemas.openxmlformats.org/presentationml/2006/main">
   <p:cSld>
     <p:spTree>
@@ -4872,7 +5213,7 @@
 </p:sld>
 </file>
 
-<file path=ppt/slides/slide13.xml><?xml version="1.0" encoding="utf-8"?>
+<file path=ppt/slides/slide14.xml><?xml version="1.0" encoding="utf-8"?>
 <p:sld xmlns:a="http://schemas.openxmlformats.org/drawingml/2006/main" xmlns:r="http://schemas.openxmlformats.org/officeDocument/2006/relationships" xmlns:p="http://schemas.openxmlformats.org/presentationml/2006/main">
   <p:cSld>
     <p:spTree>
@@ -5146,7 +5487,7 @@
 </p:sld>
 </file>
 
-<file path=ppt/slides/slide14.xml><?xml version="1.0" encoding="utf-8"?>
+<file path=ppt/slides/slide15.xml><?xml version="1.0" encoding="utf-8"?>
 <p:sld xmlns:a="http://schemas.openxmlformats.org/drawingml/2006/main" xmlns:r="http://schemas.openxmlformats.org/officeDocument/2006/relationships" xmlns:p="http://schemas.openxmlformats.org/presentationml/2006/main">
   <p:cSld>
     <p:spTree>
@@ -5420,7 +5761,7 @@
 </p:sld>
 </file>
 
-<file path=ppt/slides/slide15.xml><?xml version="1.0" encoding="utf-8"?>
+<file path=ppt/slides/slide16.xml><?xml version="1.0" encoding="utf-8"?>
 <p:sld xmlns:a="http://schemas.openxmlformats.org/drawingml/2006/main" xmlns:r="http://schemas.openxmlformats.org/officeDocument/2006/relationships" xmlns:p="http://schemas.openxmlformats.org/presentationml/2006/main">
   <p:cSld>
     <p:spTree>
@@ -5694,7 +6035,7 @@
 </p:sld>
 </file>
 
-<file path=ppt/slides/slide16.xml><?xml version="1.0" encoding="utf-8"?>
+<file path=ppt/slides/slide17.xml><?xml version="1.0" encoding="utf-8"?>
 <p:sld xmlns:a="http://schemas.openxmlformats.org/drawingml/2006/main" xmlns:r="http://schemas.openxmlformats.org/officeDocument/2006/relationships" xmlns:p="http://schemas.openxmlformats.org/presentationml/2006/main">
   <p:cSld>
     <p:spTree>
@@ -5968,7 +6309,7 @@
 </p:sld>
 </file>
 
-<file path=ppt/slides/slide17.xml><?xml version="1.0" encoding="utf-8"?>
+<file path=ppt/slides/slide18.xml><?xml version="1.0" encoding="utf-8"?>
 <p:sld xmlns:a="http://schemas.openxmlformats.org/drawingml/2006/main" xmlns:r="http://schemas.openxmlformats.org/officeDocument/2006/relationships" xmlns:p="http://schemas.openxmlformats.org/presentationml/2006/main">
   <p:cSld>
     <p:spTree>
@@ -6275,7 +6616,7 @@
 </p:sld>
 </file>
 
-<file path=ppt/slides/slide18.xml><?xml version="1.0" encoding="utf-8"?>
+<file path=ppt/slides/slide19.xml><?xml version="1.0" encoding="utf-8"?>
 <p:sld xmlns:a="http://schemas.openxmlformats.org/drawingml/2006/main" xmlns:r="http://schemas.openxmlformats.org/officeDocument/2006/relationships" xmlns:p="http://schemas.openxmlformats.org/presentationml/2006/main">
   <p:cSld>
     <p:spTree>
@@ -6540,280 +6881,6 @@
     <p:extLst>
       <p:ext uri="{BB962C8B-B14F-4D97-AF65-F5344CB8AC3E}">
         <p14:creationId xmlns:p14="http://schemas.microsoft.com/office/powerpoint/2010/main" val="3651787086"/>
-      </p:ext>
-    </p:extLst>
-  </p:cSld>
-  <p:clrMapOvr>
-    <a:masterClrMapping/>
-  </p:clrMapOvr>
-</p:sld>
-</file>
-
-<file path=ppt/slides/slide19.xml><?xml version="1.0" encoding="utf-8"?>
-<p:sld xmlns:a="http://schemas.openxmlformats.org/drawingml/2006/main" xmlns:r="http://schemas.openxmlformats.org/officeDocument/2006/relationships" xmlns:p="http://schemas.openxmlformats.org/presentationml/2006/main">
-  <p:cSld>
-    <p:spTree>
-      <p:nvGrpSpPr>
-        <p:cNvPr id="1" name="">
-          <a:extLst>
-            <a:ext uri="{FF2B5EF4-FFF2-40B4-BE49-F238E27FC236}">
-              <a16:creationId xmlns:a16="http://schemas.microsoft.com/office/drawing/2014/main" id="{4006BBBD-5C09-5940-6E05-8F30A57A4832}"/>
-            </a:ext>
-          </a:extLst>
-        </p:cNvPr>
-        <p:cNvGrpSpPr/>
-        <p:nvPr/>
-      </p:nvGrpSpPr>
-      <p:grpSpPr>
-        <a:xfrm>
-          <a:off x="0" y="0"/>
-          <a:ext cx="0" cy="0"/>
-          <a:chOff x="0" y="0"/>
-          <a:chExt cx="0" cy="0"/>
-        </a:xfrm>
-      </p:grpSpPr>
-      <p:sp>
-        <p:nvSpPr>
-          <p:cNvPr id="7" name="Content Placeholder 6">
-            <a:extLst>
-              <a:ext uri="{FF2B5EF4-FFF2-40B4-BE49-F238E27FC236}">
-                <a16:creationId xmlns:a16="http://schemas.microsoft.com/office/drawing/2014/main" id="{218FEBD3-B021-F0B6-B437-500EF2EE52D5}"/>
-              </a:ext>
-            </a:extLst>
-          </p:cNvPr>
-          <p:cNvSpPr>
-            <a:spLocks noGrp="1"/>
-          </p:cNvSpPr>
-          <p:nvPr>
-            <p:ph idx="1"/>
-          </p:nvPr>
-        </p:nvSpPr>
-        <p:spPr>
-          <a:xfrm>
-            <a:off x="838200" y="988399"/>
-            <a:ext cx="10515600" cy="5188566"/>
-          </a:xfrm>
-        </p:spPr>
-        <p:txBody>
-          <a:bodyPr/>
-          <a:lstStyle/>
-          <a:p>
-            <a:endParaRPr lang="en-US" dirty="0"/>
-          </a:p>
-        </p:txBody>
-      </p:sp>
-      <p:sp>
-        <p:nvSpPr>
-          <p:cNvPr id="4" name="Rectangle 3">
-            <a:extLst>
-              <a:ext uri="{FF2B5EF4-FFF2-40B4-BE49-F238E27FC236}">
-                <a16:creationId xmlns:a16="http://schemas.microsoft.com/office/drawing/2014/main" id="{6B734884-79B7-E49D-F8B9-7E24B1A4F9BC}"/>
-              </a:ext>
-            </a:extLst>
-          </p:cNvPr>
-          <p:cNvSpPr/>
-          <p:nvPr/>
-        </p:nvSpPr>
-        <p:spPr>
-          <a:xfrm>
-            <a:off x="0" y="0"/>
-            <a:ext cx="12192000" cy="468086"/>
-          </a:xfrm>
-          <a:prstGeom prst="rect">
-            <a:avLst/>
-          </a:prstGeom>
-          <a:solidFill>
-            <a:schemeClr val="bg2"/>
-          </a:solidFill>
-          <a:ln>
-            <a:noFill/>
-          </a:ln>
-        </p:spPr>
-        <p:style>
-          <a:lnRef idx="2">
-            <a:schemeClr val="accent1">
-              <a:shade val="15000"/>
-            </a:schemeClr>
-          </a:lnRef>
-          <a:fillRef idx="1">
-            <a:schemeClr val="accent1"/>
-          </a:fillRef>
-          <a:effectRef idx="0">
-            <a:schemeClr val="accent1"/>
-          </a:effectRef>
-          <a:fontRef idx="minor">
-            <a:schemeClr val="lt1"/>
-          </a:fontRef>
-        </p:style>
-        <p:txBody>
-          <a:bodyPr rtlCol="0" anchor="ctr"/>
-          <a:lstStyle/>
-          <a:p>
-            <a:pPr algn="ctr"/>
-            <a:endParaRPr lang="en-US" sz="1351"/>
-          </a:p>
-        </p:txBody>
-      </p:sp>
-      <p:sp>
-        <p:nvSpPr>
-          <p:cNvPr id="5" name="Oval 4">
-            <a:extLst>
-              <a:ext uri="{FF2B5EF4-FFF2-40B4-BE49-F238E27FC236}">
-                <a16:creationId xmlns:a16="http://schemas.microsoft.com/office/drawing/2014/main" id="{31E2FBF8-7E8C-B581-F42E-91DC5F9BE2A8}"/>
-              </a:ext>
-            </a:extLst>
-          </p:cNvPr>
-          <p:cNvSpPr/>
-          <p:nvPr/>
-        </p:nvSpPr>
-        <p:spPr>
-          <a:xfrm>
-            <a:off x="129189" y="108651"/>
-            <a:ext cx="246109" cy="250784"/>
-          </a:xfrm>
-          <a:prstGeom prst="ellipse">
-            <a:avLst/>
-          </a:prstGeom>
-          <a:solidFill>
-            <a:schemeClr val="accent1"/>
-          </a:solidFill>
-          <a:ln>
-            <a:noFill/>
-          </a:ln>
-        </p:spPr>
-        <p:style>
-          <a:lnRef idx="2">
-            <a:schemeClr val="accent1">
-              <a:shade val="15000"/>
-            </a:schemeClr>
-          </a:lnRef>
-          <a:fillRef idx="1">
-            <a:schemeClr val="accent1"/>
-          </a:fillRef>
-          <a:effectRef idx="0">
-            <a:schemeClr val="accent1"/>
-          </a:effectRef>
-          <a:fontRef idx="minor">
-            <a:schemeClr val="lt1"/>
-          </a:fontRef>
-        </p:style>
-        <p:txBody>
-          <a:bodyPr rtlCol="0" anchor="ctr"/>
-          <a:lstStyle/>
-          <a:p>
-            <a:pPr algn="ctr"/>
-            <a:endParaRPr lang="en-US"/>
-          </a:p>
-        </p:txBody>
-      </p:sp>
-      <p:sp>
-        <p:nvSpPr>
-          <p:cNvPr id="8" name="Oval 7">
-            <a:extLst>
-              <a:ext uri="{FF2B5EF4-FFF2-40B4-BE49-F238E27FC236}">
-                <a16:creationId xmlns:a16="http://schemas.microsoft.com/office/drawing/2014/main" id="{FC2F5809-2092-24E4-BC04-43C924B5C83A}"/>
-              </a:ext>
-            </a:extLst>
-          </p:cNvPr>
-          <p:cNvSpPr/>
-          <p:nvPr/>
-        </p:nvSpPr>
-        <p:spPr>
-          <a:xfrm>
-            <a:off x="504487" y="113785"/>
-            <a:ext cx="246109" cy="250784"/>
-          </a:xfrm>
-          <a:prstGeom prst="ellipse">
-            <a:avLst/>
-          </a:prstGeom>
-          <a:solidFill>
-            <a:schemeClr val="accent3"/>
-          </a:solidFill>
-          <a:ln>
-            <a:noFill/>
-          </a:ln>
-        </p:spPr>
-        <p:style>
-          <a:lnRef idx="2">
-            <a:schemeClr val="accent1">
-              <a:shade val="15000"/>
-            </a:schemeClr>
-          </a:lnRef>
-          <a:fillRef idx="1">
-            <a:schemeClr val="accent1"/>
-          </a:fillRef>
-          <a:effectRef idx="0">
-            <a:schemeClr val="accent1"/>
-          </a:effectRef>
-          <a:fontRef idx="minor">
-            <a:schemeClr val="lt1"/>
-          </a:fontRef>
-        </p:style>
-        <p:txBody>
-          <a:bodyPr rtlCol="0" anchor="ctr"/>
-          <a:lstStyle/>
-          <a:p>
-            <a:pPr algn="ctr"/>
-            <a:endParaRPr lang="en-US"/>
-          </a:p>
-        </p:txBody>
-      </p:sp>
-      <p:sp>
-        <p:nvSpPr>
-          <p:cNvPr id="9" name="Oval 8">
-            <a:extLst>
-              <a:ext uri="{FF2B5EF4-FFF2-40B4-BE49-F238E27FC236}">
-                <a16:creationId xmlns:a16="http://schemas.microsoft.com/office/drawing/2014/main" id="{D9172223-9867-C64D-D19E-6C8E4EEA16E7}"/>
-              </a:ext>
-            </a:extLst>
-          </p:cNvPr>
-          <p:cNvSpPr/>
-          <p:nvPr/>
-        </p:nvSpPr>
-        <p:spPr>
-          <a:xfrm>
-            <a:off x="879785" y="108651"/>
-            <a:ext cx="246109" cy="250784"/>
-          </a:xfrm>
-          <a:prstGeom prst="ellipse">
-            <a:avLst/>
-          </a:prstGeom>
-          <a:solidFill>
-            <a:schemeClr val="accent2"/>
-          </a:solidFill>
-          <a:ln>
-            <a:noFill/>
-          </a:ln>
-        </p:spPr>
-        <p:style>
-          <a:lnRef idx="2">
-            <a:schemeClr val="accent1">
-              <a:shade val="15000"/>
-            </a:schemeClr>
-          </a:lnRef>
-          <a:fillRef idx="1">
-            <a:schemeClr val="accent1"/>
-          </a:fillRef>
-          <a:effectRef idx="0">
-            <a:schemeClr val="accent1"/>
-          </a:effectRef>
-          <a:fontRef idx="minor">
-            <a:schemeClr val="lt1"/>
-          </a:fontRef>
-        </p:style>
-        <p:txBody>
-          <a:bodyPr rtlCol="0" anchor="ctr"/>
-          <a:lstStyle/>
-          <a:p>
-            <a:pPr algn="ctr"/>
-            <a:endParaRPr lang="en-US"/>
-          </a:p>
-        </p:txBody>
-      </p:sp>
-    </p:spTree>
-    <p:extLst>
-      <p:ext uri="{BB962C8B-B14F-4D97-AF65-F5344CB8AC3E}">
-        <p14:creationId xmlns:p14="http://schemas.microsoft.com/office/powerpoint/2010/main" val="3868304331"/>
       </p:ext>
     </p:extLst>
   </p:cSld>
@@ -7339,6 +7406,280 @@
         <p:cNvPr id="1" name="">
           <a:extLst>
             <a:ext uri="{FF2B5EF4-FFF2-40B4-BE49-F238E27FC236}">
+              <a16:creationId xmlns:a16="http://schemas.microsoft.com/office/drawing/2014/main" id="{4006BBBD-5C09-5940-6E05-8F30A57A4832}"/>
+            </a:ext>
+          </a:extLst>
+        </p:cNvPr>
+        <p:cNvGrpSpPr/>
+        <p:nvPr/>
+      </p:nvGrpSpPr>
+      <p:grpSpPr>
+        <a:xfrm>
+          <a:off x="0" y="0"/>
+          <a:ext cx="0" cy="0"/>
+          <a:chOff x="0" y="0"/>
+          <a:chExt cx="0" cy="0"/>
+        </a:xfrm>
+      </p:grpSpPr>
+      <p:sp>
+        <p:nvSpPr>
+          <p:cNvPr id="7" name="Content Placeholder 6">
+            <a:extLst>
+              <a:ext uri="{FF2B5EF4-FFF2-40B4-BE49-F238E27FC236}">
+                <a16:creationId xmlns:a16="http://schemas.microsoft.com/office/drawing/2014/main" id="{218FEBD3-B021-F0B6-B437-500EF2EE52D5}"/>
+              </a:ext>
+            </a:extLst>
+          </p:cNvPr>
+          <p:cNvSpPr>
+            <a:spLocks noGrp="1"/>
+          </p:cNvSpPr>
+          <p:nvPr>
+            <p:ph idx="1"/>
+          </p:nvPr>
+        </p:nvSpPr>
+        <p:spPr>
+          <a:xfrm>
+            <a:off x="838200" y="988399"/>
+            <a:ext cx="10515600" cy="5188566"/>
+          </a:xfrm>
+        </p:spPr>
+        <p:txBody>
+          <a:bodyPr/>
+          <a:lstStyle/>
+          <a:p>
+            <a:endParaRPr lang="en-US" dirty="0"/>
+          </a:p>
+        </p:txBody>
+      </p:sp>
+      <p:sp>
+        <p:nvSpPr>
+          <p:cNvPr id="4" name="Rectangle 3">
+            <a:extLst>
+              <a:ext uri="{FF2B5EF4-FFF2-40B4-BE49-F238E27FC236}">
+                <a16:creationId xmlns:a16="http://schemas.microsoft.com/office/drawing/2014/main" id="{6B734884-79B7-E49D-F8B9-7E24B1A4F9BC}"/>
+              </a:ext>
+            </a:extLst>
+          </p:cNvPr>
+          <p:cNvSpPr/>
+          <p:nvPr/>
+        </p:nvSpPr>
+        <p:spPr>
+          <a:xfrm>
+            <a:off x="0" y="0"/>
+            <a:ext cx="12192000" cy="468086"/>
+          </a:xfrm>
+          <a:prstGeom prst="rect">
+            <a:avLst/>
+          </a:prstGeom>
+          <a:solidFill>
+            <a:schemeClr val="bg2"/>
+          </a:solidFill>
+          <a:ln>
+            <a:noFill/>
+          </a:ln>
+        </p:spPr>
+        <p:style>
+          <a:lnRef idx="2">
+            <a:schemeClr val="accent1">
+              <a:shade val="15000"/>
+            </a:schemeClr>
+          </a:lnRef>
+          <a:fillRef idx="1">
+            <a:schemeClr val="accent1"/>
+          </a:fillRef>
+          <a:effectRef idx="0">
+            <a:schemeClr val="accent1"/>
+          </a:effectRef>
+          <a:fontRef idx="minor">
+            <a:schemeClr val="lt1"/>
+          </a:fontRef>
+        </p:style>
+        <p:txBody>
+          <a:bodyPr rtlCol="0" anchor="ctr"/>
+          <a:lstStyle/>
+          <a:p>
+            <a:pPr algn="ctr"/>
+            <a:endParaRPr lang="en-US" sz="1351"/>
+          </a:p>
+        </p:txBody>
+      </p:sp>
+      <p:sp>
+        <p:nvSpPr>
+          <p:cNvPr id="5" name="Oval 4">
+            <a:extLst>
+              <a:ext uri="{FF2B5EF4-FFF2-40B4-BE49-F238E27FC236}">
+                <a16:creationId xmlns:a16="http://schemas.microsoft.com/office/drawing/2014/main" id="{31E2FBF8-7E8C-B581-F42E-91DC5F9BE2A8}"/>
+              </a:ext>
+            </a:extLst>
+          </p:cNvPr>
+          <p:cNvSpPr/>
+          <p:nvPr/>
+        </p:nvSpPr>
+        <p:spPr>
+          <a:xfrm>
+            <a:off x="129189" y="108651"/>
+            <a:ext cx="246109" cy="250784"/>
+          </a:xfrm>
+          <a:prstGeom prst="ellipse">
+            <a:avLst/>
+          </a:prstGeom>
+          <a:solidFill>
+            <a:schemeClr val="accent1"/>
+          </a:solidFill>
+          <a:ln>
+            <a:noFill/>
+          </a:ln>
+        </p:spPr>
+        <p:style>
+          <a:lnRef idx="2">
+            <a:schemeClr val="accent1">
+              <a:shade val="15000"/>
+            </a:schemeClr>
+          </a:lnRef>
+          <a:fillRef idx="1">
+            <a:schemeClr val="accent1"/>
+          </a:fillRef>
+          <a:effectRef idx="0">
+            <a:schemeClr val="accent1"/>
+          </a:effectRef>
+          <a:fontRef idx="minor">
+            <a:schemeClr val="lt1"/>
+          </a:fontRef>
+        </p:style>
+        <p:txBody>
+          <a:bodyPr rtlCol="0" anchor="ctr"/>
+          <a:lstStyle/>
+          <a:p>
+            <a:pPr algn="ctr"/>
+            <a:endParaRPr lang="en-US"/>
+          </a:p>
+        </p:txBody>
+      </p:sp>
+      <p:sp>
+        <p:nvSpPr>
+          <p:cNvPr id="8" name="Oval 7">
+            <a:extLst>
+              <a:ext uri="{FF2B5EF4-FFF2-40B4-BE49-F238E27FC236}">
+                <a16:creationId xmlns:a16="http://schemas.microsoft.com/office/drawing/2014/main" id="{FC2F5809-2092-24E4-BC04-43C924B5C83A}"/>
+              </a:ext>
+            </a:extLst>
+          </p:cNvPr>
+          <p:cNvSpPr/>
+          <p:nvPr/>
+        </p:nvSpPr>
+        <p:spPr>
+          <a:xfrm>
+            <a:off x="504487" y="113785"/>
+            <a:ext cx="246109" cy="250784"/>
+          </a:xfrm>
+          <a:prstGeom prst="ellipse">
+            <a:avLst/>
+          </a:prstGeom>
+          <a:solidFill>
+            <a:schemeClr val="accent3"/>
+          </a:solidFill>
+          <a:ln>
+            <a:noFill/>
+          </a:ln>
+        </p:spPr>
+        <p:style>
+          <a:lnRef idx="2">
+            <a:schemeClr val="accent1">
+              <a:shade val="15000"/>
+            </a:schemeClr>
+          </a:lnRef>
+          <a:fillRef idx="1">
+            <a:schemeClr val="accent1"/>
+          </a:fillRef>
+          <a:effectRef idx="0">
+            <a:schemeClr val="accent1"/>
+          </a:effectRef>
+          <a:fontRef idx="minor">
+            <a:schemeClr val="lt1"/>
+          </a:fontRef>
+        </p:style>
+        <p:txBody>
+          <a:bodyPr rtlCol="0" anchor="ctr"/>
+          <a:lstStyle/>
+          <a:p>
+            <a:pPr algn="ctr"/>
+            <a:endParaRPr lang="en-US"/>
+          </a:p>
+        </p:txBody>
+      </p:sp>
+      <p:sp>
+        <p:nvSpPr>
+          <p:cNvPr id="9" name="Oval 8">
+            <a:extLst>
+              <a:ext uri="{FF2B5EF4-FFF2-40B4-BE49-F238E27FC236}">
+                <a16:creationId xmlns:a16="http://schemas.microsoft.com/office/drawing/2014/main" id="{D9172223-9867-C64D-D19E-6C8E4EEA16E7}"/>
+              </a:ext>
+            </a:extLst>
+          </p:cNvPr>
+          <p:cNvSpPr/>
+          <p:nvPr/>
+        </p:nvSpPr>
+        <p:spPr>
+          <a:xfrm>
+            <a:off x="879785" y="108651"/>
+            <a:ext cx="246109" cy="250784"/>
+          </a:xfrm>
+          <a:prstGeom prst="ellipse">
+            <a:avLst/>
+          </a:prstGeom>
+          <a:solidFill>
+            <a:schemeClr val="accent2"/>
+          </a:solidFill>
+          <a:ln>
+            <a:noFill/>
+          </a:ln>
+        </p:spPr>
+        <p:style>
+          <a:lnRef idx="2">
+            <a:schemeClr val="accent1">
+              <a:shade val="15000"/>
+            </a:schemeClr>
+          </a:lnRef>
+          <a:fillRef idx="1">
+            <a:schemeClr val="accent1"/>
+          </a:fillRef>
+          <a:effectRef idx="0">
+            <a:schemeClr val="accent1"/>
+          </a:effectRef>
+          <a:fontRef idx="minor">
+            <a:schemeClr val="lt1"/>
+          </a:fontRef>
+        </p:style>
+        <p:txBody>
+          <a:bodyPr rtlCol="0" anchor="ctr"/>
+          <a:lstStyle/>
+          <a:p>
+            <a:pPr algn="ctr"/>
+            <a:endParaRPr lang="en-US"/>
+          </a:p>
+        </p:txBody>
+      </p:sp>
+    </p:spTree>
+    <p:extLst>
+      <p:ext uri="{BB962C8B-B14F-4D97-AF65-F5344CB8AC3E}">
+        <p14:creationId xmlns:p14="http://schemas.microsoft.com/office/powerpoint/2010/main" val="3868304331"/>
+      </p:ext>
+    </p:extLst>
+  </p:cSld>
+  <p:clrMapOvr>
+    <a:masterClrMapping/>
+  </p:clrMapOvr>
+</p:sld>
+</file>
+
+<file path=ppt/slides/slide21.xml><?xml version="1.0" encoding="utf-8"?>
+<p:sld xmlns:a="http://schemas.openxmlformats.org/drawingml/2006/main" xmlns:r="http://schemas.openxmlformats.org/officeDocument/2006/relationships" xmlns:p="http://schemas.openxmlformats.org/presentationml/2006/main">
+  <p:cSld>
+    <p:spTree>
+      <p:nvGrpSpPr>
+        <p:cNvPr id="1" name="">
+          <a:extLst>
+            <a:ext uri="{FF2B5EF4-FFF2-40B4-BE49-F238E27FC236}">
               <a16:creationId xmlns:a16="http://schemas.microsoft.com/office/drawing/2014/main" id="{32BEE9FE-735E-DBE7-AEFF-6CA50E45287F}"/>
             </a:ext>
           </a:extLst>
@@ -7605,7 +7946,7 @@
 </p:sld>
 </file>
 
-<file path=ppt/slides/slide21.xml><?xml version="1.0" encoding="utf-8"?>
+<file path=ppt/slides/slide22.xml><?xml version="1.0" encoding="utf-8"?>
 <p:sld xmlns:a="http://schemas.openxmlformats.org/drawingml/2006/main" xmlns:r="http://schemas.openxmlformats.org/officeDocument/2006/relationships" xmlns:p="http://schemas.openxmlformats.org/presentationml/2006/main">
   <p:cSld>
     <p:spTree>
@@ -7879,7 +8220,7 @@
 </p:sld>
 </file>
 
-<file path=ppt/slides/slide22.xml><?xml version="1.0" encoding="utf-8"?>
+<file path=ppt/slides/slide23.xml><?xml version="1.0" encoding="utf-8"?>
 <p:sld xmlns:a="http://schemas.openxmlformats.org/drawingml/2006/main" xmlns:r="http://schemas.openxmlformats.org/officeDocument/2006/relationships" xmlns:p="http://schemas.openxmlformats.org/presentationml/2006/main">
   <p:cSld>
     <p:spTree>
@@ -8239,7 +8580,7 @@
 </p:sld>
 </file>
 
-<file path=ppt/slides/slide23.xml><?xml version="1.0" encoding="utf-8"?>
+<file path=ppt/slides/slide24.xml><?xml version="1.0" encoding="utf-8"?>
 <p:sld xmlns:a="http://schemas.openxmlformats.org/drawingml/2006/main" xmlns:r="http://schemas.openxmlformats.org/officeDocument/2006/relationships" xmlns:p="http://schemas.openxmlformats.org/presentationml/2006/main">
   <p:cSld>
     <p:spTree>
@@ -8583,7 +8924,7 @@
 </p:sld>
 </file>
 
-<file path=ppt/slides/slide24.xml><?xml version="1.0" encoding="utf-8"?>
+<file path=ppt/slides/slide25.xml><?xml version="1.0" encoding="utf-8"?>
 <p:sld xmlns:a="http://schemas.openxmlformats.org/drawingml/2006/main" xmlns:r="http://schemas.openxmlformats.org/officeDocument/2006/relationships" xmlns:p="http://schemas.openxmlformats.org/presentationml/2006/main">
   <p:cSld>
     <p:spTree>
@@ -11515,7 +11856,19 @@
           <a:p>
             <a:r>
               <a:rPr lang="en-US" dirty="0"/>
-              <a:t>It takes the source code and directly executes it.</a:t>
+              <a:t>It takes the source code, converts it to machine instructions and directly runs them.</a:t>
+            </a:r>
+          </a:p>
+          <a:p>
+            <a:r>
+              <a:rPr lang="en-US" dirty="0"/>
+              <a:t>The working of a interpreter is closely associated to how a debugger works.</a:t>
+            </a:r>
+          </a:p>
+          <a:p>
+            <a:r>
+              <a:rPr lang="en-US" dirty="0"/>
+              <a:t>This was developed to run projects or apps which are still under construction.</a:t>
             </a:r>
           </a:p>
         </p:txBody>
@@ -11749,7 +12102,7 @@
         <p:cNvPr id="1" name="">
           <a:extLst>
             <a:ext uri="{FF2B5EF4-FFF2-40B4-BE49-F238E27FC236}">
-              <a16:creationId xmlns:a16="http://schemas.microsoft.com/office/drawing/2014/main" id="{9C18E758-ED1E-A5DA-D6EF-E9DF5C699923}"/>
+              <a16:creationId xmlns:a16="http://schemas.microsoft.com/office/drawing/2014/main" id="{1131A72C-29C2-BD74-232A-47A2681EA540}"/>
             </a:ext>
           </a:extLst>
         </p:cNvPr>
@@ -11766,43 +12119,10 @@
       </p:grpSpPr>
       <p:sp>
         <p:nvSpPr>
-          <p:cNvPr id="6" name="Title 5">
-            <a:extLst>
-              <a:ext uri="{FF2B5EF4-FFF2-40B4-BE49-F238E27FC236}">
-                <a16:creationId xmlns:a16="http://schemas.microsoft.com/office/drawing/2014/main" id="{FA4C2B05-E648-9FA4-DCD7-B1EDB9F3BECF}"/>
-              </a:ext>
-            </a:extLst>
-          </p:cNvPr>
-          <p:cNvSpPr>
-            <a:spLocks noGrp="1"/>
-          </p:cNvSpPr>
-          <p:nvPr>
-            <p:ph type="title"/>
-          </p:nvPr>
-        </p:nvSpPr>
-        <p:spPr>
-          <a:xfrm>
-            <a:off x="838200" y="694547"/>
-            <a:ext cx="10515600" cy="1325563"/>
-          </a:xfrm>
-        </p:spPr>
-        <p:txBody>
-          <a:bodyPr/>
-          <a:lstStyle/>
-          <a:p>
-            <a:r>
-              <a:rPr lang="en-US" dirty="0"/>
-              <a:t>Compilers vs Interpreters</a:t>
-            </a:r>
-          </a:p>
-        </p:txBody>
-      </p:sp>
-      <p:sp>
-        <p:nvSpPr>
           <p:cNvPr id="7" name="Content Placeholder 6">
             <a:extLst>
               <a:ext uri="{FF2B5EF4-FFF2-40B4-BE49-F238E27FC236}">
-                <a16:creationId xmlns:a16="http://schemas.microsoft.com/office/drawing/2014/main" id="{D368607E-2AAD-DBDE-9480-8D578F7AC080}"/>
+                <a16:creationId xmlns:a16="http://schemas.microsoft.com/office/drawing/2014/main" id="{790D8155-F0DC-D2AE-4397-317E18D9EF9E}"/>
               </a:ext>
             </a:extLst>
           </p:cNvPr>
@@ -11815,8 +12135,8 @@
         </p:nvSpPr>
         <p:spPr>
           <a:xfrm>
-            <a:off x="838200" y="2254763"/>
-            <a:ext cx="10515600" cy="3922201"/>
+            <a:off x="838200" y="988399"/>
+            <a:ext cx="10515600" cy="5188566"/>
           </a:xfrm>
         </p:spPr>
         <p:txBody>
@@ -11825,34 +12145,54 @@
           <a:p>
             <a:r>
               <a:rPr lang="en-US" dirty="0"/>
-              <a:t>U can write an </a:t>
-            </a:r>
-            <a:r>
-              <a:rPr lang="en-US" dirty="0">
-                <a:solidFill>
-                  <a:schemeClr val="accent2"/>
-                </a:solidFill>
-              </a:rPr>
-              <a:t>interpreter for C </a:t>
-            </a:r>
+              <a:t>An interpreter generally uses these following strategies for program execution:</a:t>
+            </a:r>
+          </a:p>
+          <a:p>
+            <a:pPr marL="914389" lvl="1" indent="-457200">
+              <a:lnSpc>
+                <a:spcPct val="100000"/>
+              </a:lnSpc>
+              <a:buFont typeface="+mj-lt"/>
+              <a:buAutoNum type="arabicPeriod"/>
+            </a:pPr>
             <a:r>
               <a:rPr lang="en-US" dirty="0"/>
-              <a:t>and a </a:t>
-            </a:r>
-            <a:r>
-              <a:rPr lang="en-US" dirty="0">
-                <a:solidFill>
-                  <a:schemeClr val="accent1"/>
-                </a:solidFill>
-              </a:rPr>
-              <a:t>compiler for JavaScript</a:t>
-            </a:r>
+              <a:t>Parse the source code and perform its behavior directly. Early versions of LISP used this.</a:t>
+            </a:r>
+          </a:p>
+          <a:p>
+            <a:pPr marL="914389" lvl="1" indent="-457200">
+              <a:lnSpc>
+                <a:spcPct val="100000"/>
+              </a:lnSpc>
+              <a:buFont typeface="+mj-lt"/>
+              <a:buAutoNum type="arabicPeriod"/>
+            </a:pPr>
             <a:r>
               <a:rPr lang="en-US" dirty="0"/>
-              <a:t>.</a:t>
-            </a:r>
-          </a:p>
-          <a:p>
+              <a:t>Translate source code into some efficient intermediate representation and immediately execute that. Perl, Python, MATLAB, and Ruby are some examples.</a:t>
+            </a:r>
+          </a:p>
+          <a:p>
+            <a:pPr marL="914389" lvl="1" indent="-457200">
+              <a:lnSpc>
+                <a:spcPct val="100000"/>
+              </a:lnSpc>
+              <a:buFont typeface="+mj-lt"/>
+              <a:buAutoNum type="arabicPeriod"/>
+            </a:pPr>
+            <a:r>
+              <a:rPr lang="en-US" dirty="0"/>
+              <a:t>Explicitly execute stored precompiled bytecode made by a compiler and matched with the interpreter's virtual machine. – cite this</a:t>
+            </a:r>
+          </a:p>
+          <a:p>
+            <a:pPr>
+              <a:lnSpc>
+                <a:spcPct val="100000"/>
+              </a:lnSpc>
+            </a:pPr>
             <a:endParaRPr lang="en-US" dirty="0"/>
           </a:p>
         </p:txBody>
@@ -11862,7 +12202,7 @@
           <p:cNvPr id="4" name="Rectangle 3">
             <a:extLst>
               <a:ext uri="{FF2B5EF4-FFF2-40B4-BE49-F238E27FC236}">
-                <a16:creationId xmlns:a16="http://schemas.microsoft.com/office/drawing/2014/main" id="{F233A266-49F8-6F15-9B2E-4BDFA08D628A}"/>
+                <a16:creationId xmlns:a16="http://schemas.microsoft.com/office/drawing/2014/main" id="{75767946-92E9-826C-F841-5481195870F3}"/>
               </a:ext>
             </a:extLst>
           </p:cNvPr>
@@ -11914,7 +12254,7 @@
           <p:cNvPr id="5" name="Oval 4">
             <a:extLst>
               <a:ext uri="{FF2B5EF4-FFF2-40B4-BE49-F238E27FC236}">
-                <a16:creationId xmlns:a16="http://schemas.microsoft.com/office/drawing/2014/main" id="{6C2DB65A-3098-E41E-5444-5D4FDADFAAB2}"/>
+                <a16:creationId xmlns:a16="http://schemas.microsoft.com/office/drawing/2014/main" id="{CA3C996B-31F8-F6D0-932E-0E371E76FC41}"/>
               </a:ext>
             </a:extLst>
           </p:cNvPr>
@@ -11966,7 +12306,7 @@
           <p:cNvPr id="8" name="Oval 7">
             <a:extLst>
               <a:ext uri="{FF2B5EF4-FFF2-40B4-BE49-F238E27FC236}">
-                <a16:creationId xmlns:a16="http://schemas.microsoft.com/office/drawing/2014/main" id="{E833ED17-7925-7B42-2DA8-68FFB1A203C0}"/>
+                <a16:creationId xmlns:a16="http://schemas.microsoft.com/office/drawing/2014/main" id="{218686B6-36E8-8A91-C5A3-B4F783E84698}"/>
               </a:ext>
             </a:extLst>
           </p:cNvPr>
@@ -12018,7 +12358,7 @@
           <p:cNvPr id="9" name="Oval 8">
             <a:extLst>
               <a:ext uri="{FF2B5EF4-FFF2-40B4-BE49-F238E27FC236}">
-                <a16:creationId xmlns:a16="http://schemas.microsoft.com/office/drawing/2014/main" id="{649FFE16-93D7-CFAB-2B7F-C225D824A923}"/>
+                <a16:creationId xmlns:a16="http://schemas.microsoft.com/office/drawing/2014/main" id="{B64541C8-08F7-4437-1105-AF4830A477F8}"/>
               </a:ext>
             </a:extLst>
           </p:cNvPr>
@@ -12068,7 +12408,7 @@
     </p:spTree>
     <p:extLst>
       <p:ext uri="{BB962C8B-B14F-4D97-AF65-F5344CB8AC3E}">
-        <p14:creationId xmlns:p14="http://schemas.microsoft.com/office/powerpoint/2010/main" val="3444062210"/>
+        <p14:creationId xmlns:p14="http://schemas.microsoft.com/office/powerpoint/2010/main" val="1996648888"/>
       </p:ext>
     </p:extLst>
   </p:cSld>

</xml_diff>

<commit_message>
shifting to linux since llvm on windows is a pain
</commit_message>
<xml_diff>
--- a/Compilers.pptx
+++ b/Compilers.pptx
@@ -4988,6 +4988,24 @@
           <a:bodyPr/>
           <a:lstStyle/>
           <a:p>
+            <a:pPr marL="0" indent="0">
+              <a:buNone/>
+            </a:pPr>
+            <a:r>
+              <a:rPr lang="en-US" dirty="0"/>
+              <a:t>The Front End:</a:t>
+            </a:r>
+          </a:p>
+          <a:p>
+            <a:pPr lvl="1"/>
+            <a:r>
+              <a:rPr lang="en-US" dirty="0"/>
+              <a:t>This phase is again divided into </a:t>
+            </a:r>
+            <a:r>
+              <a:rPr lang="en-US"/>
+              <a:t>many subphases, </a:t>
+            </a:r>
             <a:endParaRPr lang="en-US" dirty="0"/>
           </a:p>
         </p:txBody>

</xml_diff>

<commit_message>
add colours to remaining stuff
</commit_message>
<xml_diff>
--- a/Compilers.pptx
+++ b/Compilers.pptx
@@ -4921,19 +4921,103 @@
           <a:p>
             <a:r>
               <a:rPr lang="en-US" dirty="0"/>
-              <a:t>The main idea behind a JIT compiler is to compile code during program execution, allowing for optimizations based on program’s behavior and the runtime environment.</a:t>
-            </a:r>
-          </a:p>
-          <a:p>
-            <a:r>
-              <a:rPr lang="en-US" dirty="0"/>
-              <a:t>A drawback to this is that you have to let the program run for some time to achieve optimized code, meaning apps built using this have longer start-up times.</a:t>
-            </a:r>
-          </a:p>
-          <a:p>
-            <a:r>
-              <a:rPr lang="en-US" dirty="0"/>
-              <a:t>A few examples are Java virtual machine, Google’s V8 used in chrome.</a:t>
+              <a:t>The main idea behind a JIT compiler is to </a:t>
+            </a:r>
+            <a:r>
+              <a:rPr lang="en-US" dirty="0">
+                <a:solidFill>
+                  <a:schemeClr val="accent1"/>
+                </a:solidFill>
+              </a:rPr>
+              <a:t>compile code during program execution</a:t>
+            </a:r>
+            <a:r>
+              <a:rPr lang="en-US" dirty="0"/>
+              <a:t>, </a:t>
+            </a:r>
+            <a:r>
+              <a:rPr lang="en-US" dirty="0">
+                <a:solidFill>
+                  <a:schemeClr val="accent2"/>
+                </a:solidFill>
+              </a:rPr>
+              <a:t>allowing for optimizations based on program’s behavior</a:t>
+            </a:r>
+            <a:r>
+              <a:rPr lang="en-US" dirty="0"/>
+              <a:t> and the runtime environment.</a:t>
+            </a:r>
+          </a:p>
+          <a:p>
+            <a:r>
+              <a:rPr lang="en-US" dirty="0"/>
+              <a:t>A </a:t>
+            </a:r>
+            <a:r>
+              <a:rPr lang="en-US" dirty="0">
+                <a:solidFill>
+                  <a:schemeClr val="accent4"/>
+                </a:solidFill>
+              </a:rPr>
+              <a:t>drawback</a:t>
+            </a:r>
+            <a:r>
+              <a:rPr lang="en-US" dirty="0"/>
+              <a:t> to this is that you </a:t>
+            </a:r>
+            <a:r>
+              <a:rPr lang="en-US" dirty="0">
+                <a:solidFill>
+                  <a:schemeClr val="accent6"/>
+                </a:solidFill>
+              </a:rPr>
+              <a:t>have to let the program run for some time</a:t>
+            </a:r>
+            <a:r>
+              <a:rPr lang="en-US" dirty="0"/>
+              <a:t> </a:t>
+            </a:r>
+            <a:r>
+              <a:rPr lang="en-US" dirty="0">
+                <a:solidFill>
+                  <a:schemeClr val="accent3"/>
+                </a:solidFill>
+              </a:rPr>
+              <a:t>to achieve optimized code</a:t>
+            </a:r>
+            <a:r>
+              <a:rPr lang="en-US" dirty="0"/>
+              <a:t>, meaning </a:t>
+            </a:r>
+            <a:r>
+              <a:rPr lang="en-US" dirty="0">
+                <a:solidFill>
+                  <a:schemeClr val="accent5"/>
+                </a:solidFill>
+              </a:rPr>
+              <a:t>apps built using this have longer start-up times</a:t>
+            </a:r>
+            <a:r>
+              <a:rPr lang="en-US" dirty="0"/>
+              <a:t>.</a:t>
+            </a:r>
+          </a:p>
+          <a:p>
+            <a:r>
+              <a:rPr lang="en-US" dirty="0"/>
+              <a:t>A few examples are </a:t>
+            </a:r>
+            <a:r>
+              <a:rPr lang="en-US" dirty="0">
+                <a:solidFill>
+                  <a:schemeClr val="accent1"/>
+                </a:solidFill>
+              </a:rPr>
+              <a:t>Java virtual machine, Google’s V8 used in chrome</a:t>
+            </a:r>
+            <a:r>
+              <a:rPr lang="en-US" dirty="0"/>
+              <a:t>.</a:t>
             </a:r>
           </a:p>
           <a:p>
@@ -7769,19 +7853,67 @@
           <a:p>
             <a:r>
               <a:rPr lang="en-US" dirty="0"/>
-              <a:t>There are many methods in which a compiler optimizes the code, here are a few:</a:t>
-            </a:r>
-          </a:p>
-          <a:p>
-            <a:r>
-              <a:rPr lang="en-US" dirty="0"/>
-              <a:t>Constant folding: It evaluates the constant expressions. Ex. 2 + 6 is replaced with 8 during compilation.</a:t>
-            </a:r>
-          </a:p>
-          <a:p>
-            <a:r>
-              <a:rPr lang="en-US" dirty="0"/>
-              <a:t>Constant propagation: It makes the variables constant if it finds it to be constant throughout. Ex. If x = 10, and y = x + 5; this is replaced with y = 15</a:t>
+              <a:t>There are </a:t>
+            </a:r>
+            <a:r>
+              <a:rPr lang="en-US" dirty="0">
+                <a:solidFill>
+                  <a:schemeClr val="accent1"/>
+                </a:solidFill>
+              </a:rPr>
+              <a:t>many methods in which a compiler optimizes the code</a:t>
+            </a:r>
+            <a:r>
+              <a:rPr lang="en-US" dirty="0"/>
+              <a:t>, here are a few:</a:t>
+            </a:r>
+          </a:p>
+          <a:p>
+            <a:r>
+              <a:rPr lang="en-US" dirty="0">
+                <a:solidFill>
+                  <a:schemeClr val="accent2"/>
+                </a:solidFill>
+              </a:rPr>
+              <a:t>Constant folding</a:t>
+            </a:r>
+            <a:r>
+              <a:rPr lang="en-US" dirty="0"/>
+              <a:t>: It evaluates the constant expressions. Ex. </a:t>
+            </a:r>
+            <a:r>
+              <a:rPr lang="en-US" dirty="0">
+                <a:solidFill>
+                  <a:schemeClr val="accent6"/>
+                </a:solidFill>
+              </a:rPr>
+              <a:t>2 + 6 is replaced with 8</a:t>
+            </a:r>
+            <a:r>
+              <a:rPr lang="en-US" dirty="0"/>
+              <a:t> during compilation.</a:t>
+            </a:r>
+          </a:p>
+          <a:p>
+            <a:r>
+              <a:rPr lang="en-US" dirty="0">
+                <a:solidFill>
+                  <a:schemeClr val="accent3"/>
+                </a:solidFill>
+              </a:rPr>
+              <a:t>Constant propagation</a:t>
+            </a:r>
+            <a:r>
+              <a:rPr lang="en-US" dirty="0"/>
+              <a:t>: It makes the variables constant if it finds it to be constant throughout. Ex. If </a:t>
+            </a:r>
+            <a:r>
+              <a:rPr lang="en-US" dirty="0">
+                <a:solidFill>
+                  <a:schemeClr val="accent4"/>
+                </a:solidFill>
+              </a:rPr>
+              <a:t>x = 10, and y = x + 5; this is replaced with y = 15</a:t>
             </a:r>
           </a:p>
         </p:txBody>
@@ -8048,43 +8180,182 @@
         </p:nvSpPr>
         <p:spPr>
           <a:xfrm>
-            <a:off x="838200" y="988399"/>
-            <a:ext cx="10515600" cy="5188566"/>
-          </a:xfrm>
-        </p:spPr>
-        <p:txBody>
-          <a:bodyPr/>
-          <a:lstStyle/>
-          <a:p>
-            <a:r>
-              <a:rPr lang="en-US" dirty="0"/>
-              <a:t>Dead code elimination: It removes that code which does not affect the program’s output. Ex. Removing the code after the return statement</a:t>
-            </a:r>
-          </a:p>
-          <a:p>
-            <a:r>
-              <a:rPr lang="en-US" dirty="0"/>
-              <a:t>Loop optimization: </a:t>
+            <a:off x="838200" y="865414"/>
+            <a:ext cx="10515600" cy="5633358"/>
+          </a:xfrm>
+        </p:spPr>
+        <p:txBody>
+          <a:bodyPr>
+            <a:normAutofit/>
+          </a:bodyPr>
+          <a:lstStyle/>
+          <a:p>
+            <a:r>
+              <a:rPr lang="en-US" dirty="0">
+                <a:solidFill>
+                  <a:schemeClr val="accent4"/>
+                </a:solidFill>
+              </a:rPr>
+              <a:t>Dead code elimination</a:t>
+            </a:r>
+            <a:r>
+              <a:rPr lang="en-US" dirty="0"/>
+              <a:t>: It </a:t>
+            </a:r>
+            <a:r>
+              <a:rPr lang="en-US" dirty="0">
+                <a:solidFill>
+                  <a:schemeClr val="accent1"/>
+                </a:solidFill>
+              </a:rPr>
+              <a:t>removes that code </a:t>
+            </a:r>
+            <a:r>
+              <a:rPr lang="en-US" dirty="0">
+                <a:solidFill>
+                  <a:schemeClr val="accent2"/>
+                </a:solidFill>
+              </a:rPr>
+              <a:t>which does not affect the program’s output</a:t>
+            </a:r>
+            <a:r>
+              <a:rPr lang="en-US" dirty="0"/>
+              <a:t>. Ex. Removing the code after the return statement</a:t>
+            </a:r>
+          </a:p>
+          <a:p>
+            <a:r>
+              <a:rPr lang="en-US" dirty="0">
+                <a:solidFill>
+                  <a:schemeClr val="accent5"/>
+                </a:solidFill>
+              </a:rPr>
+              <a:t>Loop optimization</a:t>
+            </a:r>
+            <a:r>
+              <a:rPr lang="en-US" dirty="0"/>
+              <a:t>: </a:t>
             </a:r>
           </a:p>
           <a:p>
             <a:pPr lvl="1"/>
             <a:r>
-              <a:rPr lang="en-US" dirty="0"/>
-              <a:t>Loop invariant code motion: brings the code outside the loop if it notices that it does not change in the loop.</a:t>
+              <a:rPr lang="en-US" dirty="0">
+                <a:solidFill>
+                  <a:schemeClr val="accent2"/>
+                </a:solidFill>
+              </a:rPr>
+              <a:t>Loop invariant code motion</a:t>
+            </a:r>
+            <a:r>
+              <a:rPr lang="en-US" dirty="0"/>
+              <a:t>: </a:t>
+            </a:r>
+            <a:r>
+              <a:rPr lang="en-US" dirty="0">
+                <a:solidFill>
+                  <a:schemeClr val="accent3"/>
+                </a:solidFill>
+              </a:rPr>
+              <a:t>brings the code outside the loop</a:t>
+            </a:r>
+            <a:r>
+              <a:rPr lang="en-US" dirty="0"/>
+              <a:t> </a:t>
+            </a:r>
+            <a:r>
+              <a:rPr lang="en-US" dirty="0">
+                <a:solidFill>
+                  <a:schemeClr val="accent5"/>
+                </a:solidFill>
+              </a:rPr>
+              <a:t>if it does not change in the loop</a:t>
+            </a:r>
+            <a:r>
+              <a:rPr lang="en-US" dirty="0"/>
+              <a:t>.</a:t>
             </a:r>
           </a:p>
           <a:p>
             <a:pPr lvl="1"/>
             <a:r>
-              <a:rPr lang="en-US" dirty="0"/>
-              <a:t>Loop fusion: combines adjacent loops which iterate over the same data.</a:t>
-            </a:r>
-          </a:p>
-          <a:p>
-            <a:r>
-              <a:rPr lang="en-US" dirty="0"/>
-              <a:t>Inlining functions: it does this to remove the function call overhead, and allows for further optimizations like constant folding or loop unrolling.</a:t>
+              <a:rPr lang="en-US" dirty="0">
+                <a:solidFill>
+                  <a:schemeClr val="accent1"/>
+                </a:solidFill>
+              </a:rPr>
+              <a:t>Loop fusion</a:t>
+            </a:r>
+            <a:r>
+              <a:rPr lang="en-US" dirty="0"/>
+              <a:t>: </a:t>
+            </a:r>
+            <a:r>
+              <a:rPr lang="en-US" dirty="0">
+                <a:solidFill>
+                  <a:schemeClr val="accent6"/>
+                </a:solidFill>
+              </a:rPr>
+              <a:t>combines adjacent loops </a:t>
+            </a:r>
+            <a:r>
+              <a:rPr lang="en-US" dirty="0">
+                <a:solidFill>
+                  <a:schemeClr val="accent4"/>
+                </a:solidFill>
+              </a:rPr>
+              <a:t>which iterate over the same data</a:t>
+            </a:r>
+            <a:r>
+              <a:rPr lang="en-US" dirty="0"/>
+              <a:t>.</a:t>
+            </a:r>
+          </a:p>
+          <a:p>
+            <a:r>
+              <a:rPr lang="en-US" dirty="0">
+                <a:solidFill>
+                  <a:schemeClr val="accent6"/>
+                </a:solidFill>
+              </a:rPr>
+              <a:t>Inlining functions</a:t>
+            </a:r>
+            <a:r>
+              <a:rPr lang="en-US" dirty="0"/>
+              <a:t>: it does this to </a:t>
+            </a:r>
+            <a:r>
+              <a:rPr lang="en-US" dirty="0">
+                <a:solidFill>
+                  <a:schemeClr val="accent2"/>
+                </a:solidFill>
+              </a:rPr>
+              <a:t>remove the function call overhead</a:t>
+            </a:r>
+            <a:r>
+              <a:rPr lang="en-US" dirty="0"/>
+              <a:t>, and </a:t>
+            </a:r>
+            <a:r>
+              <a:rPr lang="en-US" dirty="0">
+                <a:solidFill>
+                  <a:schemeClr val="accent1"/>
+                </a:solidFill>
+              </a:rPr>
+              <a:t>allows for further optimizations</a:t>
+            </a:r>
+            <a:r>
+              <a:rPr lang="en-US" dirty="0"/>
+              <a:t> like constant folding or loop unrolling.</a:t>
+            </a:r>
+          </a:p>
+          <a:p>
+            <a:pPr marL="0" indent="0">
+              <a:buNone/>
+            </a:pPr>
+            <a:r>
+              <a:rPr lang="en-US" dirty="0"/>
+              <a:t>And many more techniques.</a:t>
             </a:r>
           </a:p>
         </p:txBody>
@@ -8908,33 +9179,177 @@
           <a:p>
             <a:r>
               <a:rPr lang="en-US" dirty="0"/>
-              <a:t>It takes the intermediate representation, and tries to optimize it using register allocation etc.</a:t>
-            </a:r>
-          </a:p>
-          <a:p>
-            <a:r>
-              <a:rPr lang="en-US" dirty="0"/>
-              <a:t>Register Allocation:</a:t>
+              <a:t>It takes the </a:t>
+            </a:r>
+            <a:r>
+              <a:rPr lang="en-US" dirty="0">
+                <a:solidFill>
+                  <a:schemeClr val="accent3"/>
+                </a:solidFill>
+              </a:rPr>
+              <a:t>intermediate representation</a:t>
+            </a:r>
+            <a:r>
+              <a:rPr lang="en-US" dirty="0"/>
+              <a:t>, and </a:t>
+            </a:r>
+            <a:r>
+              <a:rPr lang="en-US" dirty="0">
+                <a:solidFill>
+                  <a:schemeClr val="accent5"/>
+                </a:solidFill>
+              </a:rPr>
+              <a:t>tries to optimize it using </a:t>
+            </a:r>
+            <a:r>
+              <a:rPr lang="en-US" dirty="0">
+                <a:solidFill>
+                  <a:schemeClr val="accent1"/>
+                </a:solidFill>
+              </a:rPr>
+              <a:t>register allocation </a:t>
+            </a:r>
+            <a:r>
+              <a:rPr lang="en-US" dirty="0">
+                <a:solidFill>
+                  <a:schemeClr val="accent5"/>
+                </a:solidFill>
+              </a:rPr>
+              <a:t>etc</a:t>
+            </a:r>
+            <a:r>
+              <a:rPr lang="en-US" dirty="0"/>
+              <a:t>.</a:t>
+            </a:r>
+          </a:p>
+          <a:p>
+            <a:r>
+              <a:rPr lang="en-US" dirty="0">
+                <a:solidFill>
+                  <a:schemeClr val="accent4"/>
+                </a:solidFill>
+              </a:rPr>
+              <a:t>Register Allocation</a:t>
+            </a:r>
+            <a:r>
+              <a:rPr lang="en-US" dirty="0"/>
+              <a:t>:</a:t>
             </a:r>
           </a:p>
           <a:p>
             <a:pPr lvl="1"/>
             <a:r>
               <a:rPr lang="en-US" dirty="0"/>
-              <a:t>The compiler decides which variables to store in CPU registers and which in memory.</a:t>
+              <a:t>The </a:t>
+            </a:r>
+            <a:r>
+              <a:rPr lang="en-US" dirty="0">
+                <a:solidFill>
+                  <a:schemeClr val="accent6"/>
+                </a:solidFill>
+              </a:rPr>
+              <a:t>compiler decides which variables</a:t>
+            </a:r>
+            <a:r>
+              <a:rPr lang="en-US" dirty="0"/>
+              <a:t> to </a:t>
+            </a:r>
+            <a:r>
+              <a:rPr lang="en-US" dirty="0">
+                <a:solidFill>
+                  <a:schemeClr val="accent5"/>
+                </a:solidFill>
+              </a:rPr>
+              <a:t>store in CPU registers</a:t>
+            </a:r>
+            <a:r>
+              <a:rPr lang="en-US" dirty="0"/>
+              <a:t> </a:t>
+            </a:r>
+            <a:r>
+              <a:rPr lang="en-US" dirty="0">
+                <a:solidFill>
+                  <a:schemeClr val="accent1"/>
+                </a:solidFill>
+              </a:rPr>
+              <a:t>and which in memory</a:t>
+            </a:r>
+            <a:r>
+              <a:rPr lang="en-US" dirty="0"/>
+              <a:t>.</a:t>
             </a:r>
           </a:p>
           <a:p>
             <a:pPr lvl="1"/>
             <a:r>
               <a:rPr lang="en-US" dirty="0"/>
-              <a:t>This step is crucial in optimizing the program’s performance since accessing registers is faster than memory.</a:t>
-            </a:r>
-          </a:p>
-          <a:p>
-            <a:r>
-              <a:rPr lang="en-US" dirty="0"/>
-              <a:t>The final step before the executable is formed is linking. The program may contain many modules, linking combines them into a single executable</a:t>
+              <a:t>This step is </a:t>
+            </a:r>
+            <a:r>
+              <a:rPr lang="en-US" dirty="0">
+                <a:solidFill>
+                  <a:schemeClr val="accent2"/>
+                </a:solidFill>
+              </a:rPr>
+              <a:t>crucial in optimizing the program’s performance</a:t>
+            </a:r>
+            <a:r>
+              <a:rPr lang="en-US" dirty="0"/>
+              <a:t> since </a:t>
+            </a:r>
+            <a:r>
+              <a:rPr lang="en-US" dirty="0">
+                <a:solidFill>
+                  <a:schemeClr val="accent5"/>
+                </a:solidFill>
+              </a:rPr>
+              <a:t>accessing registers is faster than memory</a:t>
+            </a:r>
+            <a:r>
+              <a:rPr lang="en-US" dirty="0"/>
+              <a:t>.</a:t>
+            </a:r>
+          </a:p>
+          <a:p>
+            <a:r>
+              <a:rPr lang="en-US" dirty="0"/>
+              <a:t>The </a:t>
+            </a:r>
+            <a:r>
+              <a:rPr lang="en-US" dirty="0">
+                <a:solidFill>
+                  <a:schemeClr val="accent1"/>
+                </a:solidFill>
+              </a:rPr>
+              <a:t>final step before the executable is formed </a:t>
+            </a:r>
+            <a:r>
+              <a:rPr lang="en-US" dirty="0"/>
+              <a:t>is </a:t>
+            </a:r>
+            <a:r>
+              <a:rPr lang="en-US" dirty="0">
+                <a:solidFill>
+                  <a:schemeClr val="accent2"/>
+                </a:solidFill>
+              </a:rPr>
+              <a:t>linking</a:t>
+            </a:r>
+            <a:r>
+              <a:rPr lang="en-US" dirty="0"/>
+              <a:t>. The </a:t>
+            </a:r>
+            <a:r>
+              <a:rPr lang="en-US" dirty="0">
+                <a:solidFill>
+                  <a:schemeClr val="accent4"/>
+                </a:solidFill>
+              </a:rPr>
+              <a:t>program may contain many modules, linking combines them into a single executable</a:t>
+            </a:r>
+            <a:r>
+              <a:rPr lang="en-US" dirty="0"/>
+              <a:t>.</a:t>
             </a:r>
           </a:p>
         </p:txBody>

</xml_diff>